<commit_message>
ran multi-agent ATAMS simulation
</commit_message>
<xml_diff>
--- a/saved_simulations/CE/Springer_Culminating_Experience_Project.pptx
+++ b/saved_simulations/CE/Springer_Culminating_Experience_Project.pptx
@@ -153,6 +153,215 @@
 <p188:authorLst xmlns:a="http://schemas.openxmlformats.org/drawingml/2006/main" xmlns:r="http://schemas.openxmlformats.org/officeDocument/2006/relationships" xmlns:p188="http://schemas.microsoft.com/office/powerpoint/2018/8/main">
   <p188:author id="{A6428A73-3905-E9F1-1CD6-43B4FAAB7485}" name="Alex Springer" initials="AS" userId="06b1172c4a5245da" providerId="Windows Live"/>
 </p188:authorLst>
+</file>
+
+<file path=ppt/revisionInfo.xml><?xml version="1.0" encoding="utf-8"?>
+<p1510:revInfo xmlns:a="http://schemas.openxmlformats.org/drawingml/2006/main" xmlns:r="http://schemas.openxmlformats.org/officeDocument/2006/relationships" xmlns:p1510="http://schemas.microsoft.com/office/powerpoint/2015/10/main">
+  <p1510:revLst>
+    <p1510:client id="{0A8A9783-B282-41E0-BD53-2C37EE67CB25}" v="6" dt="2024-03-21T13:26:21.033"/>
+  </p1510:revLst>
+</p1510:revInfo>
+</file>
+
+<file path=ppt/changesInfos/changesInfo1.xml><?xml version="1.0" encoding="utf-8"?>
+<pc:chgInfo xmlns:a="http://schemas.openxmlformats.org/drawingml/2006/main" xmlns:r="http://schemas.openxmlformats.org/officeDocument/2006/relationships" xmlns:ac="http://schemas.microsoft.com/office/drawing/2013/main/command" xmlns:pc="http://schemas.microsoft.com/office/powerpoint/2013/main/command">
+  <pc:docChgLst>
+    <pc:chgData name="Alex Springer" userId="06b1172c4a5245da" providerId="LiveId" clId="{0A8A9783-B282-41E0-BD53-2C37EE67CB25}"/>
+    <pc:docChg chg="custSel modSld">
+      <pc:chgData name="Alex Springer" userId="06b1172c4a5245da" providerId="LiveId" clId="{0A8A9783-B282-41E0-BD53-2C37EE67CB25}" dt="2024-03-21T13:33:57.821" v="261" actId="20577"/>
+      <pc:docMkLst>
+        <pc:docMk/>
+      </pc:docMkLst>
+      <pc:sldChg chg="addSp delSp modSp mod">
+        <pc:chgData name="Alex Springer" userId="06b1172c4a5245da" providerId="LiveId" clId="{0A8A9783-B282-41E0-BD53-2C37EE67CB25}" dt="2024-03-21T13:07:51.307" v="8" actId="1076"/>
+        <pc:sldMkLst>
+          <pc:docMk/>
+          <pc:sldMk cId="4293648651" sldId="265"/>
+        </pc:sldMkLst>
+        <pc:spChg chg="del">
+          <ac:chgData name="Alex Springer" userId="06b1172c4a5245da" providerId="LiveId" clId="{0A8A9783-B282-41E0-BD53-2C37EE67CB25}" dt="2024-03-21T13:07:01.253" v="1" actId="478"/>
+          <ac:spMkLst>
+            <pc:docMk/>
+            <pc:sldMk cId="4293648651" sldId="265"/>
+            <ac:spMk id="6" creationId="{5B6ABC96-E029-9263-6DCE-64825763653E}"/>
+          </ac:spMkLst>
+        </pc:spChg>
+        <pc:picChg chg="add del mod">
+          <ac:chgData name="Alex Springer" userId="06b1172c4a5245da" providerId="LiveId" clId="{0A8A9783-B282-41E0-BD53-2C37EE67CB25}" dt="2024-03-21T13:07:45.251" v="5" actId="478"/>
+          <ac:picMkLst>
+            <pc:docMk/>
+            <pc:sldMk cId="4293648651" sldId="265"/>
+            <ac:picMk id="8" creationId="{5AEA7BAA-6AAB-4C7A-EE99-847D03E9E5CE}"/>
+          </ac:picMkLst>
+        </pc:picChg>
+        <pc:picChg chg="add mod">
+          <ac:chgData name="Alex Springer" userId="06b1172c4a5245da" providerId="LiveId" clId="{0A8A9783-B282-41E0-BD53-2C37EE67CB25}" dt="2024-03-21T13:07:51.307" v="8" actId="1076"/>
+          <ac:picMkLst>
+            <pc:docMk/>
+            <pc:sldMk cId="4293648651" sldId="265"/>
+            <ac:picMk id="10" creationId="{095BCA26-EDCE-2E7C-C6DE-0EA46D041DE2}"/>
+          </ac:picMkLst>
+        </pc:picChg>
+        <pc:picChg chg="del">
+          <ac:chgData name="Alex Springer" userId="06b1172c4a5245da" providerId="LiveId" clId="{0A8A9783-B282-41E0-BD53-2C37EE67CB25}" dt="2024-03-21T13:06:58.707" v="0" actId="478"/>
+          <ac:picMkLst>
+            <pc:docMk/>
+            <pc:sldMk cId="4293648651" sldId="265"/>
+            <ac:picMk id="12" creationId="{69C68C4B-3AFB-50F1-89C3-9D2997725816}"/>
+          </ac:picMkLst>
+        </pc:picChg>
+      </pc:sldChg>
+      <pc:sldChg chg="modSp mod">
+        <pc:chgData name="Alex Springer" userId="06b1172c4a5245da" providerId="LiveId" clId="{0A8A9783-B282-41E0-BD53-2C37EE67CB25}" dt="2024-03-21T13:33:57.821" v="261" actId="20577"/>
+        <pc:sldMkLst>
+          <pc:docMk/>
+          <pc:sldMk cId="536587020" sldId="290"/>
+        </pc:sldMkLst>
+        <pc:spChg chg="mod">
+          <ac:chgData name="Alex Springer" userId="06b1172c4a5245da" providerId="LiveId" clId="{0A8A9783-B282-41E0-BD53-2C37EE67CB25}" dt="2024-03-21T13:33:57.821" v="261" actId="20577"/>
+          <ac:spMkLst>
+            <pc:docMk/>
+            <pc:sldMk cId="536587020" sldId="290"/>
+            <ac:spMk id="12" creationId="{C434760D-8A18-C374-5EF9-56AFA1808FCC}"/>
+          </ac:spMkLst>
+        </pc:spChg>
+        <pc:cxnChg chg="mod">
+          <ac:chgData name="Alex Springer" userId="06b1172c4a5245da" providerId="LiveId" clId="{0A8A9783-B282-41E0-BD53-2C37EE67CB25}" dt="2024-03-21T13:33:57.821" v="261" actId="20577"/>
+          <ac:cxnSpMkLst>
+            <pc:docMk/>
+            <pc:sldMk cId="536587020" sldId="290"/>
+            <ac:cxnSpMk id="14" creationId="{BAA93EE7-341D-E3D7-2067-222BB3EF9892}"/>
+          </ac:cxnSpMkLst>
+        </pc:cxnChg>
+      </pc:sldChg>
+      <pc:sldChg chg="modSp mod">
+        <pc:chgData name="Alex Springer" userId="06b1172c4a5245da" providerId="LiveId" clId="{0A8A9783-B282-41E0-BD53-2C37EE67CB25}" dt="2024-03-21T13:11:15.655" v="9" actId="6549"/>
+        <pc:sldMkLst>
+          <pc:docMk/>
+          <pc:sldMk cId="3956445533" sldId="292"/>
+        </pc:sldMkLst>
+        <pc:spChg chg="mod">
+          <ac:chgData name="Alex Springer" userId="06b1172c4a5245da" providerId="LiveId" clId="{0A8A9783-B282-41E0-BD53-2C37EE67CB25}" dt="2024-03-21T13:11:15.655" v="9" actId="6549"/>
+          <ac:spMkLst>
+            <pc:docMk/>
+            <pc:sldMk cId="3956445533" sldId="292"/>
+            <ac:spMk id="3" creationId="{1EEEDFF7-B1C0-5818-47A1-A7173287266E}"/>
+          </ac:spMkLst>
+        </pc:spChg>
+      </pc:sldChg>
+      <pc:sldChg chg="modSp mod">
+        <pc:chgData name="Alex Springer" userId="06b1172c4a5245da" providerId="LiveId" clId="{0A8A9783-B282-41E0-BD53-2C37EE67CB25}" dt="2024-03-21T13:26:21.033" v="61"/>
+        <pc:sldMkLst>
+          <pc:docMk/>
+          <pc:sldMk cId="1436118770" sldId="297"/>
+        </pc:sldMkLst>
+        <pc:spChg chg="mod">
+          <ac:chgData name="Alex Springer" userId="06b1172c4a5245da" providerId="LiveId" clId="{0A8A9783-B282-41E0-BD53-2C37EE67CB25}" dt="2024-03-21T13:24:45.155" v="34" actId="1035"/>
+          <ac:spMkLst>
+            <pc:docMk/>
+            <pc:sldMk cId="1436118770" sldId="297"/>
+            <ac:spMk id="6" creationId="{F81C6E53-0D7E-A8EE-6004-A820C68ADC3E}"/>
+          </ac:spMkLst>
+        </pc:spChg>
+        <pc:graphicFrameChg chg="mod modGraphic">
+          <ac:chgData name="Alex Springer" userId="06b1172c4a5245da" providerId="LiveId" clId="{0A8A9783-B282-41E0-BD53-2C37EE67CB25}" dt="2024-03-21T13:26:21.033" v="61"/>
+          <ac:graphicFrameMkLst>
+            <pc:docMk/>
+            <pc:sldMk cId="1436118770" sldId="297"/>
+            <ac:graphicFrameMk id="5" creationId="{F641CB4E-2F71-EC44-487F-8051DA95D186}"/>
+          </ac:graphicFrameMkLst>
+        </pc:graphicFrameChg>
+      </pc:sldChg>
+      <pc:sldChg chg="modSp mod">
+        <pc:chgData name="Alex Springer" userId="06b1172c4a5245da" providerId="LiveId" clId="{0A8A9783-B282-41E0-BD53-2C37EE67CB25}" dt="2024-03-21T13:32:33.988" v="260" actId="113"/>
+        <pc:sldMkLst>
+          <pc:docMk/>
+          <pc:sldMk cId="766913812" sldId="298"/>
+        </pc:sldMkLst>
+        <pc:spChg chg="mod">
+          <ac:chgData name="Alex Springer" userId="06b1172c4a5245da" providerId="LiveId" clId="{0A8A9783-B282-41E0-BD53-2C37EE67CB25}" dt="2024-03-21T13:32:33.988" v="260" actId="113"/>
+          <ac:spMkLst>
+            <pc:docMk/>
+            <pc:sldMk cId="766913812" sldId="298"/>
+            <ac:spMk id="6" creationId="{0E4C1E98-7656-AC05-BF14-E3B7C4853D19}"/>
+          </ac:spMkLst>
+        </pc:spChg>
+        <pc:spChg chg="mod">
+          <ac:chgData name="Alex Springer" userId="06b1172c4a5245da" providerId="LiveId" clId="{0A8A9783-B282-41E0-BD53-2C37EE67CB25}" dt="2024-03-21T13:32:07.381" v="247" actId="1036"/>
+          <ac:spMkLst>
+            <pc:docMk/>
+            <pc:sldMk cId="766913812" sldId="298"/>
+            <ac:spMk id="10" creationId="{ED4538EC-29F4-5FC1-51E2-6D0AFD205151}"/>
+          </ac:spMkLst>
+        </pc:spChg>
+        <pc:spChg chg="mod">
+          <ac:chgData name="Alex Springer" userId="06b1172c4a5245da" providerId="LiveId" clId="{0A8A9783-B282-41E0-BD53-2C37EE67CB25}" dt="2024-03-21T13:32:25.157" v="256" actId="14100"/>
+          <ac:spMkLst>
+            <pc:docMk/>
+            <pc:sldMk cId="766913812" sldId="298"/>
+            <ac:spMk id="11" creationId="{CE4745B3-81AA-17F5-E65D-AA26DDF52955}"/>
+          </ac:spMkLst>
+        </pc:spChg>
+        <pc:spChg chg="mod">
+          <ac:chgData name="Alex Springer" userId="06b1172c4a5245da" providerId="LiveId" clId="{0A8A9783-B282-41E0-BD53-2C37EE67CB25}" dt="2024-03-21T13:32:07.381" v="247" actId="1036"/>
+          <ac:spMkLst>
+            <pc:docMk/>
+            <pc:sldMk cId="766913812" sldId="298"/>
+            <ac:spMk id="12" creationId="{FEB99B07-4080-F893-E4D3-337ABBE3F35B}"/>
+          </ac:spMkLst>
+        </pc:spChg>
+        <pc:spChg chg="mod">
+          <ac:chgData name="Alex Springer" userId="06b1172c4a5245da" providerId="LiveId" clId="{0A8A9783-B282-41E0-BD53-2C37EE67CB25}" dt="2024-03-21T13:32:07.381" v="247" actId="1036"/>
+          <ac:spMkLst>
+            <pc:docMk/>
+            <pc:sldMk cId="766913812" sldId="298"/>
+            <ac:spMk id="13" creationId="{B88D387A-D47F-3C99-4893-22EFD7AE0E51}"/>
+          </ac:spMkLst>
+        </pc:spChg>
+        <pc:spChg chg="mod">
+          <ac:chgData name="Alex Springer" userId="06b1172c4a5245da" providerId="LiveId" clId="{0A8A9783-B282-41E0-BD53-2C37EE67CB25}" dt="2024-03-21T13:32:07.381" v="247" actId="1036"/>
+          <ac:spMkLst>
+            <pc:docMk/>
+            <pc:sldMk cId="766913812" sldId="298"/>
+            <ac:spMk id="14" creationId="{9CEC79AE-6D0B-85A7-E9C7-249CAADDE86C}"/>
+          </ac:spMkLst>
+        </pc:spChg>
+        <pc:spChg chg="mod">
+          <ac:chgData name="Alex Springer" userId="06b1172c4a5245da" providerId="LiveId" clId="{0A8A9783-B282-41E0-BD53-2C37EE67CB25}" dt="2024-03-21T13:32:07.381" v="247" actId="1036"/>
+          <ac:spMkLst>
+            <pc:docMk/>
+            <pc:sldMk cId="766913812" sldId="298"/>
+            <ac:spMk id="15" creationId="{18ED0692-C057-FDE3-8166-365AB7747E84}"/>
+          </ac:spMkLst>
+        </pc:spChg>
+        <pc:spChg chg="mod">
+          <ac:chgData name="Alex Springer" userId="06b1172c4a5245da" providerId="LiveId" clId="{0A8A9783-B282-41E0-BD53-2C37EE67CB25}" dt="2024-03-21T13:32:07.381" v="247" actId="1036"/>
+          <ac:spMkLst>
+            <pc:docMk/>
+            <pc:sldMk cId="766913812" sldId="298"/>
+            <ac:spMk id="16" creationId="{43EA4093-7B60-7228-A79F-E58CF96C7168}"/>
+          </ac:spMkLst>
+        </pc:spChg>
+        <pc:spChg chg="mod">
+          <ac:chgData name="Alex Springer" userId="06b1172c4a5245da" providerId="LiveId" clId="{0A8A9783-B282-41E0-BD53-2C37EE67CB25}" dt="2024-03-21T13:32:07.381" v="247" actId="1036"/>
+          <ac:spMkLst>
+            <pc:docMk/>
+            <pc:sldMk cId="766913812" sldId="298"/>
+            <ac:spMk id="17" creationId="{A32E67B8-772E-B5E9-9CF4-D6258B24E600}"/>
+          </ac:spMkLst>
+        </pc:spChg>
+        <pc:graphicFrameChg chg="mod modGraphic">
+          <ac:chgData name="Alex Springer" userId="06b1172c4a5245da" providerId="LiveId" clId="{0A8A9783-B282-41E0-BD53-2C37EE67CB25}" dt="2024-03-21T13:32:20.531" v="255" actId="113"/>
+          <ac:graphicFrameMkLst>
+            <pc:docMk/>
+            <pc:sldMk cId="766913812" sldId="298"/>
+            <ac:graphicFrameMk id="9" creationId="{A8C5007A-7CDF-CE7D-BBA7-B8210DE00F31}"/>
+          </ac:graphicFrameMkLst>
+        </pc:graphicFrameChg>
+      </pc:sldChg>
+    </pc:docChg>
+  </pc:docChgLst>
+</pc:chgInfo>
 </file>
 
 <file path=ppt/comments/modernComment_100_9254ADBF.xml><?xml version="1.0" encoding="utf-8"?>
@@ -4763,7 +4972,7 @@
           <a:p>
             <a:fld id="{9765B3C7-2132-4D31-8CF4-DF01775E6648}" type="datetimeFigureOut">
               <a:rPr lang="en-US" smtClean="0"/>
-              <a:t>3/11/2024</a:t>
+              <a:t>3/21/2024</a:t>
             </a:fld>
             <a:endParaRPr lang="en-US"/>
           </a:p>
@@ -15023,36 +15232,6 @@
           </a:p>
         </p:txBody>
       </p:sp>
-      <p:pic>
-        <p:nvPicPr>
-          <p:cNvPr id="12" name="Picture 11">
-            <a:extLst>
-              <a:ext uri="{FF2B5EF4-FFF2-40B4-BE49-F238E27FC236}">
-                <a16:creationId xmlns:a16="http://schemas.microsoft.com/office/drawing/2014/main" id="{69C68C4B-3AFB-50F1-89C3-9D2997725816}"/>
-              </a:ext>
-            </a:extLst>
-          </p:cNvPr>
-          <p:cNvPicPr>
-            <a:picLocks noChangeAspect="1"/>
-          </p:cNvPicPr>
-          <p:nvPr/>
-        </p:nvPicPr>
-        <p:blipFill>
-          <a:blip r:embed="rId2"/>
-          <a:stretch>
-            <a:fillRect/>
-          </a:stretch>
-        </p:blipFill>
-        <p:spPr>
-          <a:xfrm>
-            <a:off x="4964454" y="1482896"/>
-            <a:ext cx="6389346" cy="3155069"/>
-          </a:xfrm>
-          <a:prstGeom prst="rect">
-            <a:avLst/>
-          </a:prstGeom>
-        </p:spPr>
-      </p:pic>
       <p:sp>
         <p:nvSpPr>
           <p:cNvPr id="4" name="Slide Number Placeholder 3"/>
@@ -15331,41 +15510,36 @@
           </a:p>
         </p:txBody>
       </p:sp>
-      <p:sp>
-        <p:nvSpPr>
-          <p:cNvPr id="6" name="TextBox 5">
+      <p:pic>
+        <p:nvPicPr>
+          <p:cNvPr id="10" name="Picture 9">
             <a:extLst>
               <a:ext uri="{FF2B5EF4-FFF2-40B4-BE49-F238E27FC236}">
-                <a16:creationId xmlns:a16="http://schemas.microsoft.com/office/drawing/2014/main" id="{5B6ABC96-E029-9263-6DCE-64825763653E}"/>
+                <a16:creationId xmlns:a16="http://schemas.microsoft.com/office/drawing/2014/main" id="{095BCA26-EDCE-2E7C-C6DE-0EA46D041DE2}"/>
               </a:ext>
             </a:extLst>
           </p:cNvPr>
-          <p:cNvSpPr txBox="1"/>
+          <p:cNvPicPr>
+            <a:picLocks noChangeAspect="1"/>
+          </p:cNvPicPr>
           <p:nvPr/>
-        </p:nvSpPr>
+        </p:nvPicPr>
+        <p:blipFill>
+          <a:blip r:embed="rId2"/>
+          <a:stretch>
+            <a:fillRect/>
+          </a:stretch>
+        </p:blipFill>
         <p:spPr>
           <a:xfrm>
-            <a:off x="4964454" y="4369355"/>
-            <a:ext cx="6372242" cy="276999"/>
+            <a:off x="5216624" y="1665643"/>
+            <a:ext cx="5871560" cy="2905326"/>
           </a:xfrm>
           <a:prstGeom prst="rect">
             <a:avLst/>
           </a:prstGeom>
-          <a:noFill/>
         </p:spPr>
-        <p:txBody>
-          <a:bodyPr wrap="square" rtlCol="0">
-            <a:spAutoFit/>
-          </a:bodyPr>
-          <a:lstStyle/>
-          <a:p>
-            <a:r>
-              <a:rPr lang="en-US" sz="1200" dirty="0"/>
-              <a:t>Note: Drones in the simulation are fixed-wing, not rotary-wing as shown</a:t>
-            </a:r>
-          </a:p>
-        </p:txBody>
-      </p:sp>
+      </p:pic>
     </p:spTree>
     <p:extLst>
       <p:ext uri="{BB962C8B-B14F-4D97-AF65-F5344CB8AC3E}">
@@ -17088,7 +17262,7 @@
         <p:spPr>
           <a:xfrm>
             <a:off x="2926080" y="4039263"/>
-            <a:ext cx="2392680" cy="923330"/>
+            <a:ext cx="2392680" cy="646331"/>
           </a:xfrm>
           <a:prstGeom prst="rect">
             <a:avLst/>
@@ -17110,7 +17284,7 @@
           <a:p>
             <a:r>
               <a:rPr lang="en-US" dirty="0"/>
-              <a:t>Dive commanded to aircraft to match flyover altitude</a:t>
+              <a:t>Dive commanded to match flyover altitude</a:t>
             </a:r>
           </a:p>
         </p:txBody>
@@ -17132,7 +17306,7 @@
         <p:spPr>
           <a:xfrm flipH="1" flipV="1">
             <a:off x="2087880" y="3931920"/>
-            <a:ext cx="838200" cy="569008"/>
+            <a:ext cx="838200" cy="430509"/>
           </a:xfrm>
           <a:prstGeom prst="straightConnector1">
             <a:avLst/>
@@ -18001,8 +18175,8 @@
           </a:p>
         </p:txBody>
       </p:sp>
-      <mc:AlternateContent xmlns:mc="http://schemas.openxmlformats.org/markup-compatibility/2006" xmlns:a14="http://schemas.microsoft.com/office/drawing/2010/main">
-        <mc:Choice Requires="a14">
+      <mc:AlternateContent xmlns:mc="http://schemas.openxmlformats.org/markup-compatibility/2006">
+        <mc:Choice xmlns:a14="http://schemas.microsoft.com/office/drawing/2010/main" Requires="a14">
           <p:sp>
             <p:nvSpPr>
               <p:cNvPr id="3" name="Content Placeholder 2">
@@ -18165,7 +18339,7 @@
                 <a:pPr lvl="2"/>
                 <a:r>
                   <a:rPr lang="en-US" dirty="0"/>
-                  <a:t>Assumption: It is cheaper to lower an agent’s altitude than raise it</a:t>
+                  <a:t>It is cheaper to lower an agent’s altitude than raise it</a:t>
                 </a:r>
               </a:p>
               <a:p>
@@ -18220,7 +18394,7 @@
             </p:txBody>
           </p:sp>
         </mc:Choice>
-        <mc:Fallback xmlns="">
+        <mc:Fallback>
           <p:sp>
             <p:nvSpPr>
               <p:cNvPr id="3" name="Content Placeholder 2">
@@ -19894,13 +20068,13 @@
             <p:ph idx="1"/>
             <p:extLst>
               <p:ext uri="{D42A27DB-BD31-4B8C-83A1-F6EECF244321}">
-                <p14:modId xmlns:p14="http://schemas.microsoft.com/office/powerpoint/2010/main" val="1228447538"/>
+                <p14:modId xmlns:p14="http://schemas.microsoft.com/office/powerpoint/2010/main" val="949746682"/>
               </p:ext>
             </p:extLst>
           </p:nvPr>
         </p:nvGraphicFramePr>
         <p:xfrm>
-          <a:off x="236219" y="2400958"/>
+          <a:off x="236219" y="2245690"/>
           <a:ext cx="11719561" cy="3606800"/>
         </p:xfrm>
         <a:graphic>
@@ -20053,7 +20227,7 @@
                       <a:pPr algn="ctr"/>
                       <a:r>
                         <a:rPr lang="en-US" dirty="0"/>
-                        <a:t>Flight Path Angle (Deg)</a:t>
+                        <a:t>Heading (Deg)</a:t>
                       </a:r>
                     </a:p>
                   </a:txBody>
@@ -20067,7 +20241,7 @@
                       <a:pPr algn="ctr"/>
                       <a:r>
                         <a:rPr lang="en-US" dirty="0"/>
-                        <a:t>Heading</a:t>
+                        <a:t>Flight Path Angle</a:t>
                       </a:r>
                     </a:p>
                     <a:p>
@@ -20116,11 +20290,11 @@
                           <a:ea typeface="+mn-ea"/>
                           <a:cs typeface="+mn-cs"/>
                         </a:rPr>
-                        <a:t>36.21510115</a:t>
+                        <a:t>36.23111</a:t>
                       </a:r>
                     </a:p>
                   </a:txBody>
-                  <a:tcPr marL="9525" marR="9525" marT="9525" marB="0" anchor="ctr"/>
+                  <a:tcPr marL="9525" marR="9525" marT="9525" marB="0" anchor="b"/>
                 </a:tc>
                 <a:tc>
                   <a:txBody>
@@ -20129,7 +20303,7 @@
                     <a:p>
                       <a:pPr marL="0" algn="ctr" defTabSz="914400" rtl="0" eaLnBrk="1" fontAlgn="b" latinLnBrk="0" hangingPunct="1"/>
                       <a:r>
-                        <a:rPr lang="en-US" sz="1800" kern="1200" dirty="0">
+                        <a:rPr lang="en-US" sz="1800" kern="1200">
                           <a:solidFill>
                             <a:schemeClr val="dk1"/>
                           </a:solidFill>
@@ -20137,53 +20311,11 @@
                           <a:ea typeface="+mn-ea"/>
                           <a:cs typeface="+mn-cs"/>
                         </a:rPr>
-                        <a:t>-112.2566317</a:t>
+                        <a:t>-112.27017</a:t>
                       </a:r>
                     </a:p>
                   </a:txBody>
-                  <a:tcPr marL="9525" marR="9525" marT="9525" marB="0" anchor="ctr"/>
-                </a:tc>
-                <a:tc>
-                  <a:txBody>
-                    <a:bodyPr/>
-                    <a:lstStyle/>
-                    <a:p>
-                      <a:pPr algn="ctr"/>
-                      <a:r>
-                        <a:rPr lang="en-US" dirty="0"/>
-                        <a:t>10381</a:t>
-                      </a:r>
-                    </a:p>
-                  </a:txBody>
-                  <a:tcPr anchor="ctr"/>
-                </a:tc>
-                <a:tc>
-                  <a:txBody>
-                    <a:bodyPr/>
-                    <a:lstStyle/>
-                    <a:p>
-                      <a:pPr algn="ctr"/>
-                      <a:r>
-                        <a:rPr lang="en-US" dirty="0"/>
-                        <a:t>133</a:t>
-                      </a:r>
-                    </a:p>
-                  </a:txBody>
-                  <a:tcPr anchor="ctr"/>
-                </a:tc>
-                <a:tc>
-                  <a:txBody>
-                    <a:bodyPr/>
-                    <a:lstStyle/>
-                    <a:p>
-                      <a:pPr algn="ctr"/>
-                      <a:r>
-                        <a:rPr lang="en-US" dirty="0"/>
-                        <a:t>10</a:t>
-                      </a:r>
-                    </a:p>
-                  </a:txBody>
-                  <a:tcPr anchor="ctr"/>
+                  <a:tcPr marL="9525" marR="9525" marT="9525" marB="0" anchor="b"/>
                 </a:tc>
                 <a:tc>
                   <a:txBody>
@@ -20192,7 +20324,7 @@
                     <a:p>
                       <a:pPr marL="0" algn="ctr" defTabSz="914400" rtl="0" eaLnBrk="1" fontAlgn="b" latinLnBrk="0" hangingPunct="1"/>
                       <a:r>
-                        <a:rPr lang="en-US" sz="1800" kern="1200" dirty="0">
+                        <a:rPr lang="en-US" sz="1800" kern="1200">
                           <a:solidFill>
                             <a:schemeClr val="dk1"/>
                           </a:solidFill>
@@ -20200,11 +20332,74 @@
                           <a:ea typeface="+mn-ea"/>
                           <a:cs typeface="+mn-cs"/>
                         </a:rPr>
-                        <a:t>184</a:t>
+                        <a:t>8525.751</a:t>
                       </a:r>
                     </a:p>
                   </a:txBody>
-                  <a:tcPr marL="9525" marR="9525" marT="9525" marB="0" anchor="ctr"/>
+                  <a:tcPr marL="9525" marR="9525" marT="9525" marB="0" anchor="b"/>
+                </a:tc>
+                <a:tc>
+                  <a:txBody>
+                    <a:bodyPr/>
+                    <a:lstStyle/>
+                    <a:p>
+                      <a:pPr marL="0" algn="ctr" defTabSz="914400" rtl="0" eaLnBrk="1" fontAlgn="b" latinLnBrk="0" hangingPunct="1"/>
+                      <a:r>
+                        <a:rPr lang="en-US" sz="1800" kern="1200">
+                          <a:solidFill>
+                            <a:schemeClr val="dk1"/>
+                          </a:solidFill>
+                          <a:latin typeface="+mn-lt"/>
+                          <a:ea typeface="+mn-ea"/>
+                          <a:cs typeface="+mn-cs"/>
+                        </a:rPr>
+                        <a:t>80.058</a:t>
+                      </a:r>
+                    </a:p>
+                  </a:txBody>
+                  <a:tcPr marL="9525" marR="9525" marT="9525" marB="0" anchor="b"/>
+                </a:tc>
+                <a:tc>
+                  <a:txBody>
+                    <a:bodyPr/>
+                    <a:lstStyle/>
+                    <a:p>
+                      <a:pPr marL="0" algn="ctr" defTabSz="914400" rtl="0" eaLnBrk="1" fontAlgn="b" latinLnBrk="0" hangingPunct="1"/>
+                      <a:r>
+                        <a:rPr lang="en-US" sz="1800" kern="1200">
+                          <a:solidFill>
+                            <a:schemeClr val="dk1"/>
+                          </a:solidFill>
+                          <a:latin typeface="+mn-lt"/>
+                          <a:ea typeface="+mn-ea"/>
+                          <a:cs typeface="+mn-cs"/>
+                        </a:rPr>
+                        <a:t>182.888</a:t>
+                      </a:r>
+                    </a:p>
+                  </a:txBody>
+                  <a:tcPr marL="9525" marR="9525" marT="9525" marB="0" anchor="b"/>
+                </a:tc>
+                <a:tc>
+                  <a:txBody>
+                    <a:bodyPr/>
+                    <a:lstStyle/>
+                    <a:p>
+                      <a:pPr marL="0" algn="ctr" defTabSz="914400" rtl="0" eaLnBrk="1" fontAlgn="b" latinLnBrk="0" hangingPunct="1"/>
+                      <a:r>
+                        <a:rPr lang="en-US" sz="1800" kern="1200">
+                          <a:solidFill>
+                            <a:schemeClr val="dk1"/>
+                          </a:solidFill>
+                          <a:latin typeface="+mn-lt"/>
+                          <a:ea typeface="+mn-ea"/>
+                          <a:cs typeface="+mn-cs"/>
+                        </a:rPr>
+                        <a:t>10.00212</a:t>
+                      </a:r>
+                    </a:p>
+                  </a:txBody>
+                  <a:tcPr marL="9525" marR="9525" marT="9525" marB="0" anchor="b"/>
                 </a:tc>
                 <a:extLst>
                   <a:ext uri="{0D108BD9-81ED-4DB2-BD59-A6C34878D82A}">
@@ -20242,11 +20437,11 @@
                           <a:ea typeface="+mn-ea"/>
                           <a:cs typeface="+mn-cs"/>
                         </a:rPr>
-                        <a:t>36.25390053</a:t>
+                        <a:t>36.25135</a:t>
                       </a:r>
                     </a:p>
                   </a:txBody>
-                  <a:tcPr marL="9525" marR="9525" marT="9525" marB="0" anchor="ctr"/>
+                  <a:tcPr marL="9525" marR="9525" marT="9525" marB="0" anchor="b"/>
                 </a:tc>
                 <a:tc>
                   <a:txBody>
@@ -20263,53 +20458,11 @@
                           <a:ea typeface="+mn-ea"/>
                           <a:cs typeface="+mn-cs"/>
                         </a:rPr>
-                        <a:t>-112.2313545</a:t>
+                        <a:t>-112.24750</a:t>
                       </a:r>
                     </a:p>
                   </a:txBody>
-                  <a:tcPr marL="9525" marR="9525" marT="9525" marB="0" anchor="ctr"/>
-                </a:tc>
-                <a:tc>
-                  <a:txBody>
-                    <a:bodyPr/>
-                    <a:lstStyle/>
-                    <a:p>
-                      <a:pPr algn="ctr"/>
-                      <a:r>
-                        <a:rPr lang="en-US" dirty="0"/>
-                        <a:t>9984</a:t>
-                      </a:r>
-                    </a:p>
-                  </a:txBody>
-                  <a:tcPr anchor="ctr"/>
-                </a:tc>
-                <a:tc>
-                  <a:txBody>
-                    <a:bodyPr/>
-                    <a:lstStyle/>
-                    <a:p>
-                      <a:pPr algn="ctr"/>
-                      <a:r>
-                        <a:rPr lang="en-US" dirty="0"/>
-                        <a:t>154</a:t>
-                      </a:r>
-                    </a:p>
-                  </a:txBody>
-                  <a:tcPr anchor="ctr"/>
-                </a:tc>
-                <a:tc>
-                  <a:txBody>
-                    <a:bodyPr/>
-                    <a:lstStyle/>
-                    <a:p>
-                      <a:pPr algn="ctr"/>
-                      <a:r>
-                        <a:rPr lang="en-US" dirty="0"/>
-                        <a:t>10</a:t>
-                      </a:r>
-                    </a:p>
-                  </a:txBody>
-                  <a:tcPr anchor="ctr"/>
+                  <a:tcPr marL="9525" marR="9525" marT="9525" marB="0" anchor="b"/>
                 </a:tc>
                 <a:tc>
                   <a:txBody>
@@ -20318,7 +20471,7 @@
                     <a:p>
                       <a:pPr marL="0" algn="ctr" defTabSz="914400" rtl="0" eaLnBrk="1" fontAlgn="b" latinLnBrk="0" hangingPunct="1"/>
                       <a:r>
-                        <a:rPr lang="en-US" sz="1800" kern="1200" dirty="0">
+                        <a:rPr lang="en-US" sz="1800" kern="1200">
                           <a:solidFill>
                             <a:schemeClr val="dk1"/>
                           </a:solidFill>
@@ -20326,11 +20479,74 @@
                           <a:ea typeface="+mn-ea"/>
                           <a:cs typeface="+mn-cs"/>
                         </a:rPr>
-                        <a:t>100</a:t>
+                        <a:t>9046.887</a:t>
                       </a:r>
                     </a:p>
                   </a:txBody>
-                  <a:tcPr marL="9525" marR="9525" marT="9525" marB="0" anchor="ctr"/>
+                  <a:tcPr marL="9525" marR="9525" marT="9525" marB="0" anchor="b"/>
+                </a:tc>
+                <a:tc>
+                  <a:txBody>
+                    <a:bodyPr/>
+                    <a:lstStyle/>
+                    <a:p>
+                      <a:pPr marL="0" algn="ctr" defTabSz="914400" rtl="0" eaLnBrk="1" fontAlgn="b" latinLnBrk="0" hangingPunct="1"/>
+                      <a:r>
+                        <a:rPr lang="en-US" sz="1800" kern="1200">
+                          <a:solidFill>
+                            <a:schemeClr val="dk1"/>
+                          </a:solidFill>
+                          <a:latin typeface="+mn-lt"/>
+                          <a:ea typeface="+mn-ea"/>
+                          <a:cs typeface="+mn-cs"/>
+                        </a:rPr>
+                        <a:t>106.007</a:t>
+                      </a:r>
+                    </a:p>
+                  </a:txBody>
+                  <a:tcPr marL="9525" marR="9525" marT="9525" marB="0" anchor="b"/>
+                </a:tc>
+                <a:tc>
+                  <a:txBody>
+                    <a:bodyPr/>
+                    <a:lstStyle/>
+                    <a:p>
+                      <a:pPr marL="0" algn="ctr" defTabSz="914400" rtl="0" eaLnBrk="1" fontAlgn="b" latinLnBrk="0" hangingPunct="1"/>
+                      <a:r>
+                        <a:rPr lang="en-US" sz="1800" kern="1200">
+                          <a:solidFill>
+                            <a:schemeClr val="dk1"/>
+                          </a:solidFill>
+                          <a:latin typeface="+mn-lt"/>
+                          <a:ea typeface="+mn-ea"/>
+                          <a:cs typeface="+mn-cs"/>
+                        </a:rPr>
+                        <a:t>99.566</a:t>
+                      </a:r>
+                    </a:p>
+                  </a:txBody>
+                  <a:tcPr marL="9525" marR="9525" marT="9525" marB="0" anchor="b"/>
+                </a:tc>
+                <a:tc>
+                  <a:txBody>
+                    <a:bodyPr/>
+                    <a:lstStyle/>
+                    <a:p>
+                      <a:pPr marL="0" algn="ctr" defTabSz="914400" rtl="0" eaLnBrk="1" fontAlgn="b" latinLnBrk="0" hangingPunct="1"/>
+                      <a:r>
+                        <a:rPr lang="en-US" sz="1800" kern="1200">
+                          <a:solidFill>
+                            <a:schemeClr val="dk1"/>
+                          </a:solidFill>
+                          <a:latin typeface="+mn-lt"/>
+                          <a:ea typeface="+mn-ea"/>
+                          <a:cs typeface="+mn-cs"/>
+                        </a:rPr>
+                        <a:t>10.00093</a:t>
+                      </a:r>
+                    </a:p>
+                  </a:txBody>
+                  <a:tcPr marL="9525" marR="9525" marT="9525" marB="0" anchor="b"/>
                 </a:tc>
                 <a:extLst>
                   <a:ext uri="{0D108BD9-81ED-4DB2-BD59-A6C34878D82A}">
@@ -20368,11 +20584,11 @@
                           <a:ea typeface="+mn-ea"/>
                           <a:cs typeface="+mn-cs"/>
                         </a:rPr>
-                        <a:t>36.23337724</a:t>
+                        <a:t>36.23797</a:t>
                       </a:r>
                     </a:p>
                   </a:txBody>
-                  <a:tcPr marL="9525" marR="9525" marT="9525" marB="0" anchor="ctr"/>
+                  <a:tcPr marL="9525" marR="9525" marT="9525" marB="0" anchor="b"/>
                 </a:tc>
                 <a:tc>
                   <a:txBody>
@@ -20389,53 +20605,11 @@
                           <a:ea typeface="+mn-ea"/>
                           <a:cs typeface="+mn-cs"/>
                         </a:rPr>
-                        <a:t>-112.2970773</a:t>
+                        <a:t>-112.29225</a:t>
                       </a:r>
                     </a:p>
                   </a:txBody>
-                  <a:tcPr marL="9525" marR="9525" marT="9525" marB="0" anchor="ctr"/>
-                </a:tc>
-                <a:tc>
-                  <a:txBody>
-                    <a:bodyPr/>
-                    <a:lstStyle/>
-                    <a:p>
-                      <a:pPr algn="ctr"/>
-                      <a:r>
-                        <a:rPr lang="en-US" dirty="0"/>
-                        <a:t>9206</a:t>
-                      </a:r>
-                    </a:p>
-                  </a:txBody>
-                  <a:tcPr anchor="ctr"/>
-                </a:tc>
-                <a:tc>
-                  <a:txBody>
-                    <a:bodyPr/>
-                    <a:lstStyle/>
-                    <a:p>
-                      <a:pPr algn="ctr"/>
-                      <a:r>
-                        <a:rPr lang="en-US" dirty="0"/>
-                        <a:t>137</a:t>
-                      </a:r>
-                    </a:p>
-                  </a:txBody>
-                  <a:tcPr anchor="ctr"/>
-                </a:tc>
-                <a:tc>
-                  <a:txBody>
-                    <a:bodyPr/>
-                    <a:lstStyle/>
-                    <a:p>
-                      <a:pPr algn="ctr"/>
-                      <a:r>
-                        <a:rPr lang="en-US" dirty="0"/>
-                        <a:t>10</a:t>
-                      </a:r>
-                    </a:p>
-                  </a:txBody>
-                  <a:tcPr anchor="ctr"/>
+                  <a:tcPr marL="9525" marR="9525" marT="9525" marB="0" anchor="b"/>
                 </a:tc>
                 <a:tc>
                   <a:txBody>
@@ -20452,11 +20626,74 @@
                           <a:ea typeface="+mn-ea"/>
                           <a:cs typeface="+mn-cs"/>
                         </a:rPr>
-                        <a:t>269</a:t>
+                        <a:t>8535.040</a:t>
                       </a:r>
                     </a:p>
                   </a:txBody>
-                  <a:tcPr marL="9525" marR="9525" marT="9525" marB="0" anchor="ctr"/>
+                  <a:tcPr marL="9525" marR="9525" marT="9525" marB="0" anchor="b"/>
+                </a:tc>
+                <a:tc>
+                  <a:txBody>
+                    <a:bodyPr/>
+                    <a:lstStyle/>
+                    <a:p>
+                      <a:pPr marL="0" algn="ctr" defTabSz="914400" rtl="0" eaLnBrk="1" fontAlgn="b" latinLnBrk="0" hangingPunct="1"/>
+                      <a:r>
+                        <a:rPr lang="en-US" sz="1800" kern="1200">
+                          <a:solidFill>
+                            <a:schemeClr val="dk1"/>
+                          </a:solidFill>
+                          <a:latin typeface="+mn-lt"/>
+                          <a:ea typeface="+mn-ea"/>
+                          <a:cs typeface="+mn-cs"/>
+                        </a:rPr>
+                        <a:t>96.050</a:t>
+                      </a:r>
+                    </a:p>
+                  </a:txBody>
+                  <a:tcPr marL="9525" marR="9525" marT="9525" marB="0" anchor="b"/>
+                </a:tc>
+                <a:tc>
+                  <a:txBody>
+                    <a:bodyPr/>
+                    <a:lstStyle/>
+                    <a:p>
+                      <a:pPr marL="0" algn="ctr" defTabSz="914400" rtl="0" eaLnBrk="1" fontAlgn="b" latinLnBrk="0" hangingPunct="1"/>
+                      <a:r>
+                        <a:rPr lang="en-US" sz="1800" kern="1200">
+                          <a:solidFill>
+                            <a:schemeClr val="dk1"/>
+                          </a:solidFill>
+                          <a:latin typeface="+mn-lt"/>
+                          <a:ea typeface="+mn-ea"/>
+                          <a:cs typeface="+mn-cs"/>
+                        </a:rPr>
+                        <a:t>268.649</a:t>
+                      </a:r>
+                    </a:p>
+                  </a:txBody>
+                  <a:tcPr marL="9525" marR="9525" marT="9525" marB="0" anchor="b"/>
+                </a:tc>
+                <a:tc>
+                  <a:txBody>
+                    <a:bodyPr/>
+                    <a:lstStyle/>
+                    <a:p>
+                      <a:pPr marL="0" algn="ctr" defTabSz="914400" rtl="0" eaLnBrk="1" fontAlgn="b" latinLnBrk="0" hangingPunct="1"/>
+                      <a:r>
+                        <a:rPr lang="en-US" sz="1800" kern="1200">
+                          <a:solidFill>
+                            <a:schemeClr val="dk1"/>
+                          </a:solidFill>
+                          <a:latin typeface="+mn-lt"/>
+                          <a:ea typeface="+mn-ea"/>
+                          <a:cs typeface="+mn-cs"/>
+                        </a:rPr>
+                        <a:t>10.01889</a:t>
+                      </a:r>
+                    </a:p>
+                  </a:txBody>
+                  <a:tcPr marL="9525" marR="9525" marT="9525" marB="0" anchor="b"/>
                 </a:tc>
                 <a:extLst>
                   <a:ext uri="{0D108BD9-81ED-4DB2-BD59-A6C34878D82A}">
@@ -20494,11 +20731,11 @@
                           <a:ea typeface="+mn-ea"/>
                           <a:cs typeface="+mn-cs"/>
                         </a:rPr>
-                        <a:t>36.26930124</a:t>
+                        <a:t>36.26619</a:t>
                       </a:r>
                     </a:p>
                   </a:txBody>
-                  <a:tcPr marL="9525" marR="9525" marT="9525" marB="0" anchor="ctr"/>
+                  <a:tcPr marL="9525" marR="9525" marT="9525" marB="0" anchor="b"/>
                 </a:tc>
                 <a:tc>
                   <a:txBody>
@@ -20515,53 +20752,11 @@
                           <a:ea typeface="+mn-ea"/>
                           <a:cs typeface="+mn-cs"/>
                         </a:rPr>
-                        <a:t>-112.2814132</a:t>
+                        <a:t>-112.28151</a:t>
                       </a:r>
                     </a:p>
                   </a:txBody>
-                  <a:tcPr marL="9525" marR="9525" marT="9525" marB="0" anchor="ctr"/>
-                </a:tc>
-                <a:tc>
-                  <a:txBody>
-                    <a:bodyPr/>
-                    <a:lstStyle/>
-                    <a:p>
-                      <a:pPr algn="ctr"/>
-                      <a:r>
-                        <a:rPr lang="en-US" dirty="0"/>
-                        <a:t>8628</a:t>
-                      </a:r>
-                    </a:p>
-                  </a:txBody>
-                  <a:tcPr anchor="ctr"/>
-                </a:tc>
-                <a:tc>
-                  <a:txBody>
-                    <a:bodyPr/>
-                    <a:lstStyle/>
-                    <a:p>
-                      <a:pPr algn="ctr"/>
-                      <a:r>
-                        <a:rPr lang="en-US" dirty="0"/>
-                        <a:t>91</a:t>
-                      </a:r>
-                    </a:p>
-                  </a:txBody>
-                  <a:tcPr anchor="ctr"/>
-                </a:tc>
-                <a:tc>
-                  <a:txBody>
-                    <a:bodyPr/>
-                    <a:lstStyle/>
-                    <a:p>
-                      <a:pPr algn="ctr"/>
-                      <a:r>
-                        <a:rPr lang="en-US" dirty="0"/>
-                        <a:t>10</a:t>
-                      </a:r>
-                    </a:p>
-                  </a:txBody>
-                  <a:tcPr anchor="ctr"/>
+                  <a:tcPr marL="9525" marR="9525" marT="9525" marB="0" anchor="b"/>
                 </a:tc>
                 <a:tc>
                   <a:txBody>
@@ -20570,7 +20765,7 @@
                     <a:p>
                       <a:pPr marL="0" algn="ctr" defTabSz="914400" rtl="0" eaLnBrk="1" fontAlgn="b" latinLnBrk="0" hangingPunct="1"/>
                       <a:r>
-                        <a:rPr lang="en-US" sz="1800" kern="1200" dirty="0">
+                        <a:rPr lang="en-US" sz="1800" kern="1200">
                           <a:solidFill>
                             <a:schemeClr val="dk1"/>
                           </a:solidFill>
@@ -20578,11 +20773,74 @@
                           <a:ea typeface="+mn-ea"/>
                           <a:cs typeface="+mn-cs"/>
                         </a:rPr>
-                        <a:t>2</a:t>
+                        <a:t>8425.689</a:t>
                       </a:r>
                     </a:p>
                   </a:txBody>
-                  <a:tcPr marL="9525" marR="9525" marT="9525" marB="0" anchor="ctr"/>
+                  <a:tcPr marL="9525" marR="9525" marT="9525" marB="0" anchor="b"/>
+                </a:tc>
+                <a:tc>
+                  <a:txBody>
+                    <a:bodyPr/>
+                    <a:lstStyle/>
+                    <a:p>
+                      <a:pPr marL="0" algn="ctr" defTabSz="914400" rtl="0" eaLnBrk="1" fontAlgn="b" latinLnBrk="0" hangingPunct="1"/>
+                      <a:r>
+                        <a:rPr lang="en-US" sz="1800" kern="1200">
+                          <a:solidFill>
+                            <a:schemeClr val="dk1"/>
+                          </a:solidFill>
+                          <a:latin typeface="+mn-lt"/>
+                          <a:ea typeface="+mn-ea"/>
+                          <a:cs typeface="+mn-cs"/>
+                        </a:rPr>
+                        <a:t>80.023</a:t>
+                      </a:r>
+                    </a:p>
+                  </a:txBody>
+                  <a:tcPr marL="9525" marR="9525" marT="9525" marB="0" anchor="b"/>
+                </a:tc>
+                <a:tc>
+                  <a:txBody>
+                    <a:bodyPr/>
+                    <a:lstStyle/>
+                    <a:p>
+                      <a:pPr marL="0" algn="ctr" defTabSz="914400" rtl="0" eaLnBrk="1" fontAlgn="b" latinLnBrk="0" hangingPunct="1"/>
+                      <a:r>
+                        <a:rPr lang="en-US" sz="1800" kern="1200">
+                          <a:solidFill>
+                            <a:schemeClr val="dk1"/>
+                          </a:solidFill>
+                          <a:latin typeface="+mn-lt"/>
+                          <a:ea typeface="+mn-ea"/>
+                          <a:cs typeface="+mn-cs"/>
+                        </a:rPr>
+                        <a:t>1.920</a:t>
+                      </a:r>
+                    </a:p>
+                  </a:txBody>
+                  <a:tcPr marL="9525" marR="9525" marT="9525" marB="0" anchor="b"/>
+                </a:tc>
+                <a:tc>
+                  <a:txBody>
+                    <a:bodyPr/>
+                    <a:lstStyle/>
+                    <a:p>
+                      <a:pPr marL="0" algn="ctr" defTabSz="914400" rtl="0" eaLnBrk="1" fontAlgn="b" latinLnBrk="0" hangingPunct="1"/>
+                      <a:r>
+                        <a:rPr lang="en-US" sz="1800" kern="1200">
+                          <a:solidFill>
+                            <a:schemeClr val="dk1"/>
+                          </a:solidFill>
+                          <a:latin typeface="+mn-lt"/>
+                          <a:ea typeface="+mn-ea"/>
+                          <a:cs typeface="+mn-cs"/>
+                        </a:rPr>
+                        <a:t>9.999995</a:t>
+                      </a:r>
+                    </a:p>
+                  </a:txBody>
+                  <a:tcPr marL="9525" marR="9525" marT="9525" marB="0" anchor="b"/>
                 </a:tc>
                 <a:extLst>
                   <a:ext uri="{0D108BD9-81ED-4DB2-BD59-A6C34878D82A}">
@@ -20620,11 +20878,11 @@
                           <a:ea typeface="+mn-ea"/>
                           <a:cs typeface="+mn-cs"/>
                         </a:rPr>
-                        <a:t>36.22838197</a:t>
+                        <a:t>36.23514</a:t>
                       </a:r>
                     </a:p>
                   </a:txBody>
-                  <a:tcPr marL="9525" marR="9525" marT="9525" marB="0" anchor="ctr"/>
+                  <a:tcPr marL="9525" marR="9525" marT="9525" marB="0" anchor="b"/>
                 </a:tc>
                 <a:tc>
                   <a:txBody>
@@ -20641,53 +20899,32 @@
                           <a:ea typeface="+mn-ea"/>
                           <a:cs typeface="+mn-cs"/>
                         </a:rPr>
-                        <a:t>-112.2728326</a:t>
+                        <a:t>-112.27546</a:t>
                       </a:r>
                     </a:p>
                   </a:txBody>
-                  <a:tcPr marL="9525" marR="9525" marT="9525" marB="0" anchor="ctr"/>
+                  <a:tcPr marL="9525" marR="9525" marT="9525" marB="0" anchor="b"/>
                 </a:tc>
                 <a:tc>
                   <a:txBody>
                     <a:bodyPr/>
                     <a:lstStyle/>
                     <a:p>
-                      <a:pPr algn="ctr"/>
+                      <a:pPr marL="0" algn="ctr" defTabSz="914400" rtl="0" eaLnBrk="1" fontAlgn="b" latinLnBrk="0" hangingPunct="1"/>
                       <a:r>
-                        <a:rPr lang="en-US" dirty="0"/>
-                        <a:t>9074</a:t>
+                        <a:rPr lang="en-US" sz="1800" kern="1200">
+                          <a:solidFill>
+                            <a:schemeClr val="dk1"/>
+                          </a:solidFill>
+                          <a:latin typeface="+mn-lt"/>
+                          <a:ea typeface="+mn-ea"/>
+                          <a:cs typeface="+mn-cs"/>
+                        </a:rPr>
+                        <a:t>8424.269</a:t>
                       </a:r>
                     </a:p>
                   </a:txBody>
-                  <a:tcPr anchor="ctr"/>
-                </a:tc>
-                <a:tc>
-                  <a:txBody>
-                    <a:bodyPr/>
-                    <a:lstStyle/>
-                    <a:p>
-                      <a:pPr algn="ctr"/>
-                      <a:r>
-                        <a:rPr lang="en-US" dirty="0"/>
-                        <a:t>147</a:t>
-                      </a:r>
-                    </a:p>
-                  </a:txBody>
-                  <a:tcPr anchor="ctr"/>
-                </a:tc>
-                <a:tc>
-                  <a:txBody>
-                    <a:bodyPr/>
-                    <a:lstStyle/>
-                    <a:p>
-                      <a:pPr algn="ctr"/>
-                      <a:r>
-                        <a:rPr lang="en-US" dirty="0"/>
-                        <a:t>10</a:t>
-                      </a:r>
-                    </a:p>
-                  </a:txBody>
-                  <a:tcPr anchor="ctr"/>
+                  <a:tcPr marL="9525" marR="9525" marT="9525" marB="0" anchor="b"/>
                 </a:tc>
                 <a:tc>
                   <a:txBody>
@@ -20704,11 +20941,53 @@
                           <a:ea typeface="+mn-ea"/>
                           <a:cs typeface="+mn-cs"/>
                         </a:rPr>
-                        <a:t>209</a:t>
+                        <a:t>102.037</a:t>
                       </a:r>
                     </a:p>
                   </a:txBody>
-                  <a:tcPr marL="9525" marR="9525" marT="9525" marB="0" anchor="ctr"/>
+                  <a:tcPr marL="9525" marR="9525" marT="9525" marB="0" anchor="b"/>
+                </a:tc>
+                <a:tc>
+                  <a:txBody>
+                    <a:bodyPr/>
+                    <a:lstStyle/>
+                    <a:p>
+                      <a:pPr marL="0" algn="ctr" defTabSz="914400" rtl="0" eaLnBrk="1" fontAlgn="b" latinLnBrk="0" hangingPunct="1"/>
+                      <a:r>
+                        <a:rPr lang="en-US" sz="1800" kern="1200">
+                          <a:solidFill>
+                            <a:schemeClr val="dk1"/>
+                          </a:solidFill>
+                          <a:latin typeface="+mn-lt"/>
+                          <a:ea typeface="+mn-ea"/>
+                          <a:cs typeface="+mn-cs"/>
+                        </a:rPr>
+                        <a:t>208.198</a:t>
+                      </a:r>
+                    </a:p>
+                  </a:txBody>
+                  <a:tcPr marL="9525" marR="9525" marT="9525" marB="0" anchor="b"/>
+                </a:tc>
+                <a:tc>
+                  <a:txBody>
+                    <a:bodyPr/>
+                    <a:lstStyle/>
+                    <a:p>
+                      <a:pPr marL="0" algn="ctr" defTabSz="914400" rtl="0" eaLnBrk="1" fontAlgn="b" latinLnBrk="0" hangingPunct="1"/>
+                      <a:r>
+                        <a:rPr lang="en-US" sz="1800" kern="1200">
+                          <a:solidFill>
+                            <a:schemeClr val="dk1"/>
+                          </a:solidFill>
+                          <a:latin typeface="+mn-lt"/>
+                          <a:ea typeface="+mn-ea"/>
+                          <a:cs typeface="+mn-cs"/>
+                        </a:rPr>
+                        <a:t>10.02664</a:t>
+                      </a:r>
+                    </a:p>
+                  </a:txBody>
+                  <a:tcPr marL="9525" marR="9525" marT="9525" marB="0" anchor="b"/>
                 </a:tc>
                 <a:extLst>
                   <a:ext uri="{0D108BD9-81ED-4DB2-BD59-A6C34878D82A}">
@@ -20746,11 +21025,74 @@
                           <a:ea typeface="+mn-ea"/>
                           <a:cs typeface="+mn-cs"/>
                         </a:rPr>
-                        <a:t>36.26172295</a:t>
+                        <a:t>36.25800</a:t>
                       </a:r>
                     </a:p>
                   </a:txBody>
-                  <a:tcPr marL="9525" marR="9525" marT="9525" marB="0" anchor="ctr"/>
+                  <a:tcPr marL="9525" marR="9525" marT="9525" marB="0" anchor="b"/>
+                </a:tc>
+                <a:tc>
+                  <a:txBody>
+                    <a:bodyPr/>
+                    <a:lstStyle/>
+                    <a:p>
+                      <a:pPr marL="0" algn="ctr" defTabSz="914400" rtl="0" eaLnBrk="1" fontAlgn="b" latinLnBrk="0" hangingPunct="1"/>
+                      <a:r>
+                        <a:rPr lang="en-US" sz="1800" kern="1200">
+                          <a:solidFill>
+                            <a:schemeClr val="dk1"/>
+                          </a:solidFill>
+                          <a:latin typeface="+mn-lt"/>
+                          <a:ea typeface="+mn-ea"/>
+                          <a:cs typeface="+mn-cs"/>
+                        </a:rPr>
+                        <a:t>-112.26417</a:t>
+                      </a:r>
+                    </a:p>
+                  </a:txBody>
+                  <a:tcPr marL="9525" marR="9525" marT="9525" marB="0" anchor="b"/>
+                </a:tc>
+                <a:tc>
+                  <a:txBody>
+                    <a:bodyPr/>
+                    <a:lstStyle/>
+                    <a:p>
+                      <a:pPr marL="0" algn="ctr" defTabSz="914400" rtl="0" eaLnBrk="1" fontAlgn="b" latinLnBrk="0" hangingPunct="1"/>
+                      <a:r>
+                        <a:rPr lang="en-US" sz="1800" kern="1200">
+                          <a:solidFill>
+                            <a:schemeClr val="dk1"/>
+                          </a:solidFill>
+                          <a:latin typeface="+mn-lt"/>
+                          <a:ea typeface="+mn-ea"/>
+                          <a:cs typeface="+mn-cs"/>
+                        </a:rPr>
+                        <a:t>8195.515</a:t>
+                      </a:r>
+                    </a:p>
+                  </a:txBody>
+                  <a:tcPr marL="9525" marR="9525" marT="9525" marB="0" anchor="b"/>
+                </a:tc>
+                <a:tc>
+                  <a:txBody>
+                    <a:bodyPr/>
+                    <a:lstStyle/>
+                    <a:p>
+                      <a:pPr marL="0" algn="ctr" defTabSz="914400" rtl="0" eaLnBrk="1" fontAlgn="b" latinLnBrk="0" hangingPunct="1"/>
+                      <a:r>
+                        <a:rPr lang="en-US" sz="1800" kern="1200">
+                          <a:solidFill>
+                            <a:schemeClr val="dk1"/>
+                          </a:solidFill>
+                          <a:latin typeface="+mn-lt"/>
+                          <a:ea typeface="+mn-ea"/>
+                          <a:cs typeface="+mn-cs"/>
+                        </a:rPr>
+                        <a:t>94.866</a:t>
+                      </a:r>
+                    </a:p>
+                  </a:txBody>
+                  <a:tcPr marL="9525" marR="9525" marT="9525" marB="0" anchor="b"/>
                 </a:tc>
                 <a:tc>
                   <a:txBody>
@@ -20767,53 +21109,11 @@
                           <a:ea typeface="+mn-ea"/>
                           <a:cs typeface="+mn-cs"/>
                         </a:rPr>
-                        <a:t>-112.25623</a:t>
+                        <a:t>82.316</a:t>
                       </a:r>
                     </a:p>
                   </a:txBody>
-                  <a:tcPr marL="9525" marR="9525" marT="9525" marB="0" anchor="ctr"/>
-                </a:tc>
-                <a:tc>
-                  <a:txBody>
-                    <a:bodyPr/>
-                    <a:lstStyle/>
-                    <a:p>
-                      <a:pPr algn="ctr"/>
-                      <a:r>
-                        <a:rPr lang="en-US" dirty="0"/>
-                        <a:t>8719</a:t>
-                      </a:r>
-                    </a:p>
-                  </a:txBody>
-                  <a:tcPr anchor="ctr"/>
-                </a:tc>
-                <a:tc>
-                  <a:txBody>
-                    <a:bodyPr/>
-                    <a:lstStyle/>
-                    <a:p>
-                      <a:pPr algn="ctr"/>
-                      <a:r>
-                        <a:rPr lang="en-US" dirty="0"/>
-                        <a:t>135</a:t>
-                      </a:r>
-                    </a:p>
-                  </a:txBody>
-                  <a:tcPr anchor="ctr"/>
-                </a:tc>
-                <a:tc>
-                  <a:txBody>
-                    <a:bodyPr/>
-                    <a:lstStyle/>
-                    <a:p>
-                      <a:pPr algn="ctr"/>
-                      <a:r>
-                        <a:rPr lang="en-US" dirty="0"/>
-                        <a:t>10</a:t>
-                      </a:r>
-                    </a:p>
-                  </a:txBody>
-                  <a:tcPr anchor="ctr"/>
+                  <a:tcPr marL="9525" marR="9525" marT="9525" marB="0" anchor="b"/>
                 </a:tc>
                 <a:tc>
                   <a:txBody>
@@ -20822,7 +21122,7 @@
                     <a:p>
                       <a:pPr marL="0" algn="ctr" defTabSz="914400" rtl="0" eaLnBrk="1" fontAlgn="b" latinLnBrk="0" hangingPunct="1"/>
                       <a:r>
-                        <a:rPr lang="en-US" sz="1800" kern="1200" dirty="0">
+                        <a:rPr lang="en-US" sz="1800" kern="1200">
                           <a:solidFill>
                             <a:schemeClr val="dk1"/>
                           </a:solidFill>
@@ -20830,11 +21130,11 @@
                           <a:ea typeface="+mn-ea"/>
                           <a:cs typeface="+mn-cs"/>
                         </a:rPr>
-                        <a:t>82</a:t>
+                        <a:t>10.00612</a:t>
                       </a:r>
                     </a:p>
                   </a:txBody>
-                  <a:tcPr marL="9525" marR="9525" marT="9525" marB="0" anchor="ctr"/>
+                  <a:tcPr marL="9525" marR="9525" marT="9525" marB="0" anchor="b"/>
                 </a:tc>
                 <a:extLst>
                   <a:ext uri="{0D108BD9-81ED-4DB2-BD59-A6C34878D82A}">
@@ -20872,11 +21172,74 @@
                           <a:ea typeface="+mn-ea"/>
                           <a:cs typeface="+mn-cs"/>
                         </a:rPr>
-                        <a:t>36.22297227</a:t>
+                        <a:t>36.23767</a:t>
                       </a:r>
                     </a:p>
                   </a:txBody>
-                  <a:tcPr marL="9525" marR="9525" marT="9525" marB="0" anchor="ctr"/>
+                  <a:tcPr marL="9525" marR="9525" marT="9525" marB="0" anchor="b"/>
+                </a:tc>
+                <a:tc>
+                  <a:txBody>
+                    <a:bodyPr/>
+                    <a:lstStyle/>
+                    <a:p>
+                      <a:pPr marL="0" algn="ctr" defTabSz="914400" rtl="0" eaLnBrk="1" fontAlgn="b" latinLnBrk="0" hangingPunct="1"/>
+                      <a:r>
+                        <a:rPr lang="en-US" sz="1800" kern="1200">
+                          <a:solidFill>
+                            <a:schemeClr val="dk1"/>
+                          </a:solidFill>
+                          <a:latin typeface="+mn-lt"/>
+                          <a:ea typeface="+mn-ea"/>
+                          <a:cs typeface="+mn-cs"/>
+                        </a:rPr>
+                        <a:t>-112.28039</a:t>
+                      </a:r>
+                    </a:p>
+                  </a:txBody>
+                  <a:tcPr marL="9525" marR="9525" marT="9525" marB="0" anchor="b"/>
+                </a:tc>
+                <a:tc>
+                  <a:txBody>
+                    <a:bodyPr/>
+                    <a:lstStyle/>
+                    <a:p>
+                      <a:pPr marL="0" algn="ctr" defTabSz="914400" rtl="0" eaLnBrk="1" fontAlgn="b" latinLnBrk="0" hangingPunct="1"/>
+                      <a:r>
+                        <a:rPr lang="en-US" sz="1800" kern="1200">
+                          <a:solidFill>
+                            <a:schemeClr val="dk1"/>
+                          </a:solidFill>
+                          <a:latin typeface="+mn-lt"/>
+                          <a:ea typeface="+mn-ea"/>
+                          <a:cs typeface="+mn-cs"/>
+                        </a:rPr>
+                        <a:t>8077.037</a:t>
+                      </a:r>
+                    </a:p>
+                  </a:txBody>
+                  <a:tcPr marL="9525" marR="9525" marT="9525" marB="0" anchor="b"/>
+                </a:tc>
+                <a:tc>
+                  <a:txBody>
+                    <a:bodyPr/>
+                    <a:lstStyle/>
+                    <a:p>
+                      <a:pPr marL="0" algn="ctr" defTabSz="914400" rtl="0" eaLnBrk="1" fontAlgn="b" latinLnBrk="0" hangingPunct="1"/>
+                      <a:r>
+                        <a:rPr lang="en-US" sz="1800" kern="1200">
+                          <a:solidFill>
+                            <a:schemeClr val="dk1"/>
+                          </a:solidFill>
+                          <a:latin typeface="+mn-lt"/>
+                          <a:ea typeface="+mn-ea"/>
+                          <a:cs typeface="+mn-cs"/>
+                        </a:rPr>
+                        <a:t>84.689</a:t>
+                      </a:r>
+                    </a:p>
+                  </a:txBody>
+                  <a:tcPr marL="9525" marR="9525" marT="9525" marB="0" anchor="b"/>
                 </a:tc>
                 <a:tc>
                   <a:txBody>
@@ -20893,53 +21256,11 @@
                           <a:ea typeface="+mn-ea"/>
                           <a:cs typeface="+mn-cs"/>
                         </a:rPr>
-                        <a:t>-112.2800674</a:t>
+                        <a:t>225.048</a:t>
                       </a:r>
                     </a:p>
                   </a:txBody>
-                  <a:tcPr marL="9525" marR="9525" marT="9525" marB="0" anchor="ctr"/>
-                </a:tc>
-                <a:tc>
-                  <a:txBody>
-                    <a:bodyPr/>
-                    <a:lstStyle/>
-                    <a:p>
-                      <a:pPr algn="ctr"/>
-                      <a:r>
-                        <a:rPr lang="en-US" dirty="0"/>
-                        <a:t>9447</a:t>
-                      </a:r>
-                    </a:p>
-                  </a:txBody>
-                  <a:tcPr anchor="ctr"/>
-                </a:tc>
-                <a:tc>
-                  <a:txBody>
-                    <a:bodyPr/>
-                    <a:lstStyle/>
-                    <a:p>
-                      <a:pPr algn="ctr"/>
-                      <a:r>
-                        <a:rPr lang="en-US" dirty="0"/>
-                        <a:t>185</a:t>
-                      </a:r>
-                    </a:p>
-                  </a:txBody>
-                  <a:tcPr anchor="ctr"/>
-                </a:tc>
-                <a:tc>
-                  <a:txBody>
-                    <a:bodyPr/>
-                    <a:lstStyle/>
-                    <a:p>
-                      <a:pPr algn="ctr"/>
-                      <a:r>
-                        <a:rPr lang="en-US" dirty="0"/>
-                        <a:t>10</a:t>
-                      </a:r>
-                    </a:p>
-                  </a:txBody>
-                  <a:tcPr anchor="ctr"/>
+                  <a:tcPr marL="9525" marR="9525" marT="9525" marB="0" anchor="b"/>
                 </a:tc>
                 <a:tc>
                   <a:txBody>
@@ -20948,7 +21269,7 @@
                     <a:p>
                       <a:pPr marL="0" algn="ctr" defTabSz="914400" rtl="0" eaLnBrk="1" fontAlgn="b" latinLnBrk="0" hangingPunct="1"/>
                       <a:r>
-                        <a:rPr lang="en-US" sz="1800" kern="1200" dirty="0">
+                        <a:rPr lang="en-US" sz="1800" kern="1200">
                           <a:solidFill>
                             <a:schemeClr val="dk1"/>
                           </a:solidFill>
@@ -20956,11 +21277,11 @@
                           <a:ea typeface="+mn-ea"/>
                           <a:cs typeface="+mn-cs"/>
                         </a:rPr>
-                        <a:t>228</a:t>
+                        <a:t>10.03656</a:t>
                       </a:r>
                     </a:p>
                   </a:txBody>
-                  <a:tcPr marL="9525" marR="9525" marT="9525" marB="0" anchor="ctr"/>
+                  <a:tcPr marL="9525" marR="9525" marT="9525" marB="0" anchor="b"/>
                 </a:tc>
                 <a:extLst>
                   <a:ext uri="{0D108BD9-81ED-4DB2-BD59-A6C34878D82A}">
@@ -20998,11 +21319,95 @@
                           <a:ea typeface="+mn-ea"/>
                           <a:cs typeface="+mn-cs"/>
                         </a:rPr>
-                        <a:t>36.23542706</a:t>
+                        <a:t>36.23940</a:t>
                       </a:r>
                     </a:p>
                   </a:txBody>
-                  <a:tcPr marL="9525" marR="9525" marT="9525" marB="0" anchor="ctr"/>
+                  <a:tcPr marL="9525" marR="9525" marT="9525" marB="0" anchor="b"/>
+                </a:tc>
+                <a:tc>
+                  <a:txBody>
+                    <a:bodyPr/>
+                    <a:lstStyle/>
+                    <a:p>
+                      <a:pPr marL="0" algn="ctr" defTabSz="914400" rtl="0" eaLnBrk="1" fontAlgn="b" latinLnBrk="0" hangingPunct="1"/>
+                      <a:r>
+                        <a:rPr lang="en-US" sz="1800" kern="1200">
+                          <a:solidFill>
+                            <a:schemeClr val="dk1"/>
+                          </a:solidFill>
+                          <a:latin typeface="+mn-lt"/>
+                          <a:ea typeface="+mn-ea"/>
+                          <a:cs typeface="+mn-cs"/>
+                        </a:rPr>
+                        <a:t>-112.28349</a:t>
+                      </a:r>
+                    </a:p>
+                  </a:txBody>
+                  <a:tcPr marL="9525" marR="9525" marT="9525" marB="0" anchor="b"/>
+                </a:tc>
+                <a:tc>
+                  <a:txBody>
+                    <a:bodyPr/>
+                    <a:lstStyle/>
+                    <a:p>
+                      <a:pPr marL="0" algn="ctr" defTabSz="914400" rtl="0" eaLnBrk="1" fontAlgn="b" latinLnBrk="0" hangingPunct="1"/>
+                      <a:r>
+                        <a:rPr lang="en-US" sz="1800" kern="1200">
+                          <a:solidFill>
+                            <a:schemeClr val="dk1"/>
+                          </a:solidFill>
+                          <a:latin typeface="+mn-lt"/>
+                          <a:ea typeface="+mn-ea"/>
+                          <a:cs typeface="+mn-cs"/>
+                        </a:rPr>
+                        <a:t>8047.320</a:t>
+                      </a:r>
+                    </a:p>
+                  </a:txBody>
+                  <a:tcPr marL="9525" marR="9525" marT="9525" marB="0" anchor="b"/>
+                </a:tc>
+                <a:tc>
+                  <a:txBody>
+                    <a:bodyPr/>
+                    <a:lstStyle/>
+                    <a:p>
+                      <a:pPr marL="0" algn="ctr" defTabSz="914400" rtl="0" eaLnBrk="1" fontAlgn="b" latinLnBrk="0" hangingPunct="1"/>
+                      <a:r>
+                        <a:rPr lang="en-US" sz="1800" kern="1200">
+                          <a:solidFill>
+                            <a:schemeClr val="dk1"/>
+                          </a:solidFill>
+                          <a:latin typeface="+mn-lt"/>
+                          <a:ea typeface="+mn-ea"/>
+                          <a:cs typeface="+mn-cs"/>
+                        </a:rPr>
+                        <a:t>90.942</a:t>
+                      </a:r>
+                    </a:p>
+                  </a:txBody>
+                  <a:tcPr marL="9525" marR="9525" marT="9525" marB="0" anchor="b"/>
+                </a:tc>
+                <a:tc>
+                  <a:txBody>
+                    <a:bodyPr/>
+                    <a:lstStyle/>
+                    <a:p>
+                      <a:pPr marL="0" algn="ctr" defTabSz="914400" rtl="0" eaLnBrk="1" fontAlgn="b" latinLnBrk="0" hangingPunct="1"/>
+                      <a:r>
+                        <a:rPr lang="en-US" sz="1800" kern="1200">
+                          <a:solidFill>
+                            <a:schemeClr val="dk1"/>
+                          </a:solidFill>
+                          <a:latin typeface="+mn-lt"/>
+                          <a:ea typeface="+mn-ea"/>
+                          <a:cs typeface="+mn-cs"/>
+                        </a:rPr>
+                        <a:t>245.432</a:t>
+                      </a:r>
+                    </a:p>
+                  </a:txBody>
+                  <a:tcPr marL="9525" marR="9525" marT="9525" marB="0" anchor="b"/>
                 </a:tc>
                 <a:tc>
                   <a:txBody>
@@ -21019,74 +21424,11 @@
                           <a:ea typeface="+mn-ea"/>
                           <a:cs typeface="+mn-cs"/>
                         </a:rPr>
-                        <a:t>-112.2840884</a:t>
+                        <a:t>10.07828</a:t>
                       </a:r>
                     </a:p>
                   </a:txBody>
-                  <a:tcPr marL="9525" marR="9525" marT="9525" marB="0" anchor="ctr"/>
-                </a:tc>
-                <a:tc>
-                  <a:txBody>
-                    <a:bodyPr/>
-                    <a:lstStyle/>
-                    <a:p>
-                      <a:pPr algn="ctr"/>
-                      <a:r>
-                        <a:rPr lang="en-US" dirty="0"/>
-                        <a:t>8495</a:t>
-                      </a:r>
-                    </a:p>
-                  </a:txBody>
-                  <a:tcPr anchor="ctr"/>
-                </a:tc>
-                <a:tc>
-                  <a:txBody>
-                    <a:bodyPr/>
-                    <a:lstStyle/>
-                    <a:p>
-                      <a:pPr algn="ctr"/>
-                      <a:r>
-                        <a:rPr lang="en-US" dirty="0"/>
-                        <a:t>128</a:t>
-                      </a:r>
-                    </a:p>
-                  </a:txBody>
-                  <a:tcPr anchor="ctr"/>
-                </a:tc>
-                <a:tc>
-                  <a:txBody>
-                    <a:bodyPr/>
-                    <a:lstStyle/>
-                    <a:p>
-                      <a:pPr algn="ctr"/>
-                      <a:r>
-                        <a:rPr lang="en-US" dirty="0"/>
-                        <a:t>10</a:t>
-                      </a:r>
-                    </a:p>
-                  </a:txBody>
-                  <a:tcPr anchor="ctr"/>
-                </a:tc>
-                <a:tc>
-                  <a:txBody>
-                    <a:bodyPr/>
-                    <a:lstStyle/>
-                    <a:p>
-                      <a:pPr marL="0" algn="ctr" defTabSz="914400" rtl="0" eaLnBrk="1" fontAlgn="b" latinLnBrk="0" hangingPunct="1"/>
-                      <a:r>
-                        <a:rPr lang="en-US" sz="1800" kern="1200" dirty="0">
-                          <a:solidFill>
-                            <a:schemeClr val="dk1"/>
-                          </a:solidFill>
-                          <a:latin typeface="+mn-lt"/>
-                          <a:ea typeface="+mn-ea"/>
-                          <a:cs typeface="+mn-cs"/>
-                        </a:rPr>
-                        <a:t>246</a:t>
-                      </a:r>
-                    </a:p>
-                  </a:txBody>
-                  <a:tcPr marL="9525" marR="9525" marT="9525" marB="0" anchor="ctr"/>
+                  <a:tcPr marL="9525" marR="9525" marT="9525" marB="0" anchor="b"/>
                 </a:tc>
                 <a:extLst>
                   <a:ext uri="{0D108BD9-81ED-4DB2-BD59-A6C34878D82A}">
@@ -21148,7 +21490,7 @@
         </p:nvSpPr>
         <p:spPr>
           <a:xfrm>
-            <a:off x="838200" y="1825626"/>
+            <a:off x="838200" y="1670358"/>
             <a:ext cx="10515600" cy="3948158"/>
           </a:xfrm>
           <a:prstGeom prst="rect">
@@ -21448,8 +21790,8 @@
         </p:nvSpPr>
         <p:spPr>
           <a:xfrm>
-            <a:off x="838200" y="1825626"/>
-            <a:ext cx="10515600" cy="3948158"/>
+            <a:off x="838200" y="1591761"/>
+            <a:ext cx="10515600" cy="4205189"/>
           </a:xfrm>
           <a:prstGeom prst="rect">
             <a:avLst/>
@@ -21457,7 +21799,7 @@
         </p:spPr>
         <p:txBody>
           <a:bodyPr vert="horz" lIns="91440" tIns="45720" rIns="91440" bIns="45720" rtlCol="0">
-            <a:normAutofit/>
+            <a:normAutofit fontScale="85000" lnSpcReduction="20000"/>
           </a:bodyPr>
           <a:lstStyle>
             <a:lvl1pPr marL="228600" indent="-228600" algn="l" defTabSz="914400" rtl="0" eaLnBrk="1" latinLnBrk="0" hangingPunct="1">
@@ -21632,6 +21974,84 @@
               <a:t>Agent-Target Cost Matrix with Optimal Assignments</a:t>
             </a:r>
           </a:p>
+          <a:p>
+            <a:pPr marL="0" indent="0" algn="ctr">
+              <a:buNone/>
+            </a:pPr>
+            <a:endParaRPr lang="en-US" b="1" dirty="0"/>
+          </a:p>
+          <a:p>
+            <a:pPr marL="0" indent="0" algn="ctr">
+              <a:buNone/>
+            </a:pPr>
+            <a:endParaRPr lang="en-US" b="1" dirty="0"/>
+          </a:p>
+          <a:p>
+            <a:pPr marL="0" indent="0" algn="ctr">
+              <a:buNone/>
+            </a:pPr>
+            <a:endParaRPr lang="en-US" b="1" dirty="0"/>
+          </a:p>
+          <a:p>
+            <a:pPr marL="0" indent="0" algn="ctr">
+              <a:buNone/>
+            </a:pPr>
+            <a:endParaRPr lang="en-US" b="1" dirty="0"/>
+          </a:p>
+          <a:p>
+            <a:pPr marL="0" indent="0" algn="ctr">
+              <a:buNone/>
+            </a:pPr>
+            <a:endParaRPr lang="en-US" b="1" dirty="0"/>
+          </a:p>
+          <a:p>
+            <a:pPr marL="0" indent="0" algn="ctr">
+              <a:buNone/>
+            </a:pPr>
+            <a:endParaRPr lang="en-US" b="1" dirty="0"/>
+          </a:p>
+          <a:p>
+            <a:pPr marL="0" indent="0" algn="ctr">
+              <a:buNone/>
+            </a:pPr>
+            <a:endParaRPr lang="en-US" b="1" dirty="0"/>
+          </a:p>
+          <a:p>
+            <a:pPr marL="0" indent="0" algn="ctr">
+              <a:buNone/>
+            </a:pPr>
+            <a:endParaRPr lang="en-US" b="1" dirty="0"/>
+          </a:p>
+          <a:p>
+            <a:pPr marL="0" indent="0" algn="ctr">
+              <a:buNone/>
+            </a:pPr>
+            <a:endParaRPr lang="en-US" b="1" dirty="0"/>
+          </a:p>
+          <a:p>
+            <a:pPr marL="0" indent="0">
+              <a:buNone/>
+            </a:pPr>
+            <a:r>
+              <a:rPr lang="en-US" sz="2000" b="1" dirty="0"/>
+              <a:t>Total assignment cost = </a:t>
+            </a:r>
+            <a:r>
+              <a:rPr lang="en-US" sz="1800" b="1" i="0" strike="noStrike" dirty="0">
+                <a:solidFill>
+                  <a:srgbClr val="000000"/>
+                </a:solidFill>
+                <a:effectLst/>
+                <a:latin typeface="Calibri" panose="020F0502020204030204" pitchFamily="34" charset="0"/>
+              </a:rPr>
+              <a:t>20784.93</a:t>
+            </a:r>
+            <a:r>
+              <a:rPr lang="en-US" sz="1400" b="1" dirty="0"/>
+              <a:t> </a:t>
+            </a:r>
+            <a:endParaRPr lang="en-US" sz="2000" b="1" dirty="0"/>
+          </a:p>
         </p:txBody>
       </p:sp>
       <p:graphicFrame>
@@ -21650,13 +22070,13 @@
             <p:ph idx="1"/>
             <p:extLst>
               <p:ext uri="{D42A27DB-BD31-4B8C-83A1-F6EECF244321}">
-                <p14:modId xmlns:p14="http://schemas.microsoft.com/office/powerpoint/2010/main" val="3163069056"/>
+                <p14:modId xmlns:p14="http://schemas.microsoft.com/office/powerpoint/2010/main" val="257488325"/>
               </p:ext>
             </p:extLst>
           </p:nvPr>
         </p:nvGraphicFramePr>
         <p:xfrm>
-          <a:off x="838200" y="2282825"/>
+          <a:off x="838200" y="2057587"/>
           <a:ext cx="10515600" cy="3337560"/>
         </p:xfrm>
         <a:graphic>
@@ -21887,7 +22307,7 @@
                     <a:p>
                       <a:pPr algn="ctr" fontAlgn="b"/>
                       <a:r>
-                        <a:rPr lang="en-US" sz="1800" b="0" kern="1200" dirty="0">
+                        <a:rPr lang="en-US" sz="1800" kern="1200" dirty="0">
                           <a:solidFill>
                             <a:schemeClr val="dk1"/>
                           </a:solidFill>
@@ -21895,7 +22315,7 @@
                           <a:ea typeface="+mn-ea"/>
                           <a:cs typeface="+mn-cs"/>
                         </a:rPr>
-                        <a:t>1141.99</a:t>
+                        <a:t>2980.23</a:t>
                       </a:r>
                     </a:p>
                   </a:txBody>
@@ -21908,7 +22328,7 @@
                     <a:p>
                       <a:pPr algn="ctr" fontAlgn="b"/>
                       <a:r>
-                        <a:rPr lang="en-US" sz="1800" b="0" kern="1200">
+                        <a:rPr lang="en-US" sz="1800" kern="1200">
                           <a:solidFill>
                             <a:schemeClr val="dk1"/>
                           </a:solidFill>
@@ -21916,7 +22336,7 @@
                           <a:ea typeface="+mn-ea"/>
                           <a:cs typeface="+mn-cs"/>
                         </a:rPr>
-                        <a:t>1945.13</a:t>
+                        <a:t>3798.31</a:t>
                       </a:r>
                     </a:p>
                   </a:txBody>
@@ -21929,7 +22349,7 @@
                     <a:p>
                       <a:pPr algn="ctr" fontAlgn="b"/>
                       <a:r>
-                        <a:rPr lang="en-US" sz="1800" b="0" kern="1200" dirty="0">
+                        <a:rPr lang="en-US" sz="1800" kern="1200">
                           <a:solidFill>
                             <a:schemeClr val="dk1"/>
                           </a:solidFill>
@@ -21937,7 +22357,7 @@
                           <a:ea typeface="+mn-ea"/>
                           <a:cs typeface="+mn-cs"/>
                         </a:rPr>
-                        <a:t>1002.96</a:t>
+                        <a:t>1475.21</a:t>
                       </a:r>
                     </a:p>
                   </a:txBody>
@@ -21950,7 +22370,7 @@
                     <a:p>
                       <a:pPr algn="ctr" fontAlgn="b"/>
                       <a:r>
-                        <a:rPr lang="en-US" sz="1800" b="0" kern="1200">
+                        <a:rPr lang="en-US" sz="1800" kern="1200">
                           <a:solidFill>
                             <a:schemeClr val="dk1"/>
                           </a:solidFill>
@@ -21958,7 +22378,49 @@
                           <a:ea typeface="+mn-ea"/>
                           <a:cs typeface="+mn-cs"/>
                         </a:rPr>
-                        <a:t>2151.26</a:t>
+                        <a:t>3988.04</a:t>
+                      </a:r>
+                    </a:p>
+                  </a:txBody>
+                  <a:tcPr marL="9525" marR="9525" marT="9525" marB="0" anchor="ctr"/>
+                </a:tc>
+                <a:tc>
+                  <a:txBody>
+                    <a:bodyPr/>
+                    <a:lstStyle/>
+                    <a:p>
+                      <a:pPr algn="ctr" fontAlgn="b"/>
+                      <a:r>
+                        <a:rPr lang="en-US" sz="1800" kern="1200">
+                          <a:solidFill>
+                            <a:schemeClr val="dk1"/>
+                          </a:solidFill>
+                          <a:latin typeface="+mn-lt"/>
+                          <a:ea typeface="+mn-ea"/>
+                          <a:cs typeface="+mn-cs"/>
+                        </a:rPr>
+                        <a:t>1661.90</a:t>
+                      </a:r>
+                    </a:p>
+                  </a:txBody>
+                  <a:tcPr marL="9525" marR="9525" marT="9525" marB="0" anchor="ctr"/>
+                </a:tc>
+                <a:tc>
+                  <a:txBody>
+                    <a:bodyPr/>
+                    <a:lstStyle/>
+                    <a:p>
+                      <a:pPr algn="ctr" fontAlgn="b"/>
+                      <a:r>
+                        <a:rPr lang="en-US" sz="1800" kern="1200">
+                          <a:solidFill>
+                            <a:schemeClr val="dk1"/>
+                          </a:solidFill>
+                          <a:latin typeface="+mn-lt"/>
+                          <a:ea typeface="+mn-ea"/>
+                          <a:cs typeface="+mn-cs"/>
+                        </a:rPr>
+                        <a:t>4399.78</a:t>
                       </a:r>
                     </a:p>
                   </a:txBody>
@@ -21979,49 +22441,7 @@
                           <a:ea typeface="+mn-ea"/>
                           <a:cs typeface="+mn-cs"/>
                         </a:rPr>
-                        <a:t>483.63</a:t>
-                      </a:r>
-                    </a:p>
-                  </a:txBody>
-                  <a:tcPr marL="9525" marR="9525" marT="9525" marB="0" anchor="ctr"/>
-                </a:tc>
-                <a:tc>
-                  <a:txBody>
-                    <a:bodyPr/>
-                    <a:lstStyle/>
-                    <a:p>
-                      <a:pPr algn="ctr" fontAlgn="b"/>
-                      <a:r>
-                        <a:rPr lang="en-US" sz="1800" b="0" kern="1200">
-                          <a:solidFill>
-                            <a:schemeClr val="dk1"/>
-                          </a:solidFill>
-                          <a:latin typeface="+mn-lt"/>
-                          <a:ea typeface="+mn-ea"/>
-                          <a:cs typeface="+mn-cs"/>
-                        </a:rPr>
-                        <a:t>2549.38</a:t>
-                      </a:r>
-                    </a:p>
-                  </a:txBody>
-                  <a:tcPr marL="9525" marR="9525" marT="9525" marB="0" anchor="ctr"/>
-                </a:tc>
-                <a:tc>
-                  <a:txBody>
-                    <a:bodyPr/>
-                    <a:lstStyle/>
-                    <a:p>
-                      <a:pPr algn="ctr" fontAlgn="b"/>
-                      <a:r>
-                        <a:rPr lang="en-US" sz="1800" b="0" kern="1200">
-                          <a:solidFill>
-                            <a:schemeClr val="dk1"/>
-                          </a:solidFill>
-                          <a:latin typeface="+mn-lt"/>
-                          <a:ea typeface="+mn-ea"/>
-                          <a:cs typeface="+mn-cs"/>
-                        </a:rPr>
-                        <a:t>2457.99</a:t>
+                        <a:t>1051.47</a:t>
                       </a:r>
                     </a:p>
                   </a:txBody>
@@ -22042,7 +22462,7 @@
                           <a:ea typeface="+mn-ea"/>
                           <a:cs typeface="+mn-cs"/>
                         </a:rPr>
-                        <a:t>1623.34</a:t>
+                        <a:t>1049.03</a:t>
                       </a:r>
                     </a:p>
                   </a:txBody>
@@ -22094,133 +22514,7 @@
                           <a:ea typeface="+mn-ea"/>
                           <a:cs typeface="+mn-cs"/>
                         </a:rPr>
-                        <a:t>1363.79</a:t>
-                      </a:r>
-                    </a:p>
-                  </a:txBody>
-                  <a:tcPr marL="9525" marR="9525" marT="9525" marB="0" anchor="ctr"/>
-                </a:tc>
-                <a:tc>
-                  <a:txBody>
-                    <a:bodyPr/>
-                    <a:lstStyle/>
-                    <a:p>
-                      <a:pPr algn="ctr" fontAlgn="b"/>
-                      <a:r>
-                        <a:rPr lang="en-US" sz="1800" b="0" kern="1200" dirty="0">
-                          <a:solidFill>
-                            <a:schemeClr val="dk1"/>
-                          </a:solidFill>
-                          <a:latin typeface="+mn-lt"/>
-                          <a:ea typeface="+mn-ea"/>
-                          <a:cs typeface="+mn-cs"/>
-                        </a:rPr>
-                        <a:t>2201.58</a:t>
-                      </a:r>
-                    </a:p>
-                  </a:txBody>
-                  <a:tcPr marL="9525" marR="9525" marT="9525" marB="0" anchor="ctr"/>
-                </a:tc>
-                <a:tc>
-                  <a:txBody>
-                    <a:bodyPr/>
-                    <a:lstStyle/>
-                    <a:p>
-                      <a:pPr algn="ctr" fontAlgn="b"/>
-                      <a:r>
-                        <a:rPr lang="en-US" sz="1800" b="0" kern="1200" dirty="0">
-                          <a:solidFill>
-                            <a:schemeClr val="dk1"/>
-                          </a:solidFill>
-                          <a:latin typeface="+mn-lt"/>
-                          <a:ea typeface="+mn-ea"/>
-                          <a:cs typeface="+mn-cs"/>
-                        </a:rPr>
-                        <a:t>853.71</a:t>
-                      </a:r>
-                    </a:p>
-                  </a:txBody>
-                  <a:tcPr marL="9525" marR="9525" marT="9525" marB="0" anchor="ctr"/>
-                </a:tc>
-                <a:tc>
-                  <a:txBody>
-                    <a:bodyPr/>
-                    <a:lstStyle/>
-                    <a:p>
-                      <a:pPr algn="ctr" fontAlgn="b"/>
-                      <a:r>
-                        <a:rPr lang="en-US" sz="1800" b="0" kern="1200" dirty="0">
-                          <a:solidFill>
-                            <a:schemeClr val="dk1"/>
-                          </a:solidFill>
-                          <a:latin typeface="+mn-lt"/>
-                          <a:ea typeface="+mn-ea"/>
-                          <a:cs typeface="+mn-cs"/>
-                        </a:rPr>
-                        <a:t>2375.81</a:t>
-                      </a:r>
-                    </a:p>
-                  </a:txBody>
-                  <a:tcPr marL="9525" marR="9525" marT="9525" marB="0" anchor="ctr"/>
-                </a:tc>
-                <a:tc>
-                  <a:txBody>
-                    <a:bodyPr/>
-                    <a:lstStyle/>
-                    <a:p>
-                      <a:pPr algn="ctr" fontAlgn="b"/>
-                      <a:r>
-                        <a:rPr lang="en-US" sz="1800" b="0" kern="1200">
-                          <a:solidFill>
-                            <a:schemeClr val="dk1"/>
-                          </a:solidFill>
-                          <a:latin typeface="+mn-lt"/>
-                          <a:ea typeface="+mn-ea"/>
-                          <a:cs typeface="+mn-cs"/>
-                        </a:rPr>
-                        <a:t>385.72</a:t>
-                      </a:r>
-                    </a:p>
-                  </a:txBody>
-                  <a:tcPr marL="9525" marR="9525" marT="9525" marB="0" anchor="ctr"/>
-                </a:tc>
-                <a:tc>
-                  <a:txBody>
-                    <a:bodyPr/>
-                    <a:lstStyle/>
-                    <a:p>
-                      <a:pPr algn="ctr" fontAlgn="b"/>
-                      <a:r>
-                        <a:rPr lang="en-US" sz="1800" b="0" kern="1200">
-                          <a:solidFill>
-                            <a:schemeClr val="dk1"/>
-                          </a:solidFill>
-                          <a:latin typeface="+mn-lt"/>
-                          <a:ea typeface="+mn-ea"/>
-                          <a:cs typeface="+mn-cs"/>
-                        </a:rPr>
-                        <a:t>2771.10</a:t>
-                      </a:r>
-                    </a:p>
-                  </a:txBody>
-                  <a:tcPr marL="9525" marR="9525" marT="9525" marB="0" anchor="ctr"/>
-                </a:tc>
-                <a:tc>
-                  <a:txBody>
-                    <a:bodyPr/>
-                    <a:lstStyle/>
-                    <a:p>
-                      <a:pPr algn="ctr" fontAlgn="b"/>
-                      <a:r>
-                        <a:rPr lang="en-US" sz="1800" b="0" kern="1200">
-                          <a:solidFill>
-                            <a:schemeClr val="dk1"/>
-                          </a:solidFill>
-                          <a:latin typeface="+mn-lt"/>
-                          <a:ea typeface="+mn-ea"/>
-                          <a:cs typeface="+mn-cs"/>
-                        </a:rPr>
-                        <a:t>2118.63</a:t>
+                        <a:t>2298.85</a:t>
                       </a:r>
                     </a:p>
                   </a:txBody>
@@ -22241,7 +22535,133 @@
                           <a:ea typeface="+mn-ea"/>
                           <a:cs typeface="+mn-cs"/>
                         </a:rPr>
-                        <a:t>1149.75</a:t>
+                        <a:t>3139.92</a:t>
+                      </a:r>
+                    </a:p>
+                  </a:txBody>
+                  <a:tcPr marL="9525" marR="9525" marT="9525" marB="0" anchor="ctr"/>
+                </a:tc>
+                <a:tc>
+                  <a:txBody>
+                    <a:bodyPr/>
+                    <a:lstStyle/>
+                    <a:p>
+                      <a:pPr algn="ctr" fontAlgn="b"/>
+                      <a:r>
+                        <a:rPr lang="en-US" sz="1800" kern="1200">
+                          <a:solidFill>
+                            <a:schemeClr val="dk1"/>
+                          </a:solidFill>
+                          <a:latin typeface="+mn-lt"/>
+                          <a:ea typeface="+mn-ea"/>
+                          <a:cs typeface="+mn-cs"/>
+                        </a:rPr>
+                        <a:t>1106.01</a:t>
+                      </a:r>
+                    </a:p>
+                  </a:txBody>
+                  <a:tcPr marL="9525" marR="9525" marT="9525" marB="0" anchor="ctr"/>
+                </a:tc>
+                <a:tc>
+                  <a:txBody>
+                    <a:bodyPr/>
+                    <a:lstStyle/>
+                    <a:p>
+                      <a:pPr algn="ctr" fontAlgn="b"/>
+                      <a:r>
+                        <a:rPr lang="en-US" sz="1800" kern="1200">
+                          <a:solidFill>
+                            <a:schemeClr val="dk1"/>
+                          </a:solidFill>
+                          <a:latin typeface="+mn-lt"/>
+                          <a:ea typeface="+mn-ea"/>
+                          <a:cs typeface="+mn-cs"/>
+                        </a:rPr>
+                        <a:t>3309.01</a:t>
+                      </a:r>
+                    </a:p>
+                  </a:txBody>
+                  <a:tcPr marL="9525" marR="9525" marT="9525" marB="0" anchor="ctr"/>
+                </a:tc>
+                <a:tc>
+                  <a:txBody>
+                    <a:bodyPr/>
+                    <a:lstStyle/>
+                    <a:p>
+                      <a:pPr algn="ctr" fontAlgn="b"/>
+                      <a:r>
+                        <a:rPr lang="en-US" sz="1800" kern="1200">
+                          <a:solidFill>
+                            <a:schemeClr val="dk1"/>
+                          </a:solidFill>
+                          <a:latin typeface="+mn-lt"/>
+                          <a:ea typeface="+mn-ea"/>
+                          <a:cs typeface="+mn-cs"/>
+                        </a:rPr>
+                        <a:t>1307.57</a:t>
+                      </a:r>
+                    </a:p>
+                  </a:txBody>
+                  <a:tcPr marL="9525" marR="9525" marT="9525" marB="0" anchor="ctr"/>
+                </a:tc>
+                <a:tc>
+                  <a:txBody>
+                    <a:bodyPr/>
+                    <a:lstStyle/>
+                    <a:p>
+                      <a:pPr algn="ctr" fontAlgn="b"/>
+                      <a:r>
+                        <a:rPr lang="en-US" sz="1800" kern="1200">
+                          <a:solidFill>
+                            <a:schemeClr val="dk1"/>
+                          </a:solidFill>
+                          <a:latin typeface="+mn-lt"/>
+                          <a:ea typeface="+mn-ea"/>
+                          <a:cs typeface="+mn-cs"/>
+                        </a:rPr>
+                        <a:t>3714.36</a:t>
+                      </a:r>
+                    </a:p>
+                  </a:txBody>
+                  <a:tcPr marL="9525" marR="9525" marT="9525" marB="0" anchor="ctr"/>
+                </a:tc>
+                <a:tc>
+                  <a:txBody>
+                    <a:bodyPr/>
+                    <a:lstStyle/>
+                    <a:p>
+                      <a:pPr algn="ctr" fontAlgn="b"/>
+                      <a:r>
+                        <a:rPr lang="en-US" sz="1800" kern="1200">
+                          <a:solidFill>
+                            <a:schemeClr val="dk1"/>
+                          </a:solidFill>
+                          <a:latin typeface="+mn-lt"/>
+                          <a:ea typeface="+mn-ea"/>
+                          <a:cs typeface="+mn-cs"/>
+                        </a:rPr>
+                        <a:t>1401.93</a:t>
+                      </a:r>
+                    </a:p>
+                  </a:txBody>
+                  <a:tcPr marL="9525" marR="9525" marT="9525" marB="0" anchor="ctr"/>
+                </a:tc>
+                <a:tc>
+                  <a:txBody>
+                    <a:bodyPr/>
+                    <a:lstStyle/>
+                    <a:p>
+                      <a:pPr algn="ctr" fontAlgn="b"/>
+                      <a:r>
+                        <a:rPr lang="en-US" sz="1800" kern="1200">
+                          <a:solidFill>
+                            <a:schemeClr val="dk1"/>
+                          </a:solidFill>
+                          <a:latin typeface="+mn-lt"/>
+                          <a:ea typeface="+mn-ea"/>
+                          <a:cs typeface="+mn-cs"/>
+                        </a:rPr>
+                        <a:t>447.31</a:t>
                       </a:r>
                     </a:p>
                   </a:txBody>
@@ -22285,7 +22705,7 @@
                     <a:p>
                       <a:pPr algn="ctr" fontAlgn="b"/>
                       <a:r>
-                        <a:rPr lang="en-US" sz="1800" b="0" kern="1200">
+                        <a:rPr lang="en-US" sz="1800" kern="1200">
                           <a:solidFill>
                             <a:schemeClr val="dk1"/>
                           </a:solidFill>
@@ -22293,7 +22713,7 @@
                           <a:ea typeface="+mn-ea"/>
                           <a:cs typeface="+mn-cs"/>
                         </a:rPr>
-                        <a:t>2259.89</a:t>
+                        <a:t>2923.33</a:t>
                       </a:r>
                     </a:p>
                   </a:txBody>
@@ -22306,7 +22726,7 @@
                     <a:p>
                       <a:pPr algn="ctr" fontAlgn="b"/>
                       <a:r>
-                        <a:rPr lang="en-US" sz="1800" b="0" kern="1200">
+                        <a:rPr lang="en-US" sz="1800" kern="1200">
                           <a:solidFill>
                             <a:schemeClr val="dk1"/>
                           </a:solidFill>
@@ -22314,7 +22734,7 @@
                           <a:ea typeface="+mn-ea"/>
                           <a:cs typeface="+mn-cs"/>
                         </a:rPr>
-                        <a:t>3289.82</a:t>
+                        <a:t>3951.30</a:t>
                       </a:r>
                     </a:p>
                   </a:txBody>
@@ -22335,91 +22755,7 @@
                           <a:ea typeface="+mn-ea"/>
                           <a:cs typeface="+mn-cs"/>
                         </a:rPr>
-                        <a:t>634.33</a:t>
-                      </a:r>
-                    </a:p>
-                  </a:txBody>
-                  <a:tcPr marL="9525" marR="9525" marT="9525" marB="0" anchor="ctr"/>
-                </a:tc>
-                <a:tc>
-                  <a:txBody>
-                    <a:bodyPr/>
-                    <a:lstStyle/>
-                    <a:p>
-                      <a:pPr algn="ctr" fontAlgn="b"/>
-                      <a:r>
-                        <a:rPr lang="en-US" sz="1800" b="0" kern="1200" dirty="0">
-                          <a:solidFill>
-                            <a:schemeClr val="dk1"/>
-                          </a:solidFill>
-                          <a:latin typeface="+mn-lt"/>
-                          <a:ea typeface="+mn-ea"/>
-                          <a:cs typeface="+mn-cs"/>
-                        </a:rPr>
-                        <a:t>3234.38</a:t>
-                      </a:r>
-                    </a:p>
-                  </a:txBody>
-                  <a:tcPr marL="9525" marR="9525" marT="9525" marB="0" anchor="ctr"/>
-                </a:tc>
-                <a:tc>
-                  <a:txBody>
-                    <a:bodyPr/>
-                    <a:lstStyle/>
-                    <a:p>
-                      <a:pPr algn="ctr" fontAlgn="b"/>
-                      <a:r>
-                        <a:rPr lang="en-US" sz="1800" b="0" kern="1200">
-                          <a:solidFill>
-                            <a:schemeClr val="dk1"/>
-                          </a:solidFill>
-                          <a:latin typeface="+mn-lt"/>
-                          <a:ea typeface="+mn-ea"/>
-                          <a:cs typeface="+mn-cs"/>
-                        </a:rPr>
-                        <a:t>817.61</a:t>
-                      </a:r>
-                    </a:p>
-                  </a:txBody>
-                  <a:tcPr marL="9525" marR="9525" marT="9525" marB="0" anchor="ctr"/>
-                </a:tc>
-                <a:tc>
-                  <a:txBody>
-                    <a:bodyPr/>
-                    <a:lstStyle/>
-                    <a:p>
-                      <a:pPr algn="ctr" fontAlgn="b"/>
-                      <a:r>
-                        <a:rPr lang="en-US" sz="1800" b="0" kern="1200">
-                          <a:solidFill>
-                            <a:schemeClr val="dk1"/>
-                          </a:solidFill>
-                          <a:latin typeface="+mn-lt"/>
-                          <a:ea typeface="+mn-ea"/>
-                          <a:cs typeface="+mn-cs"/>
-                        </a:rPr>
-                        <a:t>3890.19</a:t>
-                      </a:r>
-                    </a:p>
-                  </a:txBody>
-                  <a:tcPr marL="9525" marR="9525" marT="9525" marB="0" anchor="ctr"/>
-                </a:tc>
-                <a:tc>
-                  <a:txBody>
-                    <a:bodyPr/>
-                    <a:lstStyle/>
-                    <a:p>
-                      <a:pPr algn="ctr" fontAlgn="b"/>
-                      <a:r>
-                        <a:rPr lang="en-US" sz="1800" b="0" kern="1200">
-                          <a:solidFill>
-                            <a:schemeClr val="dk1"/>
-                          </a:solidFill>
-                          <a:latin typeface="+mn-lt"/>
-                          <a:ea typeface="+mn-ea"/>
-                          <a:cs typeface="+mn-cs"/>
-                        </a:rPr>
-                        <a:t>1416.05</a:t>
+                        <a:t>1302.78</a:t>
                       </a:r>
                     </a:p>
                   </a:txBody>
@@ -22440,7 +22776,91 @@
                           <a:ea typeface="+mn-ea"/>
                           <a:cs typeface="+mn-cs"/>
                         </a:rPr>
-                        <a:t>735.08</a:t>
+                        <a:t>3897.66</a:t>
+                      </a:r>
+                    </a:p>
+                  </a:txBody>
+                  <a:tcPr marL="9525" marR="9525" marT="9525" marB="0" anchor="ctr"/>
+                </a:tc>
+                <a:tc>
+                  <a:txBody>
+                    <a:bodyPr/>
+                    <a:lstStyle/>
+                    <a:p>
+                      <a:pPr algn="ctr" fontAlgn="b"/>
+                      <a:r>
+                        <a:rPr lang="en-US" sz="1800" kern="1200">
+                          <a:solidFill>
+                            <a:schemeClr val="dk1"/>
+                          </a:solidFill>
+                          <a:latin typeface="+mn-lt"/>
+                          <a:ea typeface="+mn-ea"/>
+                          <a:cs typeface="+mn-cs"/>
+                        </a:rPr>
+                        <a:t>1685.80</a:t>
+                      </a:r>
+                    </a:p>
+                  </a:txBody>
+                  <a:tcPr marL="9525" marR="9525" marT="9525" marB="0" anchor="ctr"/>
+                </a:tc>
+                <a:tc>
+                  <a:txBody>
+                    <a:bodyPr/>
+                    <a:lstStyle/>
+                    <a:p>
+                      <a:pPr algn="ctr" fontAlgn="b"/>
+                      <a:r>
+                        <a:rPr lang="en-US" sz="1800" kern="1200">
+                          <a:solidFill>
+                            <a:schemeClr val="dk1"/>
+                          </a:solidFill>
+                          <a:latin typeface="+mn-lt"/>
+                          <a:ea typeface="+mn-ea"/>
+                          <a:cs typeface="+mn-cs"/>
+                        </a:rPr>
+                        <a:t>4551.22</a:t>
+                      </a:r>
+                    </a:p>
+                  </a:txBody>
+                  <a:tcPr marL="9525" marR="9525" marT="9525" marB="0" anchor="ctr"/>
+                </a:tc>
+                <a:tc>
+                  <a:txBody>
+                    <a:bodyPr/>
+                    <a:lstStyle/>
+                    <a:p>
+                      <a:pPr algn="ctr" fontAlgn="b"/>
+                      <a:r>
+                        <a:rPr lang="en-US" sz="1800" kern="1200">
+                          <a:solidFill>
+                            <a:schemeClr val="dk1"/>
+                          </a:solidFill>
+                          <a:latin typeface="+mn-lt"/>
+                          <a:ea typeface="+mn-ea"/>
+                          <a:cs typeface="+mn-cs"/>
+                        </a:rPr>
+                        <a:t>905.93</a:t>
+                      </a:r>
+                    </a:p>
+                  </a:txBody>
+                  <a:tcPr marL="9525" marR="9525" marT="9525" marB="0" anchor="ctr"/>
+                </a:tc>
+                <a:tc>
+                  <a:txBody>
+                    <a:bodyPr/>
+                    <a:lstStyle/>
+                    <a:p>
+                      <a:pPr algn="ctr" fontAlgn="b"/>
+                      <a:r>
+                        <a:rPr lang="en-US" sz="1800" kern="1200">
+                          <a:solidFill>
+                            <a:schemeClr val="dk1"/>
+                          </a:solidFill>
+                          <a:latin typeface="+mn-lt"/>
+                          <a:ea typeface="+mn-ea"/>
+                          <a:cs typeface="+mn-cs"/>
+                        </a:rPr>
+                        <a:t>1038.87</a:t>
                       </a:r>
                     </a:p>
                   </a:txBody>
@@ -22484,7 +22904,7 @@
                     <a:p>
                       <a:pPr algn="ctr" fontAlgn="b"/>
                       <a:r>
-                        <a:rPr lang="en-US" sz="1800" b="0" kern="1200">
+                        <a:rPr lang="en-US" sz="1800" kern="1200">
                           <a:solidFill>
                             <a:schemeClr val="dk1"/>
                           </a:solidFill>
@@ -22492,7 +22912,7 @@
                           <a:ea typeface="+mn-ea"/>
                           <a:cs typeface="+mn-cs"/>
                         </a:rPr>
-                        <a:t>2649.48</a:t>
+                        <a:t>2852.11</a:t>
                       </a:r>
                     </a:p>
                   </a:txBody>
@@ -22505,7 +22925,7 @@
                     <a:p>
                       <a:pPr algn="ctr" fontAlgn="b"/>
                       <a:r>
-                        <a:rPr lang="en-US" sz="1800" b="0" kern="1200">
+                        <a:rPr lang="en-US" sz="1800" kern="1200">
                           <a:solidFill>
                             <a:schemeClr val="dk1"/>
                           </a:solidFill>
@@ -22513,7 +22933,7 @@
                           <a:ea typeface="+mn-ea"/>
                           <a:cs typeface="+mn-cs"/>
                         </a:rPr>
-                        <a:t>3753.53</a:t>
+                        <a:t>3953.20</a:t>
                       </a:r>
                     </a:p>
                   </a:txBody>
@@ -22526,7 +22946,7 @@
                     <a:p>
                       <a:pPr algn="ctr" fontAlgn="b"/>
                       <a:r>
-                        <a:rPr lang="en-US" sz="1800" b="0" kern="1200">
+                        <a:rPr lang="en-US" sz="1800" kern="1200">
                           <a:solidFill>
                             <a:schemeClr val="dk1"/>
                           </a:solidFill>
@@ -22534,7 +22954,7 @@
                           <a:ea typeface="+mn-ea"/>
                           <a:cs typeface="+mn-cs"/>
                         </a:rPr>
-                        <a:t>1357.74</a:t>
+                        <a:t>1558.17</a:t>
                       </a:r>
                     </a:p>
                   </a:txBody>
@@ -22555,7 +22975,7 @@
                           <a:ea typeface="+mn-ea"/>
                           <a:cs typeface="+mn-cs"/>
                         </a:rPr>
-                        <a:t>3621.49</a:t>
+                        <a:t>3824.42</a:t>
                       </a:r>
                     </a:p>
                   </a:txBody>
@@ -22568,7 +22988,7 @@
                     <a:p>
                       <a:pPr algn="ctr" fontAlgn="b"/>
                       <a:r>
-                        <a:rPr lang="en-US" sz="1800" b="0" kern="1200" dirty="0">
+                        <a:rPr lang="en-US" sz="1800" kern="1200" dirty="0">
                           <a:solidFill>
                             <a:schemeClr val="dk1"/>
                           </a:solidFill>
@@ -22576,49 +22996,7 @@
                           <a:ea typeface="+mn-ea"/>
                           <a:cs typeface="+mn-cs"/>
                         </a:rPr>
-                        <a:t>1782.06</a:t>
-                      </a:r>
-                    </a:p>
-                  </a:txBody>
-                  <a:tcPr marL="9525" marR="9525" marT="9525" marB="0" anchor="ctr"/>
-                </a:tc>
-                <a:tc>
-                  <a:txBody>
-                    <a:bodyPr/>
-                    <a:lstStyle/>
-                    <a:p>
-                      <a:pPr algn="ctr" fontAlgn="b"/>
-                      <a:r>
-                        <a:rPr lang="en-US" sz="1800" b="0" kern="1200">
-                          <a:solidFill>
-                            <a:schemeClr val="dk1"/>
-                          </a:solidFill>
-                          <a:latin typeface="+mn-lt"/>
-                          <a:ea typeface="+mn-ea"/>
-                          <a:cs typeface="+mn-cs"/>
-                        </a:rPr>
-                        <a:t>4324.34</a:t>
-                      </a:r>
-                    </a:p>
-                  </a:txBody>
-                  <a:tcPr marL="9525" marR="9525" marT="9525" marB="0" anchor="ctr"/>
-                </a:tc>
-                <a:tc>
-                  <a:txBody>
-                    <a:bodyPr/>
-                    <a:lstStyle/>
-                    <a:p>
-                      <a:pPr algn="ctr" fontAlgn="b"/>
-                      <a:r>
-                        <a:rPr lang="en-US" sz="1800" b="0" kern="1200">
-                          <a:solidFill>
-                            <a:schemeClr val="dk1"/>
-                          </a:solidFill>
-                          <a:latin typeface="+mn-lt"/>
-                          <a:ea typeface="+mn-ea"/>
-                          <a:cs typeface="+mn-cs"/>
-                        </a:rPr>
-                        <a:t>888.39</a:t>
+                        <a:t>1980.81</a:t>
                       </a:r>
                     </a:p>
                   </a:txBody>
@@ -22639,7 +23017,49 @@
                           <a:ea typeface="+mn-ea"/>
                           <a:cs typeface="+mn-cs"/>
                         </a:rPr>
-                        <a:t>767.44</a:t>
+                        <a:t>4524.15</a:t>
+                      </a:r>
+                    </a:p>
+                  </a:txBody>
+                  <a:tcPr marL="9525" marR="9525" marT="9525" marB="0" anchor="ctr"/>
+                </a:tc>
+                <a:tc>
+                  <a:txBody>
+                    <a:bodyPr/>
+                    <a:lstStyle/>
+                    <a:p>
+                      <a:pPr algn="ctr" fontAlgn="b"/>
+                      <a:r>
+                        <a:rPr lang="en-US" sz="1800" kern="1200">
+                          <a:solidFill>
+                            <a:schemeClr val="dk1"/>
+                          </a:solidFill>
+                          <a:latin typeface="+mn-lt"/>
+                          <a:ea typeface="+mn-ea"/>
+                          <a:cs typeface="+mn-cs"/>
+                        </a:rPr>
+                        <a:t>738.10</a:t>
+                      </a:r>
+                    </a:p>
+                  </a:txBody>
+                  <a:tcPr marL="9525" marR="9525" marT="9525" marB="0" anchor="ctr"/>
+                </a:tc>
+                <a:tc>
+                  <a:txBody>
+                    <a:bodyPr/>
+                    <a:lstStyle/>
+                    <a:p>
+                      <a:pPr algn="ctr" fontAlgn="b"/>
+                      <a:r>
+                        <a:rPr lang="en-US" sz="1800" kern="1200">
+                          <a:solidFill>
+                            <a:schemeClr val="dk1"/>
+                          </a:solidFill>
+                          <a:latin typeface="+mn-lt"/>
+                          <a:ea typeface="+mn-ea"/>
+                          <a:cs typeface="+mn-cs"/>
+                        </a:rPr>
+                        <a:t>969.83</a:t>
                       </a:r>
                     </a:p>
                   </a:txBody>
@@ -22683,7 +23103,7 @@
                     <a:p>
                       <a:pPr algn="ctr" fontAlgn="b"/>
                       <a:r>
-                        <a:rPr lang="en-US" sz="1800" b="0" kern="1200">
+                        <a:rPr lang="en-US" sz="1800" kern="1200">
                           <a:solidFill>
                             <a:schemeClr val="dk1"/>
                           </a:solidFill>
@@ -22691,7 +23111,7 @@
                           <a:ea typeface="+mn-ea"/>
                           <a:cs typeface="+mn-cs"/>
                         </a:rPr>
-                        <a:t>2485.49</a:t>
+                        <a:t>3124.64</a:t>
                       </a:r>
                     </a:p>
                   </a:txBody>
@@ -22704,7 +23124,7 @@
                     <a:p>
                       <a:pPr algn="ctr" fontAlgn="b"/>
                       <a:r>
-                        <a:rPr lang="en-US" sz="1800" b="0" kern="1200" dirty="0">
+                        <a:rPr lang="en-US" sz="1800" kern="1200">
                           <a:solidFill>
                             <a:schemeClr val="dk1"/>
                           </a:solidFill>
@@ -22712,7 +23132,7 @@
                           <a:ea typeface="+mn-ea"/>
                           <a:cs typeface="+mn-cs"/>
                         </a:rPr>
-                        <a:t>3303.62</a:t>
+                        <a:t>3947.58</a:t>
                       </a:r>
                     </a:p>
                   </a:txBody>
@@ -22725,7 +23145,7 @@
                     <a:p>
                       <a:pPr algn="ctr" fontAlgn="b"/>
                       <a:r>
-                        <a:rPr lang="en-US" sz="1800" b="0" kern="1200">
+                        <a:rPr lang="en-US" sz="1800" kern="1200">
                           <a:solidFill>
                             <a:schemeClr val="dk1"/>
                           </a:solidFill>
@@ -22733,7 +23153,7 @@
                           <a:ea typeface="+mn-ea"/>
                           <a:cs typeface="+mn-cs"/>
                         </a:rPr>
-                        <a:t>886.92</a:t>
+                        <a:t>1529.54</a:t>
                       </a:r>
                     </a:p>
                   </a:txBody>
@@ -22746,7 +23166,7 @@
                     <a:p>
                       <a:pPr algn="ctr" fontAlgn="b"/>
                       <a:r>
-                        <a:rPr lang="en-US" sz="1800" b="0" kern="1200">
+                        <a:rPr lang="en-US" sz="1800" kern="1200">
                           <a:solidFill>
                             <a:schemeClr val="dk1"/>
                           </a:solidFill>
@@ -22754,49 +23174,7 @@
                           <a:ea typeface="+mn-ea"/>
                           <a:cs typeface="+mn-cs"/>
                         </a:rPr>
-                        <a:t>3464.55</a:t>
-                      </a:r>
-                    </a:p>
-                  </a:txBody>
-                  <a:tcPr marL="9525" marR="9525" marT="9525" marB="0" anchor="ctr"/>
-                </a:tc>
-                <a:tc>
-                  <a:txBody>
-                    <a:bodyPr/>
-                    <a:lstStyle/>
-                    <a:p>
-                      <a:pPr algn="ctr" fontAlgn="b"/>
-                      <a:r>
-                        <a:rPr lang="en-US" sz="1800" b="0" kern="1200" dirty="0">
-                          <a:solidFill>
-                            <a:schemeClr val="dk1"/>
-                          </a:solidFill>
-                          <a:latin typeface="+mn-lt"/>
-                          <a:ea typeface="+mn-ea"/>
-                          <a:cs typeface="+mn-cs"/>
-                        </a:rPr>
-                        <a:t>1071.53</a:t>
-                      </a:r>
-                    </a:p>
-                  </a:txBody>
-                  <a:tcPr marL="9525" marR="9525" marT="9525" marB="0" anchor="ctr"/>
-                </a:tc>
-                <a:tc>
-                  <a:txBody>
-                    <a:bodyPr/>
-                    <a:lstStyle/>
-                    <a:p>
-                      <a:pPr algn="ctr" fontAlgn="b"/>
-                      <a:r>
-                        <a:rPr lang="en-US" sz="1800" b="0" kern="1200">
-                          <a:solidFill>
-                            <a:schemeClr val="dk1"/>
-                          </a:solidFill>
-                          <a:latin typeface="+mn-lt"/>
-                          <a:ea typeface="+mn-ea"/>
-                          <a:cs typeface="+mn-cs"/>
-                        </a:rPr>
-                        <a:t>3905.37</a:t>
+                        <a:t>4108.66</a:t>
                       </a:r>
                     </a:p>
                   </a:txBody>
@@ -22817,7 +23195,28 @@
                           <a:ea typeface="+mn-ea"/>
                           <a:cs typeface="+mn-cs"/>
                         </a:rPr>
-                        <a:t>1425.35</a:t>
+                        <a:t>1717.72</a:t>
+                      </a:r>
+                    </a:p>
+                  </a:txBody>
+                  <a:tcPr marL="9525" marR="9525" marT="9525" marB="0" anchor="ctr"/>
+                </a:tc>
+                <a:tc>
+                  <a:txBody>
+                    <a:bodyPr/>
+                    <a:lstStyle/>
+                    <a:p>
+                      <a:pPr algn="ctr" fontAlgn="b"/>
+                      <a:r>
+                        <a:rPr lang="en-US" sz="1800" kern="1200" dirty="0">
+                          <a:solidFill>
+                            <a:schemeClr val="dk1"/>
+                          </a:solidFill>
+                          <a:latin typeface="+mn-lt"/>
+                          <a:ea typeface="+mn-ea"/>
+                          <a:cs typeface="+mn-cs"/>
+                        </a:rPr>
+                        <a:t>4548.34</a:t>
                       </a:r>
                     </a:p>
                   </a:txBody>
@@ -22838,7 +23237,28 @@
                           <a:ea typeface="+mn-ea"/>
                           <a:cs typeface="+mn-cs"/>
                         </a:rPr>
-                        <a:t>684.08</a:t>
+                        <a:t>929.64</a:t>
+                      </a:r>
+                    </a:p>
+                  </a:txBody>
+                  <a:tcPr marL="9525" marR="9525" marT="9525" marB="0" anchor="ctr"/>
+                </a:tc>
+                <a:tc>
+                  <a:txBody>
+                    <a:bodyPr/>
+                    <a:lstStyle/>
+                    <a:p>
+                      <a:pPr algn="ctr" fontAlgn="b"/>
+                      <a:r>
+                        <a:rPr lang="en-US" sz="1800" kern="1200">
+                          <a:solidFill>
+                            <a:schemeClr val="dk1"/>
+                          </a:solidFill>
+                          <a:latin typeface="+mn-lt"/>
+                          <a:ea typeface="+mn-ea"/>
+                          <a:cs typeface="+mn-cs"/>
+                        </a:rPr>
+                        <a:t>1194.79</a:t>
                       </a:r>
                     </a:p>
                   </a:txBody>
@@ -22882,7 +23302,7 @@
                     <a:p>
                       <a:pPr algn="ctr" fontAlgn="b"/>
                       <a:r>
-                        <a:rPr lang="en-US" sz="1800" b="0" kern="1200">
+                        <a:rPr lang="en-US" sz="1800" kern="1200">
                           <a:solidFill>
                             <a:schemeClr val="dk1"/>
                           </a:solidFill>
@@ -22890,7 +23310,7 @@
                           <a:ea typeface="+mn-ea"/>
                           <a:cs typeface="+mn-cs"/>
                         </a:rPr>
-                        <a:t>2592.58</a:t>
+                        <a:t>3114.98</a:t>
                       </a:r>
                     </a:p>
                   </a:txBody>
@@ -22911,91 +23331,7 @@
                           <a:ea typeface="+mn-ea"/>
                           <a:cs typeface="+mn-cs"/>
                         </a:rPr>
-                        <a:t>3510.76</a:t>
-                      </a:r>
-                    </a:p>
-                  </a:txBody>
-                  <a:tcPr marL="9525" marR="9525" marT="9525" marB="0" anchor="ctr"/>
-                </a:tc>
-                <a:tc>
-                  <a:txBody>
-                    <a:bodyPr/>
-                    <a:lstStyle/>
-                    <a:p>
-                      <a:pPr algn="ctr" fontAlgn="b"/>
-                      <a:r>
-                        <a:rPr lang="en-US" sz="1800" b="0" kern="1200">
-                          <a:solidFill>
-                            <a:schemeClr val="dk1"/>
-                          </a:solidFill>
-                          <a:latin typeface="+mn-lt"/>
-                          <a:ea typeface="+mn-ea"/>
-                          <a:cs typeface="+mn-cs"/>
-                        </a:rPr>
-                        <a:t>1423.31</a:t>
-                      </a:r>
-                    </a:p>
-                  </a:txBody>
-                  <a:tcPr marL="9525" marR="9525" marT="9525" marB="0" anchor="ctr"/>
-                </a:tc>
-                <a:tc>
-                  <a:txBody>
-                    <a:bodyPr/>
-                    <a:lstStyle/>
-                    <a:p>
-                      <a:pPr algn="ctr" fontAlgn="b"/>
-                      <a:r>
-                        <a:rPr lang="en-US" sz="1800" b="0" kern="1200">
-                          <a:solidFill>
-                            <a:schemeClr val="dk1"/>
-                          </a:solidFill>
-                          <a:latin typeface="+mn-lt"/>
-                          <a:ea typeface="+mn-ea"/>
-                          <a:cs typeface="+mn-cs"/>
-                        </a:rPr>
-                        <a:t>3601.69</a:t>
-                      </a:r>
-                    </a:p>
-                  </a:txBody>
-                  <a:tcPr marL="9525" marR="9525" marT="9525" marB="0" anchor="ctr"/>
-                </a:tc>
-                <a:tc>
-                  <a:txBody>
-                    <a:bodyPr/>
-                    <a:lstStyle/>
-                    <a:p>
-                      <a:pPr algn="ctr" fontAlgn="b"/>
-                      <a:r>
-                        <a:rPr lang="en-US" sz="1800" b="0" kern="1200" dirty="0">
-                          <a:solidFill>
-                            <a:schemeClr val="dk1"/>
-                          </a:solidFill>
-                          <a:latin typeface="+mn-lt"/>
-                          <a:ea typeface="+mn-ea"/>
-                          <a:cs typeface="+mn-cs"/>
-                        </a:rPr>
-                        <a:t>1665.64</a:t>
-                      </a:r>
-                    </a:p>
-                  </a:txBody>
-                  <a:tcPr marL="9525" marR="9525" marT="9525" marB="0" anchor="ctr"/>
-                </a:tc>
-                <a:tc>
-                  <a:txBody>
-                    <a:bodyPr/>
-                    <a:lstStyle/>
-                    <a:p>
-                      <a:pPr algn="ctr" fontAlgn="b"/>
-                      <a:r>
-                        <a:rPr lang="en-US" sz="1800" b="0" kern="1200" dirty="0">
-                          <a:solidFill>
-                            <a:schemeClr val="dk1"/>
-                          </a:solidFill>
-                          <a:latin typeface="+mn-lt"/>
-                          <a:ea typeface="+mn-ea"/>
-                          <a:cs typeface="+mn-cs"/>
-                        </a:rPr>
-                        <a:t>4080.59</a:t>
+                        <a:t>4031.45</a:t>
                       </a:r>
                     </a:p>
                   </a:txBody>
@@ -23016,7 +23352,7 @@
                           <a:ea typeface="+mn-ea"/>
                           <a:cs typeface="+mn-cs"/>
                         </a:rPr>
-                        <a:t>1119.88</a:t>
+                        <a:t>1936.90</a:t>
                       </a:r>
                     </a:p>
                   </a:txBody>
@@ -23037,7 +23373,91 @@
                           <a:ea typeface="+mn-ea"/>
                           <a:cs typeface="+mn-cs"/>
                         </a:rPr>
-                        <a:t>661.82</a:t>
+                        <a:t>4123.21</a:t>
+                      </a:r>
+                    </a:p>
+                  </a:txBody>
+                  <a:tcPr marL="9525" marR="9525" marT="9525" marB="0" anchor="ctr"/>
+                </a:tc>
+                <a:tc>
+                  <a:txBody>
+                    <a:bodyPr/>
+                    <a:lstStyle/>
+                    <a:p>
+                      <a:pPr algn="ctr" fontAlgn="b"/>
+                      <a:r>
+                        <a:rPr lang="en-US" sz="1800" kern="1200">
+                          <a:solidFill>
+                            <a:schemeClr val="dk1"/>
+                          </a:solidFill>
+                          <a:latin typeface="+mn-lt"/>
+                          <a:ea typeface="+mn-ea"/>
+                          <a:cs typeface="+mn-cs"/>
+                        </a:rPr>
+                        <a:t>2178.88</a:t>
+                      </a:r>
+                    </a:p>
+                  </a:txBody>
+                  <a:tcPr marL="9525" marR="9525" marT="9525" marB="0" anchor="ctr"/>
+                </a:tc>
+                <a:tc>
+                  <a:txBody>
+                    <a:bodyPr/>
+                    <a:lstStyle/>
+                    <a:p>
+                      <a:pPr algn="ctr" fontAlgn="b"/>
+                      <a:r>
+                        <a:rPr lang="en-US" sz="1800" kern="1200">
+                          <a:solidFill>
+                            <a:schemeClr val="dk1"/>
+                          </a:solidFill>
+                          <a:latin typeface="+mn-lt"/>
+                          <a:ea typeface="+mn-ea"/>
+                          <a:cs typeface="+mn-cs"/>
+                        </a:rPr>
+                        <a:t>4601.87</a:t>
+                      </a:r>
+                    </a:p>
+                  </a:txBody>
+                  <a:tcPr marL="9525" marR="9525" marT="9525" marB="0" anchor="ctr"/>
+                </a:tc>
+                <a:tc>
+                  <a:txBody>
+                    <a:bodyPr/>
+                    <a:lstStyle/>
+                    <a:p>
+                      <a:pPr algn="ctr" fontAlgn="b"/>
+                      <a:r>
+                        <a:rPr lang="en-US" sz="1800" kern="1200" dirty="0">
+                          <a:solidFill>
+                            <a:schemeClr val="dk1"/>
+                          </a:solidFill>
+                          <a:latin typeface="+mn-lt"/>
+                          <a:ea typeface="+mn-ea"/>
+                          <a:cs typeface="+mn-cs"/>
+                        </a:rPr>
+                        <a:t>719.90</a:t>
+                      </a:r>
+                    </a:p>
+                  </a:txBody>
+                  <a:tcPr marL="9525" marR="9525" marT="9525" marB="0" anchor="ctr"/>
+                </a:tc>
+                <a:tc>
+                  <a:txBody>
+                    <a:bodyPr/>
+                    <a:lstStyle/>
+                    <a:p>
+                      <a:pPr algn="ctr" fontAlgn="b"/>
+                      <a:r>
+                        <a:rPr lang="en-US" sz="1800" kern="1200">
+                          <a:solidFill>
+                            <a:schemeClr val="dk1"/>
+                          </a:solidFill>
+                          <a:latin typeface="+mn-lt"/>
+                          <a:ea typeface="+mn-ea"/>
+                          <a:cs typeface="+mn-cs"/>
+                        </a:rPr>
+                        <a:t>1185.37</a:t>
                       </a:r>
                     </a:p>
                   </a:txBody>
@@ -23089,7 +23509,7 @@
                           <a:ea typeface="+mn-ea"/>
                           <a:cs typeface="+mn-cs"/>
                         </a:rPr>
-                        <a:t>2092.62</a:t>
+                        <a:t>3450.58</a:t>
                       </a:r>
                     </a:p>
                   </a:txBody>
@@ -23110,7 +23530,7 @@
                           <a:ea typeface="+mn-ea"/>
                           <a:cs typeface="+mn-cs"/>
                         </a:rPr>
-                        <a:t>2972.50</a:t>
+                        <a:t>4324.94</a:t>
                       </a:r>
                     </a:p>
                   </a:txBody>
@@ -23131,7 +23551,7 @@
                           <a:ea typeface="+mn-ea"/>
                           <a:cs typeface="+mn-cs"/>
                         </a:rPr>
-                        <a:t>483.69</a:t>
+                        <a:t>1842.07</a:t>
                       </a:r>
                     </a:p>
                   </a:txBody>
@@ -23152,7 +23572,7 @@
                           <a:ea typeface="+mn-ea"/>
                           <a:cs typeface="+mn-cs"/>
                         </a:rPr>
-                        <a:t>3068.84</a:t>
+                        <a:t>4425.55</a:t>
                       </a:r>
                     </a:p>
                   </a:txBody>
@@ -23173,7 +23593,7 @@
                           <a:ea typeface="+mn-ea"/>
                           <a:cs typeface="+mn-cs"/>
                         </a:rPr>
-                        <a:t>663.72</a:t>
+                        <a:t>2065.54</a:t>
                       </a:r>
                     </a:p>
                   </a:txBody>
@@ -23194,7 +23614,7 @@
                           <a:ea typeface="+mn-ea"/>
                           <a:cs typeface="+mn-cs"/>
                         </a:rPr>
-                        <a:t>3574.72</a:t>
+                        <a:t>4925.22</a:t>
                       </a:r>
                     </a:p>
                   </a:txBody>
@@ -23207,7 +23627,7 @@
                     <a:p>
                       <a:pPr algn="ctr" fontAlgn="b"/>
                       <a:r>
-                        <a:rPr lang="en-US" sz="1800" kern="1200">
+                        <a:rPr lang="en-US" sz="1800" kern="1200" dirty="0">
                           <a:solidFill>
                             <a:schemeClr val="dk1"/>
                           </a:solidFill>
@@ -23215,7 +23635,7 @@
                           <a:ea typeface="+mn-ea"/>
                           <a:cs typeface="+mn-cs"/>
                         </a:rPr>
-                        <a:t>1681.51</a:t>
+                        <a:t>636.43</a:t>
                       </a:r>
                     </a:p>
                   </a:txBody>
@@ -23236,7 +23656,7 @@
                           <a:ea typeface="+mn-ea"/>
                           <a:cs typeface="+mn-cs"/>
                         </a:rPr>
-                        <a:t>989.19</a:t>
+                        <a:t>1565.91</a:t>
                       </a:r>
                     </a:p>
                   </a:txBody>
@@ -23288,7 +23708,7 @@
                           <a:ea typeface="+mn-ea"/>
                           <a:cs typeface="+mn-cs"/>
                         </a:rPr>
-                        <a:t>3002.51</a:t>
+                        <a:t>3446.11</a:t>
                       </a:r>
                     </a:p>
                   </a:txBody>
@@ -23309,7 +23729,7 @@
                           <a:ea typeface="+mn-ea"/>
                           <a:cs typeface="+mn-cs"/>
                         </a:rPr>
-                        <a:t>3951.41</a:t>
+                        <a:t>4392.38</a:t>
                       </a:r>
                     </a:p>
                   </a:txBody>
@@ -23330,7 +23750,7 @@
                           <a:ea typeface="+mn-ea"/>
                           <a:cs typeface="+mn-cs"/>
                         </a:rPr>
-                        <a:t>1390.14</a:t>
+                        <a:t>1834.55</a:t>
                       </a:r>
                     </a:p>
                   </a:txBody>
@@ -23351,7 +23771,7 @@
                           <a:ea typeface="+mn-ea"/>
                           <a:cs typeface="+mn-cs"/>
                         </a:rPr>
-                        <a:t>3977.48</a:t>
+                        <a:t>4420.77</a:t>
                       </a:r>
                     </a:p>
                   </a:txBody>
@@ -23372,7 +23792,7 @@
                           <a:ea typeface="+mn-ea"/>
                           <a:cs typeface="+mn-cs"/>
                         </a:rPr>
-                        <a:t>1577.06</a:t>
+                        <a:t>2133.14</a:t>
                       </a:r>
                     </a:p>
                   </a:txBody>
@@ -23393,7 +23813,7 @@
                           <a:ea typeface="+mn-ea"/>
                           <a:cs typeface="+mn-cs"/>
                         </a:rPr>
-                        <a:t>4551.88</a:t>
+                        <a:t>4992.35</a:t>
                       </a:r>
                     </a:p>
                   </a:txBody>
@@ -23414,7 +23834,7 @@
                           <a:ea typeface="+mn-ea"/>
                           <a:cs typeface="+mn-cs"/>
                         </a:rPr>
-                        <a:t>919.08</a:t>
+                        <a:t>578.07</a:t>
                       </a:r>
                     </a:p>
                   </a:txBody>
@@ -23435,7 +23855,7 @@
                           <a:ea typeface="+mn-ea"/>
                           <a:cs typeface="+mn-cs"/>
                         </a:rPr>
-                        <a:t>1117.71</a:t>
+                        <a:t>1561.64</a:t>
                       </a:r>
                     </a:p>
                   </a:txBody>
@@ -23465,7 +23885,7 @@
         </p:nvSpPr>
         <p:spPr>
           <a:xfrm>
-            <a:off x="1981200" y="3002280"/>
+            <a:off x="1981200" y="2777997"/>
             <a:ext cx="1188720" cy="396740"/>
           </a:xfrm>
           <a:prstGeom prst="rect">
@@ -23517,8 +23937,8 @@
         </p:nvSpPr>
         <p:spPr>
           <a:xfrm>
-            <a:off x="4312920" y="3368540"/>
-            <a:ext cx="1188720" cy="396740"/>
+            <a:off x="4358640" y="3171625"/>
+            <a:ext cx="1143000" cy="369371"/>
           </a:xfrm>
           <a:prstGeom prst="rect">
             <a:avLst/>
@@ -23569,8 +23989,8 @@
         </p:nvSpPr>
         <p:spPr>
           <a:xfrm>
-            <a:off x="5501640" y="3762808"/>
-            <a:ext cx="1188720" cy="396740"/>
+            <a:off x="5501640" y="3538525"/>
+            <a:ext cx="1182106" cy="364623"/>
           </a:xfrm>
           <a:prstGeom prst="rect">
             <a:avLst/>
@@ -23621,8 +24041,8 @@
         </p:nvSpPr>
         <p:spPr>
           <a:xfrm>
-            <a:off x="6675120" y="2636020"/>
-            <a:ext cx="1188720" cy="396740"/>
+            <a:off x="6683746" y="3904097"/>
+            <a:ext cx="1149614" cy="393319"/>
           </a:xfrm>
           <a:prstGeom prst="rect">
             <a:avLst/>
@@ -23673,7 +24093,7 @@
         </p:nvSpPr>
         <p:spPr>
           <a:xfrm>
-            <a:off x="9006840" y="4127431"/>
+            <a:off x="9006840" y="2428042"/>
             <a:ext cx="1188720" cy="396740"/>
           </a:xfrm>
           <a:prstGeom prst="rect">
@@ -23725,7 +24145,7 @@
         </p:nvSpPr>
         <p:spPr>
           <a:xfrm>
-            <a:off x="7833360" y="5223645"/>
+            <a:off x="7833360" y="4999362"/>
             <a:ext cx="1188720" cy="396740"/>
           </a:xfrm>
           <a:prstGeom prst="rect">
@@ -23777,7 +24197,7 @@
         </p:nvSpPr>
         <p:spPr>
           <a:xfrm>
-            <a:off x="10165080" y="4860872"/>
+            <a:off x="10165080" y="4636589"/>
             <a:ext cx="1188720" cy="396740"/>
           </a:xfrm>
           <a:prstGeom prst="rect">
@@ -23829,7 +24249,7 @@
         </p:nvSpPr>
         <p:spPr>
           <a:xfrm>
-            <a:off x="3169920" y="4479372"/>
+            <a:off x="3169920" y="4255089"/>
             <a:ext cx="1188720" cy="396740"/>
           </a:xfrm>
           <a:prstGeom prst="rect">

</xml_diff>

<commit_message>
Single agent and multi agent sims complete
</commit_message>
<xml_diff>
--- a/saved_simulations/CE/Springer_Culminating_Experience_Project.pptx
+++ b/saved_simulations/CE/Springer_Culminating_Experience_Project.pptx
@@ -5,7 +5,7 @@
     <p:sldMasterId id="2147483648" r:id="rId1"/>
   </p:sldMasterIdLst>
   <p:notesMasterIdLst>
-    <p:notesMasterId r:id="rId38"/>
+    <p:notesMasterId r:id="rId41"/>
   </p:notesMasterIdLst>
   <p:sldIdLst>
     <p:sldId id="256" r:id="rId2"/>
@@ -32,18 +32,21 @@
     <p:sldId id="287" r:id="rId23"/>
     <p:sldId id="288" r:id="rId24"/>
     <p:sldId id="289" r:id="rId25"/>
-    <p:sldId id="290" r:id="rId26"/>
-    <p:sldId id="293" r:id="rId27"/>
-    <p:sldId id="273" r:id="rId28"/>
-    <p:sldId id="291" r:id="rId29"/>
-    <p:sldId id="292" r:id="rId30"/>
-    <p:sldId id="294" r:id="rId31"/>
-    <p:sldId id="295" r:id="rId32"/>
-    <p:sldId id="296" r:id="rId33"/>
-    <p:sldId id="297" r:id="rId34"/>
-    <p:sldId id="298" r:id="rId35"/>
-    <p:sldId id="299" r:id="rId36"/>
-    <p:sldId id="300" r:id="rId37"/>
+    <p:sldId id="301" r:id="rId26"/>
+    <p:sldId id="290" r:id="rId27"/>
+    <p:sldId id="302" r:id="rId28"/>
+    <p:sldId id="273" r:id="rId29"/>
+    <p:sldId id="291" r:id="rId30"/>
+    <p:sldId id="292" r:id="rId31"/>
+    <p:sldId id="294" r:id="rId32"/>
+    <p:sldId id="295" r:id="rId33"/>
+    <p:sldId id="304" r:id="rId34"/>
+    <p:sldId id="296" r:id="rId35"/>
+    <p:sldId id="297" r:id="rId36"/>
+    <p:sldId id="298" r:id="rId37"/>
+    <p:sldId id="299" r:id="rId38"/>
+    <p:sldId id="300" r:id="rId39"/>
+    <p:sldId id="303" r:id="rId40"/>
   </p:sldIdLst>
   <p:sldSz cx="12192000" cy="6858000"/>
   <p:notesSz cx="6858000" cy="9144000"/>
@@ -159,7 +162,7 @@
 <file path=ppt/revisionInfo.xml><?xml version="1.0" encoding="utf-8"?>
 <p1510:revInfo xmlns:a="http://schemas.openxmlformats.org/drawingml/2006/main" xmlns:r="http://schemas.openxmlformats.org/officeDocument/2006/relationships" xmlns:p1510="http://schemas.microsoft.com/office/powerpoint/2015/10/main">
   <p1510:revLst>
-    <p1510:client id="{0A8A9783-B282-41E0-BD53-2C37EE67CB25}" v="9" dt="2024-03-21T13:56:45.077"/>
+    <p1510:client id="{0A8A9783-B282-41E0-BD53-2C37EE67CB25}" v="39" dt="2024-03-21T17:10:22.294"/>
   </p1510:revLst>
 </p1510:revInfo>
 </file>
@@ -169,16 +172,59 @@
   <pc:docChgLst>
     <pc:chgData name="Alex Springer" userId="06b1172c4a5245da" providerId="LiveId" clId="{0A8A9783-B282-41E0-BD53-2C37EE67CB25}"/>
     <pc:docChg chg="undo custSel addSld delSld modSld">
-      <pc:chgData name="Alex Springer" userId="06b1172c4a5245da" providerId="LiveId" clId="{0A8A9783-B282-41E0-BD53-2C37EE67CB25}" dt="2024-03-21T13:59:05.860" v="859" actId="20577"/>
+      <pc:chgData name="Alex Springer" userId="06b1172c4a5245da" providerId="LiveId" clId="{0A8A9783-B282-41E0-BD53-2C37EE67CB25}" dt="2024-03-21T17:10:22.294" v="2149"/>
       <pc:docMkLst>
         <pc:docMk/>
       </pc:docMkLst>
+      <pc:sldChg chg="modSp mod delCm">
+        <pc:chgData name="Alex Springer" userId="06b1172c4a5245da" providerId="LiveId" clId="{0A8A9783-B282-41E0-BD53-2C37EE67CB25}" dt="2024-03-21T16:17:02.213" v="1730" actId="20577"/>
+        <pc:sldMkLst>
+          <pc:docMk/>
+          <pc:sldMk cId="2455023039" sldId="256"/>
+        </pc:sldMkLst>
+        <pc:spChg chg="mod">
+          <ac:chgData name="Alex Springer" userId="06b1172c4a5245da" providerId="LiveId" clId="{0A8A9783-B282-41E0-BD53-2C37EE67CB25}" dt="2024-03-21T16:14:40.183" v="1720" actId="27636"/>
+          <ac:spMkLst>
+            <pc:docMk/>
+            <pc:sldMk cId="2455023039" sldId="256"/>
+            <ac:spMk id="2" creationId="{00000000-0000-0000-0000-000000000000}"/>
+          </ac:spMkLst>
+        </pc:spChg>
+        <pc:spChg chg="mod">
+          <ac:chgData name="Alex Springer" userId="06b1172c4a5245da" providerId="LiveId" clId="{0A8A9783-B282-41E0-BD53-2C37EE67CB25}" dt="2024-03-21T16:17:02.213" v="1730" actId="20577"/>
+          <ac:spMkLst>
+            <pc:docMk/>
+            <pc:sldMk cId="2455023039" sldId="256"/>
+            <ac:spMk id="3" creationId="{00000000-0000-0000-0000-000000000000}"/>
+          </ac:spMkLst>
+        </pc:spChg>
+        <pc:extLst>
+          <p:ext xmlns:p="http://schemas.openxmlformats.org/presentationml/2006/main" uri="{D6D511B9-2390-475A-947B-AFAB55BFBCF1}">
+            <pc226:cmChg xmlns:pc226="http://schemas.microsoft.com/office/powerpoint/2022/06/main/command" chg="del">
+              <pc226:chgData name="Alex Springer" userId="06b1172c4a5245da" providerId="LiveId" clId="{0A8A9783-B282-41E0-BD53-2C37EE67CB25}" dt="2024-03-21T16:13:18.905" v="1705"/>
+              <pc2:cmMkLst xmlns:pc2="http://schemas.microsoft.com/office/powerpoint/2019/9/main/command">
+                <pc:docMk/>
+                <pc:sldMk cId="2455023039" sldId="256"/>
+                <pc2:cmMk id="{E763F4DB-CD95-4014-95D3-137DF656DFA5}"/>
+              </pc2:cmMkLst>
+            </pc226:cmChg>
+          </p:ext>
+        </pc:extLst>
+      </pc:sldChg>
       <pc:sldChg chg="addSp delSp modSp mod">
-        <pc:chgData name="Alex Springer" userId="06b1172c4a5245da" providerId="LiveId" clId="{0A8A9783-B282-41E0-BD53-2C37EE67CB25}" dt="2024-03-21T13:07:51.307" v="8" actId="1076"/>
+        <pc:chgData name="Alex Springer" userId="06b1172c4a5245da" providerId="LiveId" clId="{0A8A9783-B282-41E0-BD53-2C37EE67CB25}" dt="2024-03-21T16:52:32.252" v="1756" actId="20577"/>
         <pc:sldMkLst>
           <pc:docMk/>
           <pc:sldMk cId="4293648651" sldId="265"/>
         </pc:sldMkLst>
+        <pc:spChg chg="mod">
+          <ac:chgData name="Alex Springer" userId="06b1172c4a5245da" providerId="LiveId" clId="{0A8A9783-B282-41E0-BD53-2C37EE67CB25}" dt="2024-03-21T16:52:32.252" v="1756" actId="20577"/>
+          <ac:spMkLst>
+            <pc:docMk/>
+            <pc:sldMk cId="4293648651" sldId="265"/>
+            <ac:spMk id="3" creationId="{7029F623-D1EE-CED7-D9C7-333B5D9AB451}"/>
+          </ac:spMkLst>
+        </pc:spChg>
         <pc:spChg chg="del">
           <ac:chgData name="Alex Springer" userId="06b1172c4a5245da" providerId="LiveId" clId="{0A8A9783-B282-41E0-BD53-2C37EE67CB25}" dt="2024-03-21T13:07:01.253" v="1" actId="478"/>
           <ac:spMkLst>
@@ -212,26 +258,241 @@
           </ac:picMkLst>
         </pc:picChg>
       </pc:sldChg>
+      <pc:sldChg chg="addSp modSp mod">
+        <pc:chgData name="Alex Springer" userId="06b1172c4a5245da" providerId="LiveId" clId="{0A8A9783-B282-41E0-BD53-2C37EE67CB25}" dt="2024-03-21T17:10:08.144" v="2143" actId="1076"/>
+        <pc:sldMkLst>
+          <pc:docMk/>
+          <pc:sldMk cId="2787621901" sldId="269"/>
+        </pc:sldMkLst>
+        <pc:spChg chg="add mod">
+          <ac:chgData name="Alex Springer" userId="06b1172c4a5245da" providerId="LiveId" clId="{0A8A9783-B282-41E0-BD53-2C37EE67CB25}" dt="2024-03-21T17:10:08.144" v="2143" actId="1076"/>
+          <ac:spMkLst>
+            <pc:docMk/>
+            <pc:sldMk cId="2787621901" sldId="269"/>
+            <ac:spMk id="6" creationId="{53499E59-58BF-39B9-F0FD-C07CCF9D9C28}"/>
+          </ac:spMkLst>
+        </pc:spChg>
+      </pc:sldChg>
+      <pc:sldChg chg="addSp modSp">
+        <pc:chgData name="Alex Springer" userId="06b1172c4a5245da" providerId="LiveId" clId="{0A8A9783-B282-41E0-BD53-2C37EE67CB25}" dt="2024-03-21T17:10:10.414" v="2144"/>
+        <pc:sldMkLst>
+          <pc:docMk/>
+          <pc:sldMk cId="243598708" sldId="270"/>
+        </pc:sldMkLst>
+        <pc:spChg chg="add mod">
+          <ac:chgData name="Alex Springer" userId="06b1172c4a5245da" providerId="LiveId" clId="{0A8A9783-B282-41E0-BD53-2C37EE67CB25}" dt="2024-03-21T17:10:10.414" v="2144"/>
+          <ac:spMkLst>
+            <pc:docMk/>
+            <pc:sldMk cId="243598708" sldId="270"/>
+            <ac:spMk id="5" creationId="{81F1855B-9721-0EC5-83D7-6234F577D9F5}"/>
+          </ac:spMkLst>
+        </pc:spChg>
+      </pc:sldChg>
+      <pc:sldChg chg="addSp modSp">
+        <pc:chgData name="Alex Springer" userId="06b1172c4a5245da" providerId="LiveId" clId="{0A8A9783-B282-41E0-BD53-2C37EE67CB25}" dt="2024-03-21T17:10:14.549" v="2145"/>
+        <pc:sldMkLst>
+          <pc:docMk/>
+          <pc:sldMk cId="3878689247" sldId="271"/>
+        </pc:sldMkLst>
+        <pc:spChg chg="add mod">
+          <ac:chgData name="Alex Springer" userId="06b1172c4a5245da" providerId="LiveId" clId="{0A8A9783-B282-41E0-BD53-2C37EE67CB25}" dt="2024-03-21T17:10:14.549" v="2145"/>
+          <ac:spMkLst>
+            <pc:docMk/>
+            <pc:sldMk cId="3878689247" sldId="271"/>
+            <ac:spMk id="5" creationId="{16F744EE-C2BB-B121-63EA-2AD7EBF2DB79}"/>
+          </ac:spMkLst>
+        </pc:spChg>
+      </pc:sldChg>
+      <pc:sldChg chg="addSp modSp">
+        <pc:chgData name="Alex Springer" userId="06b1172c4a5245da" providerId="LiveId" clId="{0A8A9783-B282-41E0-BD53-2C37EE67CB25}" dt="2024-03-21T17:10:16.389" v="2146"/>
+        <pc:sldMkLst>
+          <pc:docMk/>
+          <pc:sldMk cId="3395255611" sldId="272"/>
+        </pc:sldMkLst>
+        <pc:spChg chg="add mod">
+          <ac:chgData name="Alex Springer" userId="06b1172c4a5245da" providerId="LiveId" clId="{0A8A9783-B282-41E0-BD53-2C37EE67CB25}" dt="2024-03-21T17:10:16.389" v="2146"/>
+          <ac:spMkLst>
+            <pc:docMk/>
+            <pc:sldMk cId="3395255611" sldId="272"/>
+            <ac:spMk id="5" creationId="{AAE0B298-5E1E-5BBA-936C-25E30B200ED1}"/>
+          </ac:spMkLst>
+        </pc:spChg>
+      </pc:sldChg>
+      <pc:sldChg chg="addSp modSp">
+        <pc:chgData name="Alex Springer" userId="06b1172c4a5245da" providerId="LiveId" clId="{0A8A9783-B282-41E0-BD53-2C37EE67CB25}" dt="2024-03-21T17:10:18.850" v="2147"/>
+        <pc:sldMkLst>
+          <pc:docMk/>
+          <pc:sldMk cId="3854534172" sldId="275"/>
+        </pc:sldMkLst>
+        <pc:spChg chg="add mod">
+          <ac:chgData name="Alex Springer" userId="06b1172c4a5245da" providerId="LiveId" clId="{0A8A9783-B282-41E0-BD53-2C37EE67CB25}" dt="2024-03-21T17:10:18.850" v="2147"/>
+          <ac:spMkLst>
+            <pc:docMk/>
+            <pc:sldMk cId="3854534172" sldId="275"/>
+            <ac:spMk id="5" creationId="{08E8BFEA-C023-2F72-90E1-C4B843E8CCCE}"/>
+          </ac:spMkLst>
+        </pc:spChg>
+      </pc:sldChg>
+      <pc:sldChg chg="addSp modSp">
+        <pc:chgData name="Alex Springer" userId="06b1172c4a5245da" providerId="LiveId" clId="{0A8A9783-B282-41E0-BD53-2C37EE67CB25}" dt="2024-03-21T17:10:20.639" v="2148"/>
+        <pc:sldMkLst>
+          <pc:docMk/>
+          <pc:sldMk cId="470683470" sldId="276"/>
+        </pc:sldMkLst>
+        <pc:spChg chg="add mod">
+          <ac:chgData name="Alex Springer" userId="06b1172c4a5245da" providerId="LiveId" clId="{0A8A9783-B282-41E0-BD53-2C37EE67CB25}" dt="2024-03-21T17:10:20.639" v="2148"/>
+          <ac:spMkLst>
+            <pc:docMk/>
+            <pc:sldMk cId="470683470" sldId="276"/>
+            <ac:spMk id="5" creationId="{D1B4FDBA-19C6-B7CE-6A7C-12B446F14CB7}"/>
+          </ac:spMkLst>
+        </pc:spChg>
+      </pc:sldChg>
+      <pc:sldChg chg="addSp modSp">
+        <pc:chgData name="Alex Springer" userId="06b1172c4a5245da" providerId="LiveId" clId="{0A8A9783-B282-41E0-BD53-2C37EE67CB25}" dt="2024-03-21T17:10:22.294" v="2149"/>
+        <pc:sldMkLst>
+          <pc:docMk/>
+          <pc:sldMk cId="2032817318" sldId="277"/>
+        </pc:sldMkLst>
+        <pc:spChg chg="add mod">
+          <ac:chgData name="Alex Springer" userId="06b1172c4a5245da" providerId="LiveId" clId="{0A8A9783-B282-41E0-BD53-2C37EE67CB25}" dt="2024-03-21T17:10:22.294" v="2149"/>
+          <ac:spMkLst>
+            <pc:docMk/>
+            <pc:sldMk cId="2032817318" sldId="277"/>
+            <ac:spMk id="5" creationId="{5866531A-6531-9163-B4E5-D6C8B94F745E}"/>
+          </ac:spMkLst>
+        </pc:spChg>
+      </pc:sldChg>
       <pc:sldChg chg="modSp mod">
-        <pc:chgData name="Alex Springer" userId="06b1172c4a5245da" providerId="LiveId" clId="{0A8A9783-B282-41E0-BD53-2C37EE67CB25}" dt="2024-03-21T13:33:57.821" v="261" actId="20577"/>
+        <pc:chgData name="Alex Springer" userId="06b1172c4a5245da" providerId="LiveId" clId="{0A8A9783-B282-41E0-BD53-2C37EE67CB25}" dt="2024-03-21T16:57:03.131" v="1760" actId="20577"/>
+        <pc:sldMkLst>
+          <pc:docMk/>
+          <pc:sldMk cId="3364636066" sldId="284"/>
+        </pc:sldMkLst>
+        <pc:spChg chg="mod">
+          <ac:chgData name="Alex Springer" userId="06b1172c4a5245da" providerId="LiveId" clId="{0A8A9783-B282-41E0-BD53-2C37EE67CB25}" dt="2024-03-21T16:57:03.131" v="1760" actId="20577"/>
+          <ac:spMkLst>
+            <pc:docMk/>
+            <pc:sldMk cId="3364636066" sldId="284"/>
+            <ac:spMk id="3" creationId="{CFD5D976-A58C-87EE-7C8F-D5A58EB0ADDE}"/>
+          </ac:spMkLst>
+        </pc:spChg>
+      </pc:sldChg>
+      <pc:sldChg chg="modSp mod">
+        <pc:chgData name="Alex Springer" userId="06b1172c4a5245da" providerId="LiveId" clId="{0A8A9783-B282-41E0-BD53-2C37EE67CB25}" dt="2024-03-21T16:05:25.892" v="1226" actId="20577"/>
+        <pc:sldMkLst>
+          <pc:docMk/>
+          <pc:sldMk cId="1730565510" sldId="289"/>
+        </pc:sldMkLst>
+        <pc:spChg chg="mod">
+          <ac:chgData name="Alex Springer" userId="06b1172c4a5245da" providerId="LiveId" clId="{0A8A9783-B282-41E0-BD53-2C37EE67CB25}" dt="2024-03-21T16:05:25.892" v="1226" actId="20577"/>
+          <ac:spMkLst>
+            <pc:docMk/>
+            <pc:sldMk cId="1730565510" sldId="289"/>
+            <ac:spMk id="3" creationId="{2769AD42-448C-1EC1-96C5-C2CEDBB1C31F}"/>
+          </ac:spMkLst>
+        </pc:spChg>
+      </pc:sldChg>
+      <pc:sldChg chg="addSp delSp modSp mod">
+        <pc:chgData name="Alex Springer" userId="06b1172c4a5245da" providerId="LiveId" clId="{0A8A9783-B282-41E0-BD53-2C37EE67CB25}" dt="2024-03-21T16:08:20.635" v="1357" actId="14100"/>
         <pc:sldMkLst>
           <pc:docMk/>
           <pc:sldMk cId="536587020" sldId="290"/>
         </pc:sldMkLst>
         <pc:spChg chg="mod">
-          <ac:chgData name="Alex Springer" userId="06b1172c4a5245da" providerId="LiveId" clId="{0A8A9783-B282-41E0-BD53-2C37EE67CB25}" dt="2024-03-21T13:33:57.821" v="261" actId="20577"/>
+          <ac:chgData name="Alex Springer" userId="06b1172c4a5245da" providerId="LiveId" clId="{0A8A9783-B282-41E0-BD53-2C37EE67CB25}" dt="2024-03-21T16:05:46.732" v="1240" actId="20577"/>
+          <ac:spMkLst>
+            <pc:docMk/>
+            <pc:sldMk cId="536587020" sldId="290"/>
+            <ac:spMk id="2" creationId="{8D41A947-9475-7DD6-729B-8F1914676681}"/>
+          </ac:spMkLst>
+        </pc:spChg>
+        <pc:spChg chg="add del mod">
+          <ac:chgData name="Alex Springer" userId="06b1172c4a5245da" providerId="LiveId" clId="{0A8A9783-B282-41E0-BD53-2C37EE67CB25}" dt="2024-03-21T16:07:14.153" v="1261" actId="931"/>
+          <ac:spMkLst>
+            <pc:docMk/>
+            <pc:sldMk cId="536587020" sldId="290"/>
+            <ac:spMk id="5" creationId="{82721D75-C75B-A0FE-A726-77711F3919B3}"/>
+          </ac:spMkLst>
+        </pc:spChg>
+        <pc:spChg chg="mod">
+          <ac:chgData name="Alex Springer" userId="06b1172c4a5245da" providerId="LiveId" clId="{0A8A9783-B282-41E0-BD53-2C37EE67CB25}" dt="2024-03-21T16:07:30.379" v="1268" actId="1076"/>
           <ac:spMkLst>
             <pc:docMk/>
             <pc:sldMk cId="536587020" sldId="290"/>
             <ac:spMk id="12" creationId="{C434760D-8A18-C374-5EF9-56AFA1808FCC}"/>
           </ac:spMkLst>
         </pc:spChg>
+        <pc:spChg chg="add mod">
+          <ac:chgData name="Alex Springer" userId="06b1172c4a5245da" providerId="LiveId" clId="{0A8A9783-B282-41E0-BD53-2C37EE67CB25}" dt="2024-03-21T16:08:07.413" v="1351" actId="14100"/>
+          <ac:spMkLst>
+            <pc:docMk/>
+            <pc:sldMk cId="536587020" sldId="290"/>
+            <ac:spMk id="27" creationId="{FFF38F55-46EC-6BB9-3905-5309352E0555}"/>
+          </ac:spMkLst>
+        </pc:spChg>
+        <pc:picChg chg="add del">
+          <ac:chgData name="Alex Springer" userId="06b1172c4a5245da" providerId="LiveId" clId="{0A8A9783-B282-41E0-BD53-2C37EE67CB25}" dt="2024-03-21T16:05:52.636" v="1242" actId="22"/>
+          <ac:picMkLst>
+            <pc:docMk/>
+            <pc:sldMk cId="536587020" sldId="290"/>
+            <ac:picMk id="7" creationId="{EF903110-6F74-3392-DB21-F0B614ED14DD}"/>
+          </ac:picMkLst>
+        </pc:picChg>
+        <pc:picChg chg="del">
+          <ac:chgData name="Alex Springer" userId="06b1172c4a5245da" providerId="LiveId" clId="{0A8A9783-B282-41E0-BD53-2C37EE67CB25}" dt="2024-03-21T16:05:42.802" v="1227" actId="478"/>
+          <ac:picMkLst>
+            <pc:docMk/>
+            <pc:sldMk cId="536587020" sldId="290"/>
+            <ac:picMk id="8" creationId="{5CE8A954-54D5-EE14-39FE-C387F2B160AA}"/>
+          </ac:picMkLst>
+        </pc:picChg>
+        <pc:picChg chg="mod">
+          <ac:chgData name="Alex Springer" userId="06b1172c4a5245da" providerId="LiveId" clId="{0A8A9783-B282-41E0-BD53-2C37EE67CB25}" dt="2024-03-21T16:06:08.469" v="1243" actId="14826"/>
+          <ac:picMkLst>
+            <pc:docMk/>
+            <pc:sldMk cId="536587020" sldId="290"/>
+            <ac:picMk id="10" creationId="{19D57D6C-3685-8495-D5BA-22DA85FC2CA5}"/>
+          </ac:picMkLst>
+        </pc:picChg>
+        <pc:picChg chg="add mod">
+          <ac:chgData name="Alex Springer" userId="06b1172c4a5245da" providerId="LiveId" clId="{0A8A9783-B282-41E0-BD53-2C37EE67CB25}" dt="2024-03-21T16:07:19.499" v="1264" actId="1076"/>
+          <ac:picMkLst>
+            <pc:docMk/>
+            <pc:sldMk cId="536587020" sldId="290"/>
+            <ac:picMk id="24" creationId="{99F7BD67-DF65-1C3D-6AD0-B7760FC86C70}"/>
+          </ac:picMkLst>
+        </pc:picChg>
         <pc:cxnChg chg="mod">
-          <ac:chgData name="Alex Springer" userId="06b1172c4a5245da" providerId="LiveId" clId="{0A8A9783-B282-41E0-BD53-2C37EE67CB25}" dt="2024-03-21T13:33:57.821" v="261" actId="20577"/>
+          <ac:chgData name="Alex Springer" userId="06b1172c4a5245da" providerId="LiveId" clId="{0A8A9783-B282-41E0-BD53-2C37EE67CB25}" dt="2024-03-21T16:07:33.707" v="1269" actId="14100"/>
           <ac:cxnSpMkLst>
             <pc:docMk/>
             <pc:sldMk cId="536587020" sldId="290"/>
             <ac:cxnSpMk id="14" creationId="{BAA93EE7-341D-E3D7-2067-222BB3EF9892}"/>
+          </ac:cxnSpMkLst>
+        </pc:cxnChg>
+        <pc:cxnChg chg="add mod">
+          <ac:chgData name="Alex Springer" userId="06b1172c4a5245da" providerId="LiveId" clId="{0A8A9783-B282-41E0-BD53-2C37EE67CB25}" dt="2024-03-21T16:07:36.052" v="1270" actId="14100"/>
+          <ac:cxnSpMkLst>
+            <pc:docMk/>
+            <pc:sldMk cId="536587020" sldId="290"/>
+            <ac:cxnSpMk id="15" creationId="{DF6C05DF-C478-10F7-B194-7C57D4634575}"/>
+          </ac:cxnSpMkLst>
+        </pc:cxnChg>
+        <pc:cxnChg chg="add mod">
+          <ac:chgData name="Alex Springer" userId="06b1172c4a5245da" providerId="LiveId" clId="{0A8A9783-B282-41E0-BD53-2C37EE67CB25}" dt="2024-03-21T16:08:15.003" v="1354" actId="14100"/>
+          <ac:cxnSpMkLst>
+            <pc:docMk/>
+            <pc:sldMk cId="536587020" sldId="290"/>
+            <ac:cxnSpMk id="28" creationId="{C1E1287A-FCDE-1579-FB97-CA14618B538A}"/>
+          </ac:cxnSpMkLst>
+        </pc:cxnChg>
+        <pc:cxnChg chg="add mod">
+          <ac:chgData name="Alex Springer" userId="06b1172c4a5245da" providerId="LiveId" clId="{0A8A9783-B282-41E0-BD53-2C37EE67CB25}" dt="2024-03-21T16:08:20.635" v="1357" actId="14100"/>
+          <ac:cxnSpMkLst>
+            <pc:docMk/>
+            <pc:sldMk cId="536587020" sldId="290"/>
+            <ac:cxnSpMk id="31" creationId="{F3C5ACC0-CBB5-64FC-06A4-ACC7E332312B}"/>
           </ac:cxnSpMkLst>
         </pc:cxnChg>
       </pc:sldChg>
@@ -249,6 +510,13 @@
             <ac:spMk id="3" creationId="{1EEEDFF7-B1C0-5818-47A1-A7173287266E}"/>
           </ac:spMkLst>
         </pc:spChg>
+      </pc:sldChg>
+      <pc:sldChg chg="del">
+        <pc:chgData name="Alex Springer" userId="06b1172c4a5245da" providerId="LiveId" clId="{0A8A9783-B282-41E0-BD53-2C37EE67CB25}" dt="2024-03-21T16:08:42.043" v="1358" actId="47"/>
+        <pc:sldMkLst>
+          <pc:docMk/>
+          <pc:sldMk cId="808134078" sldId="293"/>
+        </pc:sldMkLst>
       </pc:sldChg>
       <pc:sldChg chg="modSp mod">
         <pc:chgData name="Alex Springer" userId="06b1172c4a5245da" providerId="LiveId" clId="{0A8A9783-B282-41E0-BD53-2C37EE67CB25}" dt="2024-03-21T13:26:21.033" v="61"/>
@@ -361,13 +629,13 @@
         </pc:graphicFrameChg>
       </pc:sldChg>
       <pc:sldChg chg="addSp delSp modSp mod setBg">
-        <pc:chgData name="Alex Springer" userId="06b1172c4a5245da" providerId="LiveId" clId="{0A8A9783-B282-41E0-BD53-2C37EE67CB25}" dt="2024-03-21T13:46:10.681" v="286" actId="14100"/>
+        <pc:chgData name="Alex Springer" userId="06b1172c4a5245da" providerId="LiveId" clId="{0A8A9783-B282-41E0-BD53-2C37EE67CB25}" dt="2024-03-21T16:18:05.935" v="1743" actId="1038"/>
         <pc:sldMkLst>
           <pc:docMk/>
           <pc:sldMk cId="2487425827" sldId="299"/>
         </pc:sldMkLst>
         <pc:spChg chg="mod ord">
-          <ac:chgData name="Alex Springer" userId="06b1172c4a5245da" providerId="LiveId" clId="{0A8A9783-B282-41E0-BD53-2C37EE67CB25}" dt="2024-03-21T13:46:05.377" v="285" actId="1076"/>
+          <ac:chgData name="Alex Springer" userId="06b1172c4a5245da" providerId="LiveId" clId="{0A8A9783-B282-41E0-BD53-2C37EE67CB25}" dt="2024-03-21T16:18:05.935" v="1743" actId="1038"/>
           <ac:spMkLst>
             <pc:docMk/>
             <pc:sldMk cId="2487425827" sldId="299"/>
@@ -424,13 +692,13 @@
         </pc:cxnChg>
       </pc:sldChg>
       <pc:sldChg chg="addSp delSp modSp new mod modClrScheme chgLayout">
-        <pc:chgData name="Alex Springer" userId="06b1172c4a5245da" providerId="LiveId" clId="{0A8A9783-B282-41E0-BD53-2C37EE67CB25}" dt="2024-03-21T13:59:05.860" v="859" actId="20577"/>
+        <pc:chgData name="Alex Springer" userId="06b1172c4a5245da" providerId="LiveId" clId="{0A8A9783-B282-41E0-BD53-2C37EE67CB25}" dt="2024-03-21T16:12:18.798" v="1575" actId="20577"/>
         <pc:sldMkLst>
           <pc:docMk/>
           <pc:sldMk cId="1112918404" sldId="300"/>
         </pc:sldMkLst>
         <pc:spChg chg="mod ord">
-          <ac:chgData name="Alex Springer" userId="06b1172c4a5245da" providerId="LiveId" clId="{0A8A9783-B282-41E0-BD53-2C37EE67CB25}" dt="2024-03-21T13:56:14.139" v="499" actId="700"/>
+          <ac:chgData name="Alex Springer" userId="06b1172c4a5245da" providerId="LiveId" clId="{0A8A9783-B282-41E0-BD53-2C37EE67CB25}" dt="2024-03-21T16:12:18.798" v="1575" actId="20577"/>
           <ac:spMkLst>
             <pc:docMk/>
             <pc:sldMk cId="1112918404" sldId="300"/>
@@ -596,30 +864,157 @@
           </ac:picMkLst>
         </pc:picChg>
       </pc:sldChg>
+      <pc:sldChg chg="addSp delSp modSp new mod">
+        <pc:chgData name="Alex Springer" userId="06b1172c4a5245da" providerId="LiveId" clId="{0A8A9783-B282-41E0-BD53-2C37EE67CB25}" dt="2024-03-21T16:17:27.259" v="1731" actId="1076"/>
+        <pc:sldMkLst>
+          <pc:docMk/>
+          <pc:sldMk cId="2667398686" sldId="301"/>
+        </pc:sldMkLst>
+        <pc:spChg chg="mod">
+          <ac:chgData name="Alex Springer" userId="06b1172c4a5245da" providerId="LiveId" clId="{0A8A9783-B282-41E0-BD53-2C37EE67CB25}" dt="2024-03-21T16:17:27.259" v="1731" actId="1076"/>
+          <ac:spMkLst>
+            <pc:docMk/>
+            <pc:sldMk cId="2667398686" sldId="301"/>
+            <ac:spMk id="2" creationId="{29AB466D-0B17-3690-0B8D-14CBC0D2E4CC}"/>
+          </ac:spMkLst>
+        </pc:spChg>
+        <pc:spChg chg="del">
+          <ac:chgData name="Alex Springer" userId="06b1172c4a5245da" providerId="LiveId" clId="{0A8A9783-B282-41E0-BD53-2C37EE67CB25}" dt="2024-03-21T15:33:13.290" v="1080" actId="931"/>
+          <ac:spMkLst>
+            <pc:docMk/>
+            <pc:sldMk cId="2667398686" sldId="301"/>
+            <ac:spMk id="3" creationId="{CDB4102B-B00D-3D9A-2A85-ED05B376BD21}"/>
+          </ac:spMkLst>
+        </pc:spChg>
+        <pc:picChg chg="add mod">
+          <ac:chgData name="Alex Springer" userId="06b1172c4a5245da" providerId="LiveId" clId="{0A8A9783-B282-41E0-BD53-2C37EE67CB25}" dt="2024-03-21T15:33:31.221" v="1085" actId="14100"/>
+          <ac:picMkLst>
+            <pc:docMk/>
+            <pc:sldMk cId="2667398686" sldId="301"/>
+            <ac:picMk id="6" creationId="{E278EF40-98E6-265C-340B-D5999C526554}"/>
+          </ac:picMkLst>
+        </pc:picChg>
+      </pc:sldChg>
+      <pc:sldChg chg="addSp delSp modSp new mod">
+        <pc:chgData name="Alex Springer" userId="06b1172c4a5245da" providerId="LiveId" clId="{0A8A9783-B282-41E0-BD53-2C37EE67CB25}" dt="2024-03-21T16:10:43.790" v="1397" actId="20577"/>
+        <pc:sldMkLst>
+          <pc:docMk/>
+          <pc:sldMk cId="2027947661" sldId="302"/>
+        </pc:sldMkLst>
+        <pc:spChg chg="mod">
+          <ac:chgData name="Alex Springer" userId="06b1172c4a5245da" providerId="LiveId" clId="{0A8A9783-B282-41E0-BD53-2C37EE67CB25}" dt="2024-03-21T16:10:43.790" v="1397" actId="20577"/>
+          <ac:spMkLst>
+            <pc:docMk/>
+            <pc:sldMk cId="2027947661" sldId="302"/>
+            <ac:spMk id="2" creationId="{ED8D7DD6-0955-ACDD-532A-9CEB1E96F69D}"/>
+          </ac:spMkLst>
+        </pc:spChg>
+        <pc:spChg chg="del">
+          <ac:chgData name="Alex Springer" userId="06b1172c4a5245da" providerId="LiveId" clId="{0A8A9783-B282-41E0-BD53-2C37EE67CB25}" dt="2024-03-21T16:10:05.316" v="1361" actId="931"/>
+          <ac:spMkLst>
+            <pc:docMk/>
+            <pc:sldMk cId="2027947661" sldId="302"/>
+            <ac:spMk id="3" creationId="{A7CDFF40-AE0A-0568-F75E-86A020601399}"/>
+          </ac:spMkLst>
+        </pc:spChg>
+        <pc:spChg chg="del">
+          <ac:chgData name="Alex Springer" userId="06b1172c4a5245da" providerId="LiveId" clId="{0A8A9783-B282-41E0-BD53-2C37EE67CB25}" dt="2024-03-21T16:10:16.163" v="1364" actId="931"/>
+          <ac:spMkLst>
+            <pc:docMk/>
+            <pc:sldMk cId="2027947661" sldId="302"/>
+            <ac:spMk id="4" creationId="{1E9ACF91-355B-344A-1534-5CF9FEF0B384}"/>
+          </ac:spMkLst>
+        </pc:spChg>
+        <pc:picChg chg="add mod">
+          <ac:chgData name="Alex Springer" userId="06b1172c4a5245da" providerId="LiveId" clId="{0A8A9783-B282-41E0-BD53-2C37EE67CB25}" dt="2024-03-21T16:10:18.940" v="1367" actId="1076"/>
+          <ac:picMkLst>
+            <pc:docMk/>
+            <pc:sldMk cId="2027947661" sldId="302"/>
+            <ac:picMk id="7" creationId="{F3628576-B0FF-09E8-8D45-6CA59538DED4}"/>
+          </ac:picMkLst>
+        </pc:picChg>
+        <pc:picChg chg="add mod">
+          <ac:chgData name="Alex Springer" userId="06b1172c4a5245da" providerId="LiveId" clId="{0A8A9783-B282-41E0-BD53-2C37EE67CB25}" dt="2024-03-21T16:10:18.940" v="1367" actId="1076"/>
+          <ac:picMkLst>
+            <pc:docMk/>
+            <pc:sldMk cId="2027947661" sldId="302"/>
+            <ac:picMk id="9" creationId="{FAC696FB-F325-955E-969A-BEDC6E146D74}"/>
+          </ac:picMkLst>
+        </pc:picChg>
+      </pc:sldChg>
+      <pc:sldChg chg="addSp delSp modSp add mod modClrScheme chgLayout">
+        <pc:chgData name="Alex Springer" userId="06b1172c4a5245da" providerId="LiveId" clId="{0A8A9783-B282-41E0-BD53-2C37EE67CB25}" dt="2024-03-21T16:13:04.511" v="1704" actId="20577"/>
+        <pc:sldMkLst>
+          <pc:docMk/>
+          <pc:sldMk cId="2183328658" sldId="303"/>
+        </pc:sldMkLst>
+        <pc:spChg chg="mod ord">
+          <ac:chgData name="Alex Springer" userId="06b1172c4a5245da" providerId="LiveId" clId="{0A8A9783-B282-41E0-BD53-2C37EE67CB25}" dt="2024-03-21T16:12:22.376" v="1576"/>
+          <ac:spMkLst>
+            <pc:docMk/>
+            <pc:sldMk cId="2183328658" sldId="303"/>
+            <ac:spMk id="2" creationId="{08725BC1-0C54-9DB4-6646-7110E68B784C}"/>
+          </ac:spMkLst>
+        </pc:spChg>
+        <pc:spChg chg="mod ord">
+          <ac:chgData name="Alex Springer" userId="06b1172c4a5245da" providerId="LiveId" clId="{0A8A9783-B282-41E0-BD53-2C37EE67CB25}" dt="2024-03-21T16:13:04.511" v="1704" actId="20577"/>
+          <ac:spMkLst>
+            <pc:docMk/>
+            <pc:sldMk cId="2183328658" sldId="303"/>
+            <ac:spMk id="3" creationId="{6828E9B9-73E2-AA70-F23C-A91F26C28A69}"/>
+          </ac:spMkLst>
+        </pc:spChg>
+        <pc:spChg chg="mod ord">
+          <ac:chgData name="Alex Springer" userId="06b1172c4a5245da" providerId="LiveId" clId="{0A8A9783-B282-41E0-BD53-2C37EE67CB25}" dt="2024-03-21T16:11:23.320" v="1411" actId="700"/>
+          <ac:spMkLst>
+            <pc:docMk/>
+            <pc:sldMk cId="2183328658" sldId="303"/>
+            <ac:spMk id="4" creationId="{1F2EECEF-F1C5-246C-1EE7-282854153819}"/>
+          </ac:spMkLst>
+        </pc:spChg>
+        <pc:spChg chg="add del mod">
+          <ac:chgData name="Alex Springer" userId="06b1172c4a5245da" providerId="LiveId" clId="{0A8A9783-B282-41E0-BD53-2C37EE67CB25}" dt="2024-03-21T16:11:23.320" v="1411" actId="700"/>
+          <ac:spMkLst>
+            <pc:docMk/>
+            <pc:sldMk cId="2183328658" sldId="303"/>
+            <ac:spMk id="6" creationId="{0B7E77A7-A0FA-825C-027B-C8877D19C6BE}"/>
+          </ac:spMkLst>
+        </pc:spChg>
+        <pc:picChg chg="del">
+          <ac:chgData name="Alex Springer" userId="06b1172c4a5245da" providerId="LiveId" clId="{0A8A9783-B282-41E0-BD53-2C37EE67CB25}" dt="2024-03-21T16:11:18.466" v="1410" actId="478"/>
+          <ac:picMkLst>
+            <pc:docMk/>
+            <pc:sldMk cId="2183328658" sldId="303"/>
+            <ac:picMk id="7" creationId="{CA6AE6D5-4670-5F34-BEBD-A8F9222FA4DB}"/>
+          </ac:picMkLst>
+        </pc:picChg>
+      </pc:sldChg>
+      <pc:sldChg chg="modSp new mod">
+        <pc:chgData name="Alex Springer" userId="06b1172c4a5245da" providerId="LiveId" clId="{0A8A9783-B282-41E0-BD53-2C37EE67CB25}" dt="2024-03-21T17:07:24.396" v="2124" actId="20577"/>
+        <pc:sldMkLst>
+          <pc:docMk/>
+          <pc:sldMk cId="2395649515" sldId="304"/>
+        </pc:sldMkLst>
+        <pc:spChg chg="mod">
+          <ac:chgData name="Alex Springer" userId="06b1172c4a5245da" providerId="LiveId" clId="{0A8A9783-B282-41E0-BD53-2C37EE67CB25}" dt="2024-03-21T17:05:29.677" v="1774" actId="20577"/>
+          <ac:spMkLst>
+            <pc:docMk/>
+            <pc:sldMk cId="2395649515" sldId="304"/>
+            <ac:spMk id="2" creationId="{797C8834-A0E3-3E2D-C310-F71202E5F32C}"/>
+          </ac:spMkLst>
+        </pc:spChg>
+        <pc:spChg chg="mod">
+          <ac:chgData name="Alex Springer" userId="06b1172c4a5245da" providerId="LiveId" clId="{0A8A9783-B282-41E0-BD53-2C37EE67CB25}" dt="2024-03-21T17:07:24.396" v="2124" actId="20577"/>
+          <ac:spMkLst>
+            <pc:docMk/>
+            <pc:sldMk cId="2395649515" sldId="304"/>
+            <ac:spMk id="3" creationId="{C1972EE4-40B9-7EAE-D211-9A44436F7493}"/>
+          </ac:spMkLst>
+        </pc:spChg>
+      </pc:sldChg>
     </pc:docChg>
   </pc:docChgLst>
 </pc:chgInfo>
-</file>
-
-<file path=ppt/comments/modernComment_100_9254ADBF.xml><?xml version="1.0" encoding="utf-8"?>
-<p188:cmLst xmlns:a="http://schemas.openxmlformats.org/drawingml/2006/main" xmlns:r="http://schemas.openxmlformats.org/officeDocument/2006/relationships" xmlns:p188="http://schemas.microsoft.com/office/powerpoint/2018/8/main">
-  <p188:cm id="{E763F4DB-CD95-4014-95D3-137DF656DFA5}" authorId="{A6428A73-3905-E9F1-1CD6-43B4FAAB7485}" created="2024-02-27T23:04:02.374">
-    <pc:sldMkLst xmlns:pc="http://schemas.microsoft.com/office/powerpoint/2013/main/command">
-      <pc:docMk/>
-      <pc:sldMk cId="2455023039" sldId="256"/>
-    </pc:sldMkLst>
-    <p188:txBody>
-      <a:bodyPr/>
-      <a:lstStyle/>
-      <a:p>
-        <a:r>
-          <a:rPr lang="en-US"/>
-          <a:t>Need a slide with variables</a:t>
-        </a:r>
-      </a:p>
-    </p188:txBody>
-  </p188:cm>
-</p188:cmLst>
 </file>
 
 <file path=ppt/diagrams/colors1.xml><?xml version="1.0" encoding="utf-8"?>
@@ -8185,13 +8580,13 @@
         </p:spPr>
         <p:txBody>
           <a:bodyPr>
-            <a:normAutofit fontScale="90000"/>
+            <a:normAutofit/>
           </a:bodyPr>
           <a:lstStyle/>
           <a:p>
             <a:r>
               <a:rPr lang="en-US" dirty="0"/>
-              <a:t>Tracking and Control of Air-Launched Fixed-Wing Autonomous Drone Swarm</a:t>
+              <a:t>Autonomous Control of Air-Launched Fixed-Wing Drone Swarm</a:t>
             </a:r>
           </a:p>
         </p:txBody>
@@ -8238,7 +8633,7 @@
                   </a:schemeClr>
                 </a:solidFill>
               </a:rPr>
-              <a:t>Alex Springer, 2021 through 2024</a:t>
+              <a:t>Alex Springer, June 2021 - May 2024</a:t>
             </a:r>
           </a:p>
         </p:txBody>
@@ -8253,11 +8648,6 @@
   <p:clrMapOvr>
     <a:masterClrMapping/>
   </p:clrMapOvr>
-  <p:extLst>
-    <p:ext uri="{6950BFC3-D8DA-4A85-94F7-54DA5524770B}">
-      <p188:commentRel xmlns:p188="http://schemas.microsoft.com/office/powerpoint/2018/8/main" r:id="rId2"/>
-    </p:ext>
-  </p:extLst>
 </p:sld>
 </file>
 
@@ -9191,6 +9581,46 @@
               <a:t>10</a:t>
             </a:fld>
             <a:endParaRPr dirty="0"/>
+          </a:p>
+        </p:txBody>
+      </p:sp>
+      <p:sp>
+        <p:nvSpPr>
+          <p:cNvPr id="5" name="TextBox 4">
+            <a:extLst>
+              <a:ext uri="{FF2B5EF4-FFF2-40B4-BE49-F238E27FC236}">
+                <a16:creationId xmlns:a16="http://schemas.microsoft.com/office/drawing/2014/main" id="{AAE0B298-5E1E-5BBA-936C-25E30B200ED1}"/>
+              </a:ext>
+            </a:extLst>
+          </p:cNvPr>
+          <p:cNvSpPr txBox="1"/>
+          <p:nvPr/>
+        </p:nvSpPr>
+        <p:spPr>
+          <a:xfrm>
+            <a:off x="152400" y="5539390"/>
+            <a:ext cx="10668000" cy="369332"/>
+          </a:xfrm>
+          <a:prstGeom prst="rect">
+            <a:avLst/>
+          </a:prstGeom>
+          <a:noFill/>
+        </p:spPr>
+        <p:txBody>
+          <a:bodyPr wrap="square">
+            <a:spAutoFit/>
+          </a:bodyPr>
+          <a:lstStyle/>
+          <a:p>
+            <a:r>
+              <a:rPr lang="en-US" dirty="0"/>
+              <a:t>Reference: Modern Flight Dynamics by Dr. John </a:t>
+            </a:r>
+            <a:r>
+              <a:rPr lang="en-US" dirty="0" err="1"/>
+              <a:t>Schierman</a:t>
+            </a:r>
+            <a:endParaRPr lang="en-US" dirty="0"/>
           </a:p>
         </p:txBody>
       </p:sp>
@@ -10229,6 +10659,46 @@
               <a:t>11</a:t>
             </a:fld>
             <a:endParaRPr dirty="0"/>
+          </a:p>
+        </p:txBody>
+      </p:sp>
+      <p:sp>
+        <p:nvSpPr>
+          <p:cNvPr id="5" name="TextBox 4">
+            <a:extLst>
+              <a:ext uri="{FF2B5EF4-FFF2-40B4-BE49-F238E27FC236}">
+                <a16:creationId xmlns:a16="http://schemas.microsoft.com/office/drawing/2014/main" id="{08E8BFEA-C023-2F72-90E1-C4B843E8CCCE}"/>
+              </a:ext>
+            </a:extLst>
+          </p:cNvPr>
+          <p:cNvSpPr txBox="1"/>
+          <p:nvPr/>
+        </p:nvSpPr>
+        <p:spPr>
+          <a:xfrm>
+            <a:off x="152400" y="5539390"/>
+            <a:ext cx="10668000" cy="369332"/>
+          </a:xfrm>
+          <a:prstGeom prst="rect">
+            <a:avLst/>
+          </a:prstGeom>
+          <a:noFill/>
+        </p:spPr>
+        <p:txBody>
+          <a:bodyPr wrap="square">
+            <a:spAutoFit/>
+          </a:bodyPr>
+          <a:lstStyle/>
+          <a:p>
+            <a:r>
+              <a:rPr lang="en-US" dirty="0"/>
+              <a:t>Reference: Modern Flight Dynamics by Dr. John </a:t>
+            </a:r>
+            <a:r>
+              <a:rPr lang="en-US" dirty="0" err="1"/>
+              <a:t>Schierman</a:t>
+            </a:r>
+            <a:endParaRPr lang="en-US" dirty="0"/>
           </a:p>
         </p:txBody>
       </p:sp>
@@ -11477,6 +11947,46 @@
               <a:t>12</a:t>
             </a:fld>
             <a:endParaRPr dirty="0"/>
+          </a:p>
+        </p:txBody>
+      </p:sp>
+      <p:sp>
+        <p:nvSpPr>
+          <p:cNvPr id="5" name="TextBox 4">
+            <a:extLst>
+              <a:ext uri="{FF2B5EF4-FFF2-40B4-BE49-F238E27FC236}">
+                <a16:creationId xmlns:a16="http://schemas.microsoft.com/office/drawing/2014/main" id="{D1B4FDBA-19C6-B7CE-6A7C-12B446F14CB7}"/>
+              </a:ext>
+            </a:extLst>
+          </p:cNvPr>
+          <p:cNvSpPr txBox="1"/>
+          <p:nvPr/>
+        </p:nvSpPr>
+        <p:spPr>
+          <a:xfrm>
+            <a:off x="152400" y="5539390"/>
+            <a:ext cx="10668000" cy="369332"/>
+          </a:xfrm>
+          <a:prstGeom prst="rect">
+            <a:avLst/>
+          </a:prstGeom>
+          <a:noFill/>
+        </p:spPr>
+        <p:txBody>
+          <a:bodyPr wrap="square">
+            <a:spAutoFit/>
+          </a:bodyPr>
+          <a:lstStyle/>
+          <a:p>
+            <a:r>
+              <a:rPr lang="en-US" dirty="0"/>
+              <a:t>Reference: Modern Flight Dynamics by Dr. John </a:t>
+            </a:r>
+            <a:r>
+              <a:rPr lang="en-US" dirty="0" err="1"/>
+              <a:t>Schierman</a:t>
+            </a:r>
+            <a:endParaRPr lang="en-US" dirty="0"/>
           </a:p>
         </p:txBody>
       </p:sp>
@@ -12789,6 +13299,46 @@
               <a:t>13</a:t>
             </a:fld>
             <a:endParaRPr dirty="0"/>
+          </a:p>
+        </p:txBody>
+      </p:sp>
+      <p:sp>
+        <p:nvSpPr>
+          <p:cNvPr id="5" name="TextBox 4">
+            <a:extLst>
+              <a:ext uri="{FF2B5EF4-FFF2-40B4-BE49-F238E27FC236}">
+                <a16:creationId xmlns:a16="http://schemas.microsoft.com/office/drawing/2014/main" id="{5866531A-6531-9163-B4E5-D6C8B94F745E}"/>
+              </a:ext>
+            </a:extLst>
+          </p:cNvPr>
+          <p:cNvSpPr txBox="1"/>
+          <p:nvPr/>
+        </p:nvSpPr>
+        <p:spPr>
+          <a:xfrm>
+            <a:off x="152400" y="5539390"/>
+            <a:ext cx="10668000" cy="369332"/>
+          </a:xfrm>
+          <a:prstGeom prst="rect">
+            <a:avLst/>
+          </a:prstGeom>
+          <a:noFill/>
+        </p:spPr>
+        <p:txBody>
+          <a:bodyPr wrap="square">
+            <a:spAutoFit/>
+          </a:bodyPr>
+          <a:lstStyle/>
+          <a:p>
+            <a:r>
+              <a:rPr lang="en-US" dirty="0"/>
+              <a:t>Reference: Modern Flight Dynamics by Dr. John </a:t>
+            </a:r>
+            <a:r>
+              <a:rPr lang="en-US" dirty="0" err="1"/>
+              <a:t>Schierman</a:t>
+            </a:r>
+            <a:endParaRPr lang="en-US" dirty="0"/>
           </a:p>
         </p:txBody>
       </p:sp>
@@ -14943,8 +15493,8 @@
           </a:p>
         </p:txBody>
       </p:sp>
-      <mc:AlternateContent xmlns:mc="http://schemas.openxmlformats.org/markup-compatibility/2006" xmlns:a14="http://schemas.microsoft.com/office/drawing/2010/main">
-        <mc:Choice Requires="a14">
+      <mc:AlternateContent xmlns:mc="http://schemas.openxmlformats.org/markup-compatibility/2006">
+        <mc:Choice xmlns:a14="http://schemas.microsoft.com/office/drawing/2010/main" Requires="a14">
           <p:sp>
             <p:nvSpPr>
               <p:cNvPr id="3" name="Content Placeholder 2">
@@ -14974,7 +15524,7 @@
                 </a:pPr>
                 <a:r>
                   <a:rPr lang="en-US" dirty="0"/>
-                  <a:t>Once altitude is stabilized, fly as fast as possible until within 1 mile of the flyover point</a:t>
+                  <a:t>Once altitude is stabilized, fly as fast as possible until within 2 miles of the flyover point</a:t>
                 </a:r>
               </a:p>
               <a:p>
@@ -15081,7 +15631,7 @@
                     <a:latin typeface="Cambria Math" panose="02040503050406030204" pitchFamily="18" charset="0"/>
                     <a:ea typeface="Cambria Math" panose="02040503050406030204" pitchFamily="18" charset="0"/>
                   </a:rPr>
-                  <a:t> 1 mile:</a:t>
+                  <a:t> 2 miles:</a:t>
                 </a:r>
               </a:p>
               <a:p>
@@ -15255,7 +15805,7 @@
             </p:txBody>
           </p:sp>
         </mc:Choice>
-        <mc:Fallback xmlns="">
+        <mc:Fallback>
           <p:sp>
             <p:nvSpPr>
               <p:cNvPr id="3" name="Content Placeholder 2">
@@ -15742,7 +16292,7 @@
             <a:pPr algn="ctr"/>
             <a:r>
               <a:rPr lang="en-US" dirty="0"/>
-              <a:t>Use-Case: Search and Rescue in Difficult Terrain</a:t>
+              <a:t>Use-Case: Search and Rescue in Mountainous Terrain</a:t>
             </a:r>
           </a:p>
         </p:txBody>
@@ -17255,7 +17805,28 @@
           <a:p>
             <a:r>
               <a:rPr lang="en-US" sz="2000" dirty="0"/>
-              <a:t>After 120 seconds, command trajectory: 60 knots, 1 degree climb, West heading (270</a:t>
+              <a:t>Initial conditions: 50 knots, level flight, North heading (0</a:t>
+            </a:r>
+            <a:r>
+              <a:rPr lang="en-US" sz="2000" baseline="30000" dirty="0"/>
+              <a:t>o</a:t>
+            </a:r>
+            <a:r>
+              <a:rPr lang="en-US" sz="2000" dirty="0"/>
+              <a:t>)</a:t>
+            </a:r>
+          </a:p>
+          <a:p>
+            <a:pPr lvl="1"/>
+            <a:r>
+              <a:rPr lang="en-US" sz="1600" dirty="0"/>
+              <a:t>15 knot wind out of the west</a:t>
+            </a:r>
+          </a:p>
+          <a:p>
+            <a:r>
+              <a:rPr lang="en-US" sz="2000" dirty="0"/>
+              <a:t>After 120 seconds, command trajectory: 95 knots, 6-degree ascent, West heading (270</a:t>
             </a:r>
             <a:r>
               <a:rPr lang="en-US" sz="2000" baseline="30000" dirty="0"/>
@@ -17269,13 +17840,19 @@
           <a:p>
             <a:r>
               <a:rPr lang="en-US" sz="2000" dirty="0"/>
-              <a:t>After 360 seconds, command flyover: 50 knots, 4000 feet MSL, (36.530367, -112.057600)</a:t>
+              <a:t>After 600 seconds, command flyover: 50 knots, 11000 feet MSL, (36.530367, -112.057600)</a:t>
             </a:r>
           </a:p>
           <a:p>
             <a:r>
               <a:rPr lang="en-US" sz="2000" dirty="0"/>
-              <a:t>Simulate 15 total minutes of flight time</a:t>
+              <a:t>After 1800 seconds, command flyover: 50 knots, 7700 feet MSL, (36.449291, -112.399009)</a:t>
+            </a:r>
+          </a:p>
+          <a:p>
+            <a:r>
+              <a:rPr lang="en-US" sz="2000" dirty="0"/>
+              <a:t>Simulate 45 total minutes of flight time</a:t>
             </a:r>
             <a:endParaRPr lang="en-US" sz="1600" dirty="0"/>
           </a:p>
@@ -17333,6 +17910,138 @@
   <p:cSld>
     <p:spTree>
       <p:nvGrpSpPr>
+        <p:cNvPr id="1" name=""/>
+        <p:cNvGrpSpPr/>
+        <p:nvPr/>
+      </p:nvGrpSpPr>
+      <p:grpSpPr>
+        <a:xfrm>
+          <a:off x="0" y="0"/>
+          <a:ext cx="0" cy="0"/>
+          <a:chOff x="0" y="0"/>
+          <a:chExt cx="0" cy="0"/>
+        </a:xfrm>
+      </p:grpSpPr>
+      <p:sp>
+        <p:nvSpPr>
+          <p:cNvPr id="2" name="Title 1">
+            <a:extLst>
+              <a:ext uri="{FF2B5EF4-FFF2-40B4-BE49-F238E27FC236}">
+                <a16:creationId xmlns:a16="http://schemas.microsoft.com/office/drawing/2014/main" id="{29AB466D-0B17-3690-0B8D-14CBC0D2E4CC}"/>
+              </a:ext>
+            </a:extLst>
+          </p:cNvPr>
+          <p:cNvSpPr>
+            <a:spLocks noGrp="1"/>
+          </p:cNvSpPr>
+          <p:nvPr>
+            <p:ph type="title"/>
+          </p:nvPr>
+        </p:nvSpPr>
+        <p:spPr>
+          <a:xfrm>
+            <a:off x="161926" y="171694"/>
+            <a:ext cx="10515600" cy="1325563"/>
+          </a:xfrm>
+        </p:spPr>
+        <p:txBody>
+          <a:bodyPr/>
+          <a:lstStyle/>
+          <a:p>
+            <a:r>
+              <a:rPr lang="en-US" dirty="0"/>
+              <a:t>Results</a:t>
+            </a:r>
+          </a:p>
+        </p:txBody>
+      </p:sp>
+      <p:pic>
+        <p:nvPicPr>
+          <p:cNvPr id="6" name="Content Placeholder 5" descr="A satellite view of a mountain range&#10;&#10;Description automatically generated">
+            <a:extLst>
+              <a:ext uri="{FF2B5EF4-FFF2-40B4-BE49-F238E27FC236}">
+                <a16:creationId xmlns:a16="http://schemas.microsoft.com/office/drawing/2014/main" id="{E278EF40-98E6-265C-340B-D5999C526554}"/>
+              </a:ext>
+            </a:extLst>
+          </p:cNvPr>
+          <p:cNvPicPr>
+            <a:picLocks noGrp="1" noChangeAspect="1"/>
+          </p:cNvPicPr>
+          <p:nvPr>
+            <p:ph idx="1"/>
+          </p:nvPr>
+        </p:nvPicPr>
+        <p:blipFill>
+          <a:blip r:embed="rId2">
+            <a:extLst>
+              <a:ext uri="{28A0092B-C50C-407E-A947-70E740481C1C}">
+                <a14:useLocalDpi xmlns:a14="http://schemas.microsoft.com/office/drawing/2010/main" val="0"/>
+              </a:ext>
+            </a:extLst>
+          </a:blip>
+          <a:stretch>
+            <a:fillRect/>
+          </a:stretch>
+        </p:blipFill>
+        <p:spPr>
+          <a:xfrm>
+            <a:off x="2286000" y="0"/>
+            <a:ext cx="9906001" cy="5905743"/>
+          </a:xfrm>
+        </p:spPr>
+      </p:pic>
+      <p:sp>
+        <p:nvSpPr>
+          <p:cNvPr id="4" name="Slide Number Placeholder 3">
+            <a:extLst>
+              <a:ext uri="{FF2B5EF4-FFF2-40B4-BE49-F238E27FC236}">
+                <a16:creationId xmlns:a16="http://schemas.microsoft.com/office/drawing/2014/main" id="{F7095B0C-C6E1-EA6C-BD3B-93E23896BA10}"/>
+              </a:ext>
+            </a:extLst>
+          </p:cNvPr>
+          <p:cNvSpPr>
+            <a:spLocks noGrp="1"/>
+          </p:cNvSpPr>
+          <p:nvPr>
+            <p:ph type="sldNum" sz="quarter" idx="4"/>
+          </p:nvPr>
+        </p:nvSpPr>
+        <p:spPr/>
+        <p:txBody>
+          <a:bodyPr/>
+          <a:lstStyle/>
+          <a:p>
+            <a:r>
+              <a:rPr lang="en-US"/>
+              <a:t>Slide </a:t>
+            </a:r>
+            <a:fld id="{D25CC4C9-840B-4943-B0F1-A0347AD4FE3E}" type="slidenum">
+              <a:rPr smtClean="0"/>
+              <a:pPr/>
+              <a:t>25</a:t>
+            </a:fld>
+            <a:endParaRPr dirty="0"/>
+          </a:p>
+        </p:txBody>
+      </p:sp>
+    </p:spTree>
+    <p:extLst>
+      <p:ext uri="{BB962C8B-B14F-4D97-AF65-F5344CB8AC3E}">
+        <p14:creationId xmlns:p14="http://schemas.microsoft.com/office/powerpoint/2010/main" val="2667398686"/>
+      </p:ext>
+    </p:extLst>
+  </p:cSld>
+  <p:clrMapOvr>
+    <a:masterClrMapping/>
+  </p:clrMapOvr>
+</p:sld>
+</file>
+
+<file path=ppt/slides/slide26.xml><?xml version="1.0" encoding="utf-8"?>
+<p:sld xmlns:a="http://schemas.openxmlformats.org/drawingml/2006/main" xmlns:r="http://schemas.openxmlformats.org/officeDocument/2006/relationships" xmlns:p="http://schemas.openxmlformats.org/presentationml/2006/main">
+  <p:cSld>
+    <p:spTree>
+      <p:nvGrpSpPr>
         <p:cNvPr id="1" name="">
           <a:extLst>
             <a:ext uri="{FF2B5EF4-FFF2-40B4-BE49-F238E27FC236}">
@@ -17381,14 +18090,14 @@
             </a:br>
             <a:r>
               <a:rPr lang="en-US" dirty="0"/>
-              <a:t>Results, Altitude</a:t>
+              <a:t>Results, Altitude and Airspeed</a:t>
             </a:r>
           </a:p>
         </p:txBody>
       </p:sp>
       <p:pic>
         <p:nvPicPr>
-          <p:cNvPr id="10" name="Content Placeholder 9" descr="A graph with blue lines and orange lines&#10;&#10;Description automatically generated">
+          <p:cNvPr id="10" name="Content Placeholder 9">
             <a:extLst>
               <a:ext uri="{FF2B5EF4-FFF2-40B4-BE49-F238E27FC236}">
                 <a16:creationId xmlns:a16="http://schemas.microsoft.com/office/drawing/2014/main" id="{19D57D6C-3685-8495-D5BA-22DA85FC2CA5}"/>
@@ -17410,43 +18119,13 @@
               </a:ext>
             </a:extLst>
           </a:blip>
-          <a:stretch>
-            <a:fillRect/>
-          </a:stretch>
+          <a:srcRect/>
+          <a:stretch/>
         </p:blipFill>
         <p:spPr>
           <a:xfrm>
             <a:off x="838200" y="1974374"/>
             <a:ext cx="5181600" cy="3886200"/>
-          </a:xfrm>
-        </p:spPr>
-      </p:pic>
-      <p:pic>
-        <p:nvPicPr>
-          <p:cNvPr id="8" name="Content Placeholder 7">
-            <a:extLst>
-              <a:ext uri="{FF2B5EF4-FFF2-40B4-BE49-F238E27FC236}">
-                <a16:creationId xmlns:a16="http://schemas.microsoft.com/office/drawing/2014/main" id="{5CE8A954-54D5-EE14-39FE-C387F2B160AA}"/>
-              </a:ext>
-            </a:extLst>
-          </p:cNvPr>
-          <p:cNvPicPr>
-            <a:picLocks noGrp="1" noChangeAspect="1"/>
-          </p:cNvPicPr>
-          <p:nvPr>
-            <p:ph sz="half" idx="2"/>
-          </p:nvPr>
-        </p:nvPicPr>
-        <p:blipFill>
-          <a:blip r:embed="rId3"/>
-          <a:stretch>
-            <a:fillRect/>
-          </a:stretch>
-        </p:blipFill>
-        <p:spPr>
-          <a:xfrm>
-            <a:off x="6786746" y="331844"/>
-            <a:ext cx="4963294" cy="5464119"/>
           </a:xfrm>
         </p:spPr>
       </p:pic>
@@ -17478,7 +18157,7 @@
             <a:fld id="{D25CC4C9-840B-4943-B0F1-A0347AD4FE3E}" type="slidenum">
               <a:rPr smtClean="0"/>
               <a:pPr/>
-              <a:t>25</a:t>
+              <a:t>26</a:t>
             </a:fld>
             <a:endParaRPr dirty="0"/>
           </a:p>
@@ -17498,8 +18177,8 @@
         </p:nvSpPr>
         <p:spPr>
           <a:xfrm>
-            <a:off x="2926080" y="4039263"/>
-            <a:ext cx="2392680" cy="646331"/>
+            <a:off x="1840230" y="4219575"/>
+            <a:ext cx="1684020" cy="461665"/>
           </a:xfrm>
           <a:prstGeom prst="rect">
             <a:avLst/>
@@ -17520,8 +18199,8 @@
           <a:lstStyle/>
           <a:p>
             <a:r>
-              <a:rPr lang="en-US" dirty="0"/>
-              <a:t>Dive commanded to match flyover altitude</a:t>
+              <a:rPr lang="en-US" sz="1200" dirty="0"/>
+              <a:t>Dives commanded to match flyover altitudes</a:t>
             </a:r>
           </a:p>
         </p:txBody>
@@ -17536,14 +18215,218 @@
             </a:extLst>
           </p:cNvPr>
           <p:cNvCxnSpPr>
-            <a:stCxn id="12" idx="1"/>
+            <a:cxnSpLocks/>
+            <a:stCxn id="12" idx="0"/>
           </p:cNvCxnSpPr>
           <p:nvPr/>
         </p:nvCxnSpPr>
         <p:spPr>
           <a:xfrm flipH="1" flipV="1">
-            <a:off x="2087880" y="3931920"/>
-            <a:ext cx="838200" cy="430509"/>
+            <a:off x="2533650" y="3581400"/>
+            <a:ext cx="148590" cy="638175"/>
+          </a:xfrm>
+          <a:prstGeom prst="straightConnector1">
+            <a:avLst/>
+          </a:prstGeom>
+          <a:ln>
+            <a:tailEnd type="triangle"/>
+          </a:ln>
+        </p:spPr>
+        <p:style>
+          <a:lnRef idx="1">
+            <a:schemeClr val="accent1"/>
+          </a:lnRef>
+          <a:fillRef idx="0">
+            <a:schemeClr val="accent1"/>
+          </a:fillRef>
+          <a:effectRef idx="0">
+            <a:schemeClr val="accent1"/>
+          </a:effectRef>
+          <a:fontRef idx="minor">
+            <a:schemeClr val="tx1"/>
+          </a:fontRef>
+        </p:style>
+      </p:cxnSp>
+      <p:pic>
+        <p:nvPicPr>
+          <p:cNvPr id="24" name="Content Placeholder 23" descr="A graph with blue lines and text&#10;&#10;Description automatically generated">
+            <a:extLst>
+              <a:ext uri="{FF2B5EF4-FFF2-40B4-BE49-F238E27FC236}">
+                <a16:creationId xmlns:a16="http://schemas.microsoft.com/office/drawing/2014/main" id="{99F7BD67-DF65-1C3D-6AD0-B7760FC86C70}"/>
+              </a:ext>
+            </a:extLst>
+          </p:cNvPr>
+          <p:cNvPicPr>
+            <a:picLocks noGrp="1" noChangeAspect="1"/>
+          </p:cNvPicPr>
+          <p:nvPr>
+            <p:ph sz="half" idx="2"/>
+          </p:nvPr>
+        </p:nvPicPr>
+        <p:blipFill>
+          <a:blip r:embed="rId3">
+            <a:extLst>
+              <a:ext uri="{28A0092B-C50C-407E-A947-70E740481C1C}">
+                <a14:useLocalDpi xmlns:a14="http://schemas.microsoft.com/office/drawing/2010/main" val="0"/>
+              </a:ext>
+            </a:extLst>
+          </a:blip>
+          <a:stretch>
+            <a:fillRect/>
+          </a:stretch>
+        </p:blipFill>
+        <p:spPr>
+          <a:xfrm>
+            <a:off x="6172200" y="1974374"/>
+            <a:ext cx="5181600" cy="3886200"/>
+          </a:xfrm>
+        </p:spPr>
+      </p:pic>
+      <p:cxnSp>
+        <p:nvCxnSpPr>
+          <p:cNvPr id="15" name="Straight Arrow Connector 14">
+            <a:extLst>
+              <a:ext uri="{FF2B5EF4-FFF2-40B4-BE49-F238E27FC236}">
+                <a16:creationId xmlns:a16="http://schemas.microsoft.com/office/drawing/2014/main" id="{DF6C05DF-C478-10F7-B194-7C57D4634575}"/>
+              </a:ext>
+            </a:extLst>
+          </p:cNvPr>
+          <p:cNvCxnSpPr>
+            <a:cxnSpLocks/>
+            <a:stCxn id="12" idx="3"/>
+          </p:cNvCxnSpPr>
+          <p:nvPr/>
+        </p:nvCxnSpPr>
+        <p:spPr>
+          <a:xfrm>
+            <a:off x="3524250" y="4450408"/>
+            <a:ext cx="514350" cy="150167"/>
+          </a:xfrm>
+          <a:prstGeom prst="straightConnector1">
+            <a:avLst/>
+          </a:prstGeom>
+          <a:ln>
+            <a:tailEnd type="triangle"/>
+          </a:ln>
+        </p:spPr>
+        <p:style>
+          <a:lnRef idx="1">
+            <a:schemeClr val="accent1"/>
+          </a:lnRef>
+          <a:fillRef idx="0">
+            <a:schemeClr val="accent1"/>
+          </a:fillRef>
+          <a:effectRef idx="0">
+            <a:schemeClr val="accent1"/>
+          </a:effectRef>
+          <a:fontRef idx="minor">
+            <a:schemeClr val="tx1"/>
+          </a:fontRef>
+        </p:style>
+      </p:cxnSp>
+      <p:sp>
+        <p:nvSpPr>
+          <p:cNvPr id="27" name="TextBox 26">
+            <a:extLst>
+              <a:ext uri="{FF2B5EF4-FFF2-40B4-BE49-F238E27FC236}">
+                <a16:creationId xmlns:a16="http://schemas.microsoft.com/office/drawing/2014/main" id="{FFF38F55-46EC-6BB9-3905-5309352E0555}"/>
+              </a:ext>
+            </a:extLst>
+          </p:cNvPr>
+          <p:cNvSpPr txBox="1"/>
+          <p:nvPr/>
+        </p:nvSpPr>
+        <p:spPr>
+          <a:xfrm>
+            <a:off x="9972675" y="3757910"/>
+            <a:ext cx="1903095" cy="646331"/>
+          </a:xfrm>
+          <a:prstGeom prst="rect">
+            <a:avLst/>
+          </a:prstGeom>
+          <a:solidFill>
+            <a:schemeClr val="bg1"/>
+          </a:solidFill>
+          <a:ln>
+            <a:solidFill>
+              <a:srgbClr val="A51E36"/>
+            </a:solidFill>
+          </a:ln>
+        </p:spPr>
+        <p:txBody>
+          <a:bodyPr wrap="square" rtlCol="0">
+            <a:spAutoFit/>
+          </a:bodyPr>
+          <a:lstStyle/>
+          <a:p>
+            <a:r>
+              <a:rPr lang="en-US" sz="1200" dirty="0"/>
+              <a:t>Airspeed response overshoot before settling due to proportional control</a:t>
+            </a:r>
+          </a:p>
+        </p:txBody>
+      </p:sp>
+      <p:cxnSp>
+        <p:nvCxnSpPr>
+          <p:cNvPr id="28" name="Straight Arrow Connector 27">
+            <a:extLst>
+              <a:ext uri="{FF2B5EF4-FFF2-40B4-BE49-F238E27FC236}">
+                <a16:creationId xmlns:a16="http://schemas.microsoft.com/office/drawing/2014/main" id="{C1E1287A-FCDE-1579-FB97-CA14618B538A}"/>
+              </a:ext>
+            </a:extLst>
+          </p:cNvPr>
+          <p:cNvCxnSpPr>
+            <a:cxnSpLocks/>
+            <a:stCxn id="27" idx="1"/>
+          </p:cNvCxnSpPr>
+          <p:nvPr/>
+        </p:nvCxnSpPr>
+        <p:spPr>
+          <a:xfrm flipH="1" flipV="1">
+            <a:off x="7972425" y="3757910"/>
+            <a:ext cx="2000250" cy="323166"/>
+          </a:xfrm>
+          <a:prstGeom prst="straightConnector1">
+            <a:avLst/>
+          </a:prstGeom>
+          <a:ln>
+            <a:tailEnd type="triangle"/>
+          </a:ln>
+        </p:spPr>
+        <p:style>
+          <a:lnRef idx="1">
+            <a:schemeClr val="accent1"/>
+          </a:lnRef>
+          <a:fillRef idx="0">
+            <a:schemeClr val="accent1"/>
+          </a:fillRef>
+          <a:effectRef idx="0">
+            <a:schemeClr val="accent1"/>
+          </a:effectRef>
+          <a:fontRef idx="minor">
+            <a:schemeClr val="tx1"/>
+          </a:fontRef>
+        </p:style>
+      </p:cxnSp>
+      <p:cxnSp>
+        <p:nvCxnSpPr>
+          <p:cNvPr id="31" name="Straight Arrow Connector 30">
+            <a:extLst>
+              <a:ext uri="{FF2B5EF4-FFF2-40B4-BE49-F238E27FC236}">
+                <a16:creationId xmlns:a16="http://schemas.microsoft.com/office/drawing/2014/main" id="{F3C5ACC0-CBB5-64FC-06A4-ACC7E332312B}"/>
+              </a:ext>
+            </a:extLst>
+          </p:cNvPr>
+          <p:cNvCxnSpPr>
+            <a:cxnSpLocks/>
+            <a:stCxn id="27" idx="1"/>
+          </p:cNvCxnSpPr>
+          <p:nvPr/>
+        </p:nvCxnSpPr>
+        <p:spPr>
+          <a:xfrm flipH="1" flipV="1">
+            <a:off x="9582150" y="3757910"/>
+            <a:ext cx="390525" cy="323166"/>
           </a:xfrm>
           <a:prstGeom prst="straightConnector1">
             <a:avLst/>
@@ -17580,18 +18463,12 @@
 </p:sld>
 </file>
 
-<file path=ppt/slides/slide26.xml><?xml version="1.0" encoding="utf-8"?>
+<file path=ppt/slides/slide27.xml><?xml version="1.0" encoding="utf-8"?>
 <p:sld xmlns:a="http://schemas.openxmlformats.org/drawingml/2006/main" xmlns:r="http://schemas.openxmlformats.org/officeDocument/2006/relationships" xmlns:p="http://schemas.openxmlformats.org/presentationml/2006/main">
   <p:cSld>
     <p:spTree>
       <p:nvGrpSpPr>
-        <p:cNvPr id="1" name="">
-          <a:extLst>
-            <a:ext uri="{FF2B5EF4-FFF2-40B4-BE49-F238E27FC236}">
-              <a16:creationId xmlns:a16="http://schemas.microsoft.com/office/drawing/2014/main" id="{7BEB9550-CE5D-138E-A0C7-48FF2B3E8913}"/>
-            </a:ext>
-          </a:extLst>
-        </p:cNvPr>
+        <p:cNvPr id="1" name=""/>
         <p:cNvGrpSpPr/>
         <p:nvPr/>
       </p:nvGrpSpPr>
@@ -17608,7 +18485,7 @@
           <p:cNvPr id="2" name="Title 1">
             <a:extLst>
               <a:ext uri="{FF2B5EF4-FFF2-40B4-BE49-F238E27FC236}">
-                <a16:creationId xmlns:a16="http://schemas.microsoft.com/office/drawing/2014/main" id="{954808DA-3609-617A-16E3-FAC6CEF4059F}"/>
+                <a16:creationId xmlns:a16="http://schemas.microsoft.com/office/drawing/2014/main" id="{ED8D7DD6-0955-ACDD-532A-9CEB1E96F69D}"/>
               </a:ext>
             </a:extLst>
           </p:cNvPr>
@@ -17633,17 +18510,17 @@
             </a:br>
             <a:r>
               <a:rPr lang="en-US" dirty="0"/>
-              <a:t>Results, Airspeed</a:t>
+              <a:t>Results, Thrust, Drag, and Flight Path Angle</a:t>
             </a:r>
           </a:p>
         </p:txBody>
       </p:sp>
       <p:pic>
         <p:nvPicPr>
-          <p:cNvPr id="10" name="Content Placeholder 9">
+          <p:cNvPr id="7" name="Content Placeholder 6" descr="A graph with green and orange lines&#10;&#10;Description automatically generated">
             <a:extLst>
               <a:ext uri="{FF2B5EF4-FFF2-40B4-BE49-F238E27FC236}">
-                <a16:creationId xmlns:a16="http://schemas.microsoft.com/office/drawing/2014/main" id="{F443C834-D9EF-57F5-76F8-D1611B6F2C2D}"/>
+                <a16:creationId xmlns:a16="http://schemas.microsoft.com/office/drawing/2014/main" id="{F3628576-B0FF-09E8-8D45-6CA59538DED4}"/>
               </a:ext>
             </a:extLst>
           </p:cNvPr>
@@ -17662,22 +18539,23 @@
               </a:ext>
             </a:extLst>
           </a:blip>
-          <a:srcRect/>
-          <a:stretch/>
+          <a:stretch>
+            <a:fillRect/>
+          </a:stretch>
         </p:blipFill>
         <p:spPr>
           <a:xfrm>
-            <a:off x="838200" y="1974374"/>
+            <a:off x="838200" y="1886744"/>
             <a:ext cx="5181600" cy="3886200"/>
           </a:xfrm>
         </p:spPr>
       </p:pic>
       <p:pic>
         <p:nvPicPr>
-          <p:cNvPr id="8" name="Content Placeholder 7">
+          <p:cNvPr id="9" name="Content Placeholder 8" descr="A graph of a flight path&#10;&#10;Description automatically generated">
             <a:extLst>
               <a:ext uri="{FF2B5EF4-FFF2-40B4-BE49-F238E27FC236}">
-                <a16:creationId xmlns:a16="http://schemas.microsoft.com/office/drawing/2014/main" id="{28DD8AEF-167B-63A0-D535-BF15349D322D}"/>
+                <a16:creationId xmlns:a16="http://schemas.microsoft.com/office/drawing/2014/main" id="{FAC696FB-F325-955E-969A-BEDC6E146D74}"/>
               </a:ext>
             </a:extLst>
           </p:cNvPr>
@@ -17689,24 +18567,30 @@
           </p:nvPr>
         </p:nvPicPr>
         <p:blipFill>
-          <a:blip r:embed="rId3"/>
+          <a:blip r:embed="rId3">
+            <a:extLst>
+              <a:ext uri="{28A0092B-C50C-407E-A947-70E740481C1C}">
+                <a14:useLocalDpi xmlns:a14="http://schemas.microsoft.com/office/drawing/2010/main" val="0"/>
+              </a:ext>
+            </a:extLst>
+          </a:blip>
           <a:stretch>
             <a:fillRect/>
           </a:stretch>
         </p:blipFill>
         <p:spPr>
           <a:xfrm>
-            <a:off x="6786746" y="331844"/>
-            <a:ext cx="4963294" cy="5464119"/>
+            <a:off x="6172200" y="1886744"/>
+            <a:ext cx="5181600" cy="3886200"/>
           </a:xfrm>
         </p:spPr>
       </p:pic>
       <p:sp>
         <p:nvSpPr>
-          <p:cNvPr id="4" name="Slide Number Placeholder 3">
+          <p:cNvPr id="5" name="Slide Number Placeholder 4">
             <a:extLst>
               <a:ext uri="{FF2B5EF4-FFF2-40B4-BE49-F238E27FC236}">
-                <a16:creationId xmlns:a16="http://schemas.microsoft.com/office/drawing/2014/main" id="{624D37B1-E086-EDD0-9E44-99F8B965B577}"/>
+                <a16:creationId xmlns:a16="http://schemas.microsoft.com/office/drawing/2014/main" id="{DDA10087-175F-E07E-8873-4DE821FBDEB8}"/>
               </a:ext>
             </a:extLst>
           </p:cNvPr>
@@ -17729,184 +18613,16 @@
             <a:fld id="{D25CC4C9-840B-4943-B0F1-A0347AD4FE3E}" type="slidenum">
               <a:rPr smtClean="0"/>
               <a:pPr/>
-              <a:t>26</a:t>
+              <a:t>27</a:t>
             </a:fld>
             <a:endParaRPr dirty="0"/>
           </a:p>
         </p:txBody>
       </p:sp>
-      <p:sp>
-        <p:nvSpPr>
-          <p:cNvPr id="3" name="TextBox 2">
-            <a:extLst>
-              <a:ext uri="{FF2B5EF4-FFF2-40B4-BE49-F238E27FC236}">
-                <a16:creationId xmlns:a16="http://schemas.microsoft.com/office/drawing/2014/main" id="{6A9D4BC9-25FE-443F-22D5-6828E9FD7B68}"/>
-              </a:ext>
-            </a:extLst>
-          </p:cNvPr>
-          <p:cNvSpPr txBox="1"/>
-          <p:nvPr/>
-        </p:nvSpPr>
-        <p:spPr>
-          <a:xfrm>
-            <a:off x="2926080" y="2936855"/>
-            <a:ext cx="3246122" cy="646331"/>
-          </a:xfrm>
-          <a:prstGeom prst="rect">
-            <a:avLst/>
-          </a:prstGeom>
-          <a:solidFill>
-            <a:schemeClr val="bg1"/>
-          </a:solidFill>
-          <a:ln>
-            <a:solidFill>
-              <a:srgbClr val="A51E36"/>
-            </a:solidFill>
-          </a:ln>
-        </p:spPr>
-        <p:txBody>
-          <a:bodyPr wrap="square" rtlCol="0">
-            <a:spAutoFit/>
-          </a:bodyPr>
-          <a:lstStyle/>
-          <a:p>
-            <a:r>
-              <a:rPr lang="en-US" dirty="0"/>
-              <a:t>Drastic airspeed response due to dive (see previous slide)</a:t>
-            </a:r>
-          </a:p>
-        </p:txBody>
-      </p:sp>
-      <p:cxnSp>
-        <p:nvCxnSpPr>
-          <p:cNvPr id="6" name="Straight Arrow Connector 5">
-            <a:extLst>
-              <a:ext uri="{FF2B5EF4-FFF2-40B4-BE49-F238E27FC236}">
-                <a16:creationId xmlns:a16="http://schemas.microsoft.com/office/drawing/2014/main" id="{0CF87527-688D-E7E7-3CD7-B3D7559F6A06}"/>
-              </a:ext>
-            </a:extLst>
-          </p:cNvPr>
-          <p:cNvCxnSpPr>
-            <a:cxnSpLocks/>
-            <a:stCxn id="3" idx="1"/>
-          </p:cNvCxnSpPr>
-          <p:nvPr/>
-        </p:nvCxnSpPr>
-        <p:spPr>
-          <a:xfrm flipH="1" flipV="1">
-            <a:off x="2087880" y="2829512"/>
-            <a:ext cx="838200" cy="430509"/>
-          </a:xfrm>
-          <a:prstGeom prst="straightConnector1">
-            <a:avLst/>
-          </a:prstGeom>
-          <a:ln>
-            <a:tailEnd type="triangle"/>
-          </a:ln>
-        </p:spPr>
-        <p:style>
-          <a:lnRef idx="1">
-            <a:schemeClr val="accent1"/>
-          </a:lnRef>
-          <a:fillRef idx="0">
-            <a:schemeClr val="accent1"/>
-          </a:fillRef>
-          <a:effectRef idx="0">
-            <a:schemeClr val="accent1"/>
-          </a:effectRef>
-          <a:fontRef idx="minor">
-            <a:schemeClr val="tx1"/>
-          </a:fontRef>
-        </p:style>
-      </p:cxnSp>
-      <p:sp>
-        <p:nvSpPr>
-          <p:cNvPr id="9" name="TextBox 8">
-            <a:extLst>
-              <a:ext uri="{FF2B5EF4-FFF2-40B4-BE49-F238E27FC236}">
-                <a16:creationId xmlns:a16="http://schemas.microsoft.com/office/drawing/2014/main" id="{9A52303A-8354-E682-F8A3-BFF38F83CEBB}"/>
-              </a:ext>
-            </a:extLst>
-          </p:cNvPr>
-          <p:cNvSpPr txBox="1"/>
-          <p:nvPr/>
-        </p:nvSpPr>
-        <p:spPr>
-          <a:xfrm>
-            <a:off x="2311536" y="3638874"/>
-            <a:ext cx="3246122" cy="646331"/>
-          </a:xfrm>
-          <a:prstGeom prst="rect">
-            <a:avLst/>
-          </a:prstGeom>
-          <a:solidFill>
-            <a:schemeClr val="bg1"/>
-          </a:solidFill>
-          <a:ln>
-            <a:solidFill>
-              <a:srgbClr val="A51E36"/>
-            </a:solidFill>
-          </a:ln>
-        </p:spPr>
-        <p:txBody>
-          <a:bodyPr wrap="square" rtlCol="0">
-            <a:spAutoFit/>
-          </a:bodyPr>
-          <a:lstStyle/>
-          <a:p>
-            <a:r>
-              <a:rPr lang="en-US" dirty="0"/>
-              <a:t>After flyover, revert to northbound trajectory flight</a:t>
-            </a:r>
-          </a:p>
-        </p:txBody>
-      </p:sp>
-      <p:cxnSp>
-        <p:nvCxnSpPr>
-          <p:cNvPr id="11" name="Straight Arrow Connector 10">
-            <a:extLst>
-              <a:ext uri="{FF2B5EF4-FFF2-40B4-BE49-F238E27FC236}">
-                <a16:creationId xmlns:a16="http://schemas.microsoft.com/office/drawing/2014/main" id="{DC7215AF-7A21-0F87-F2B1-E65521F9004D}"/>
-              </a:ext>
-            </a:extLst>
-          </p:cNvPr>
-          <p:cNvCxnSpPr>
-            <a:cxnSpLocks/>
-            <a:stCxn id="9" idx="2"/>
-          </p:cNvCxnSpPr>
-          <p:nvPr/>
-        </p:nvCxnSpPr>
-        <p:spPr>
-          <a:xfrm>
-            <a:off x="3934597" y="4285205"/>
-            <a:ext cx="1161845" cy="423955"/>
-          </a:xfrm>
-          <a:prstGeom prst="straightConnector1">
-            <a:avLst/>
-          </a:prstGeom>
-          <a:ln>
-            <a:tailEnd type="triangle"/>
-          </a:ln>
-        </p:spPr>
-        <p:style>
-          <a:lnRef idx="1">
-            <a:schemeClr val="accent1"/>
-          </a:lnRef>
-          <a:fillRef idx="0">
-            <a:schemeClr val="accent1"/>
-          </a:fillRef>
-          <a:effectRef idx="0">
-            <a:schemeClr val="accent1"/>
-          </a:effectRef>
-          <a:fontRef idx="minor">
-            <a:schemeClr val="tx1"/>
-          </a:fontRef>
-        </p:style>
-      </p:cxnSp>
     </p:spTree>
     <p:extLst>
       <p:ext uri="{BB962C8B-B14F-4D97-AF65-F5344CB8AC3E}">
-        <p14:creationId xmlns:p14="http://schemas.microsoft.com/office/powerpoint/2010/main" val="808134078"/>
+        <p14:creationId xmlns:p14="http://schemas.microsoft.com/office/powerpoint/2010/main" val="2027947661"/>
       </p:ext>
     </p:extLst>
   </p:cSld>
@@ -17916,7 +18632,7 @@
 </p:sld>
 </file>
 
-<file path=ppt/slides/slide27.xml><?xml version="1.0" encoding="utf-8"?>
+<file path=ppt/slides/slide28.xml><?xml version="1.0" encoding="utf-8"?>
 <p:sld xmlns:a="http://schemas.openxmlformats.org/drawingml/2006/main" xmlns:r="http://schemas.openxmlformats.org/officeDocument/2006/relationships" xmlns:p="http://schemas.openxmlformats.org/presentationml/2006/main">
   <p:cSld>
     <p:spTree>
@@ -18017,7 +18733,7 @@
             <a:fld id="{D25CC4C9-840B-4943-B0F1-A0347AD4FE3E}" type="slidenum">
               <a:rPr smtClean="0"/>
               <a:pPr/>
-              <a:t>27</a:t>
+              <a:t>28</a:t>
             </a:fld>
             <a:endParaRPr dirty="0"/>
           </a:p>
@@ -18036,7 +18752,7 @@
 </p:sld>
 </file>
 
-<file path=ppt/slides/slide28.xml><?xml version="1.0" encoding="utf-8"?>
+<file path=ppt/slides/slide29.xml><?xml version="1.0" encoding="utf-8"?>
 <p:sld xmlns:a="http://schemas.openxmlformats.org/drawingml/2006/main" xmlns:r="http://schemas.openxmlformats.org/officeDocument/2006/relationships" xmlns:p="http://schemas.openxmlformats.org/presentationml/2006/main">
   <p:cSld>
     <p:spTree>
@@ -18348,7 +19064,7 @@
             <a:fld id="{D25CC4C9-840B-4943-B0F1-A0347AD4FE3E}" type="slidenum">
               <a:rPr smtClean="0"/>
               <a:pPr/>
-              <a:t>28</a:t>
+              <a:t>29</a:t>
             </a:fld>
             <a:endParaRPr dirty="0"/>
           </a:p>
@@ -18367,7 +19083,130 @@
 </p:sld>
 </file>
 
-<file path=ppt/slides/slide29.xml><?xml version="1.0" encoding="utf-8"?>
+<file path=ppt/slides/slide3.xml><?xml version="1.0" encoding="utf-8"?>
+<p:sld xmlns:a="http://schemas.openxmlformats.org/drawingml/2006/main" xmlns:r="http://schemas.openxmlformats.org/officeDocument/2006/relationships" xmlns:p="http://schemas.openxmlformats.org/presentationml/2006/main">
+  <p:cSld>
+    <p:spTree>
+      <p:nvGrpSpPr>
+        <p:cNvPr id="1" name=""/>
+        <p:cNvGrpSpPr/>
+        <p:nvPr/>
+      </p:nvGrpSpPr>
+      <p:grpSpPr>
+        <a:xfrm>
+          <a:off x="0" y="0"/>
+          <a:ext cx="0" cy="0"/>
+          <a:chOff x="0" y="0"/>
+          <a:chExt cx="0" cy="0"/>
+        </a:xfrm>
+      </p:grpSpPr>
+      <p:sp>
+        <p:nvSpPr>
+          <p:cNvPr id="2" name="Title 1">
+            <a:extLst>
+              <a:ext uri="{FF2B5EF4-FFF2-40B4-BE49-F238E27FC236}">
+                <a16:creationId xmlns:a16="http://schemas.microsoft.com/office/drawing/2014/main" id="{ECE8D949-B081-2799-0A08-727E310C7CBF}"/>
+              </a:ext>
+            </a:extLst>
+          </p:cNvPr>
+          <p:cNvSpPr>
+            <a:spLocks noGrp="1"/>
+          </p:cNvSpPr>
+          <p:nvPr>
+            <p:ph type="title"/>
+          </p:nvPr>
+        </p:nvSpPr>
+        <p:spPr/>
+        <p:txBody>
+          <a:bodyPr/>
+          <a:lstStyle/>
+          <a:p>
+            <a:r>
+              <a:rPr lang="en-US" dirty="0"/>
+              <a:t>Control System Hierarchy</a:t>
+            </a:r>
+          </a:p>
+        </p:txBody>
+      </p:sp>
+      <p:sp>
+        <p:nvSpPr>
+          <p:cNvPr id="4" name="Slide Number Placeholder 3">
+            <a:extLst>
+              <a:ext uri="{FF2B5EF4-FFF2-40B4-BE49-F238E27FC236}">
+                <a16:creationId xmlns:a16="http://schemas.microsoft.com/office/drawing/2014/main" id="{579CC9A3-4765-8125-0E3A-D08E1F0663B3}"/>
+              </a:ext>
+            </a:extLst>
+          </p:cNvPr>
+          <p:cNvSpPr>
+            <a:spLocks noGrp="1"/>
+          </p:cNvSpPr>
+          <p:nvPr>
+            <p:ph type="sldNum" sz="quarter" idx="4"/>
+          </p:nvPr>
+        </p:nvSpPr>
+        <p:spPr/>
+        <p:txBody>
+          <a:bodyPr/>
+          <a:lstStyle/>
+          <a:p>
+            <a:r>
+              <a:rPr lang="en-US"/>
+              <a:t>Slide </a:t>
+            </a:r>
+            <a:fld id="{D25CC4C9-840B-4943-B0F1-A0347AD4FE3E}" type="slidenum">
+              <a:rPr smtClean="0"/>
+              <a:pPr/>
+              <a:t>3</a:t>
+            </a:fld>
+            <a:endParaRPr dirty="0"/>
+          </a:p>
+        </p:txBody>
+      </p:sp>
+      <p:graphicFrame>
+        <p:nvGraphicFramePr>
+          <p:cNvPr id="8" name="Content Placeholder 7">
+            <a:extLst>
+              <a:ext uri="{FF2B5EF4-FFF2-40B4-BE49-F238E27FC236}">
+                <a16:creationId xmlns:a16="http://schemas.microsoft.com/office/drawing/2014/main" id="{2FAC4359-F761-7902-FB10-CA95F385B542}"/>
+              </a:ext>
+            </a:extLst>
+          </p:cNvPr>
+          <p:cNvGraphicFramePr>
+            <a:graphicFrameLocks noGrp="1"/>
+          </p:cNvGraphicFramePr>
+          <p:nvPr>
+            <p:ph idx="1"/>
+            <p:extLst>
+              <p:ext uri="{D42A27DB-BD31-4B8C-83A1-F6EECF244321}">
+                <p14:modId xmlns:p14="http://schemas.microsoft.com/office/powerpoint/2010/main" val="466125373"/>
+              </p:ext>
+            </p:extLst>
+          </p:nvPr>
+        </p:nvGraphicFramePr>
+        <p:xfrm>
+          <a:off x="838200" y="1690688"/>
+          <a:ext cx="10515600" cy="3948113"/>
+        </p:xfrm>
+        <a:graphic>
+          <a:graphicData uri="http://schemas.openxmlformats.org/drawingml/2006/diagram">
+            <dgm:relIds xmlns:dgm="http://schemas.openxmlformats.org/drawingml/2006/diagram" xmlns:r="http://schemas.openxmlformats.org/officeDocument/2006/relationships" r:dm="rId2" r:lo="rId3" r:qs="rId4" r:cs="rId5"/>
+          </a:graphicData>
+        </a:graphic>
+      </p:graphicFrame>
+    </p:spTree>
+    <p:extLst>
+      <p:ext uri="{BB962C8B-B14F-4D97-AF65-F5344CB8AC3E}">
+        <p14:creationId xmlns:p14="http://schemas.microsoft.com/office/powerpoint/2010/main" val="610953464"/>
+      </p:ext>
+    </p:extLst>
+  </p:cSld>
+  <p:clrMapOvr>
+    <a:masterClrMapping/>
+  </p:clrMapOvr>
+</p:sld>
+</file>
+
+<file path=ppt/slides/slide30.xml><?xml version="1.0" encoding="utf-8"?>
 <p:sld xmlns:a="http://schemas.openxmlformats.org/drawingml/2006/main" xmlns:r="http://schemas.openxmlformats.org/officeDocument/2006/relationships" xmlns:p="http://schemas.openxmlformats.org/presentationml/2006/main">
   <p:cSld>
     <p:spTree>
@@ -18699,7 +19538,7 @@
             <a:fld id="{D25CC4C9-840B-4943-B0F1-A0347AD4FE3E}" type="slidenum">
               <a:rPr smtClean="0"/>
               <a:pPr/>
-              <a:t>29</a:t>
+              <a:t>30</a:t>
             </a:fld>
             <a:endParaRPr dirty="0"/>
           </a:p>
@@ -18718,130 +19557,7 @@
 </p:sld>
 </file>
 
-<file path=ppt/slides/slide3.xml><?xml version="1.0" encoding="utf-8"?>
-<p:sld xmlns:a="http://schemas.openxmlformats.org/drawingml/2006/main" xmlns:r="http://schemas.openxmlformats.org/officeDocument/2006/relationships" xmlns:p="http://schemas.openxmlformats.org/presentationml/2006/main">
-  <p:cSld>
-    <p:spTree>
-      <p:nvGrpSpPr>
-        <p:cNvPr id="1" name=""/>
-        <p:cNvGrpSpPr/>
-        <p:nvPr/>
-      </p:nvGrpSpPr>
-      <p:grpSpPr>
-        <a:xfrm>
-          <a:off x="0" y="0"/>
-          <a:ext cx="0" cy="0"/>
-          <a:chOff x="0" y="0"/>
-          <a:chExt cx="0" cy="0"/>
-        </a:xfrm>
-      </p:grpSpPr>
-      <p:sp>
-        <p:nvSpPr>
-          <p:cNvPr id="2" name="Title 1">
-            <a:extLst>
-              <a:ext uri="{FF2B5EF4-FFF2-40B4-BE49-F238E27FC236}">
-                <a16:creationId xmlns:a16="http://schemas.microsoft.com/office/drawing/2014/main" id="{ECE8D949-B081-2799-0A08-727E310C7CBF}"/>
-              </a:ext>
-            </a:extLst>
-          </p:cNvPr>
-          <p:cNvSpPr>
-            <a:spLocks noGrp="1"/>
-          </p:cNvSpPr>
-          <p:nvPr>
-            <p:ph type="title"/>
-          </p:nvPr>
-        </p:nvSpPr>
-        <p:spPr/>
-        <p:txBody>
-          <a:bodyPr/>
-          <a:lstStyle/>
-          <a:p>
-            <a:r>
-              <a:rPr lang="en-US" dirty="0"/>
-              <a:t>Control System Hierarchy</a:t>
-            </a:r>
-          </a:p>
-        </p:txBody>
-      </p:sp>
-      <p:sp>
-        <p:nvSpPr>
-          <p:cNvPr id="4" name="Slide Number Placeholder 3">
-            <a:extLst>
-              <a:ext uri="{FF2B5EF4-FFF2-40B4-BE49-F238E27FC236}">
-                <a16:creationId xmlns:a16="http://schemas.microsoft.com/office/drawing/2014/main" id="{579CC9A3-4765-8125-0E3A-D08E1F0663B3}"/>
-              </a:ext>
-            </a:extLst>
-          </p:cNvPr>
-          <p:cNvSpPr>
-            <a:spLocks noGrp="1"/>
-          </p:cNvSpPr>
-          <p:nvPr>
-            <p:ph type="sldNum" sz="quarter" idx="4"/>
-          </p:nvPr>
-        </p:nvSpPr>
-        <p:spPr/>
-        <p:txBody>
-          <a:bodyPr/>
-          <a:lstStyle/>
-          <a:p>
-            <a:r>
-              <a:rPr lang="en-US"/>
-              <a:t>Slide </a:t>
-            </a:r>
-            <a:fld id="{D25CC4C9-840B-4943-B0F1-A0347AD4FE3E}" type="slidenum">
-              <a:rPr smtClean="0"/>
-              <a:pPr/>
-              <a:t>3</a:t>
-            </a:fld>
-            <a:endParaRPr dirty="0"/>
-          </a:p>
-        </p:txBody>
-      </p:sp>
-      <p:graphicFrame>
-        <p:nvGraphicFramePr>
-          <p:cNvPr id="8" name="Content Placeholder 7">
-            <a:extLst>
-              <a:ext uri="{FF2B5EF4-FFF2-40B4-BE49-F238E27FC236}">
-                <a16:creationId xmlns:a16="http://schemas.microsoft.com/office/drawing/2014/main" id="{2FAC4359-F761-7902-FB10-CA95F385B542}"/>
-              </a:ext>
-            </a:extLst>
-          </p:cNvPr>
-          <p:cNvGraphicFramePr>
-            <a:graphicFrameLocks noGrp="1"/>
-          </p:cNvGraphicFramePr>
-          <p:nvPr>
-            <p:ph idx="1"/>
-            <p:extLst>
-              <p:ext uri="{D42A27DB-BD31-4B8C-83A1-F6EECF244321}">
-                <p14:modId xmlns:p14="http://schemas.microsoft.com/office/powerpoint/2010/main" val="466125373"/>
-              </p:ext>
-            </p:extLst>
-          </p:nvPr>
-        </p:nvGraphicFramePr>
-        <p:xfrm>
-          <a:off x="838200" y="1690688"/>
-          <a:ext cx="10515600" cy="3948113"/>
-        </p:xfrm>
-        <a:graphic>
-          <a:graphicData uri="http://schemas.openxmlformats.org/drawingml/2006/diagram">
-            <dgm:relIds xmlns:dgm="http://schemas.openxmlformats.org/drawingml/2006/diagram" xmlns:r="http://schemas.openxmlformats.org/officeDocument/2006/relationships" r:dm="rId2" r:lo="rId3" r:qs="rId4" r:cs="rId5"/>
-          </a:graphicData>
-        </a:graphic>
-      </p:graphicFrame>
-    </p:spTree>
-    <p:extLst>
-      <p:ext uri="{BB962C8B-B14F-4D97-AF65-F5344CB8AC3E}">
-        <p14:creationId xmlns:p14="http://schemas.microsoft.com/office/powerpoint/2010/main" val="610953464"/>
-      </p:ext>
-    </p:extLst>
-  </p:cSld>
-  <p:clrMapOvr>
-    <a:masterClrMapping/>
-  </p:clrMapOvr>
-</p:sld>
-</file>
-
-<file path=ppt/slides/slide30.xml><?xml version="1.0" encoding="utf-8"?>
+<file path=ppt/slides/slide31.xml><?xml version="1.0" encoding="utf-8"?>
 <p:sld xmlns:a="http://schemas.openxmlformats.org/drawingml/2006/main" xmlns:r="http://schemas.openxmlformats.org/officeDocument/2006/relationships" xmlns:p="http://schemas.openxmlformats.org/presentationml/2006/main">
   <p:cSld>
     <p:spTree>
@@ -18983,7 +19699,7 @@
             <a:fld id="{D25CC4C9-840B-4943-B0F1-A0347AD4FE3E}" type="slidenum">
               <a:rPr smtClean="0"/>
               <a:pPr/>
-              <a:t>30</a:t>
+              <a:t>31</a:t>
             </a:fld>
             <a:endParaRPr dirty="0"/>
           </a:p>
@@ -19002,7 +19718,7 @@
 </p:sld>
 </file>
 
-<file path=ppt/slides/slide31.xml><?xml version="1.0" encoding="utf-8"?>
+<file path=ppt/slides/slide32.xml><?xml version="1.0" encoding="utf-8"?>
 <p:sld xmlns:a="http://schemas.openxmlformats.org/drawingml/2006/main" xmlns:r="http://schemas.openxmlformats.org/officeDocument/2006/relationships" xmlns:p="http://schemas.openxmlformats.org/presentationml/2006/main">
   <p:cSld>
     <p:spTree>
@@ -19159,7 +19875,7 @@
             <a:fld id="{D25CC4C9-840B-4943-B0F1-A0347AD4FE3E}" type="slidenum">
               <a:rPr smtClean="0"/>
               <a:pPr/>
-              <a:t>31</a:t>
+              <a:t>32</a:t>
             </a:fld>
             <a:endParaRPr dirty="0"/>
           </a:p>
@@ -19178,7 +19894,345 @@
 </p:sld>
 </file>
 
-<file path=ppt/slides/slide32.xml><?xml version="1.0" encoding="utf-8"?>
+<file path=ppt/slides/slide33.xml><?xml version="1.0" encoding="utf-8"?>
+<p:sld xmlns:a="http://schemas.openxmlformats.org/drawingml/2006/main" xmlns:r="http://schemas.openxmlformats.org/officeDocument/2006/relationships" xmlns:p="http://schemas.openxmlformats.org/presentationml/2006/main">
+  <p:cSld>
+    <p:spTree>
+      <p:nvGrpSpPr>
+        <p:cNvPr id="1" name=""/>
+        <p:cNvGrpSpPr/>
+        <p:nvPr/>
+      </p:nvGrpSpPr>
+      <p:grpSpPr>
+        <a:xfrm>
+          <a:off x="0" y="0"/>
+          <a:ext cx="0" cy="0"/>
+          <a:chOff x="0" y="0"/>
+          <a:chExt cx="0" cy="0"/>
+        </a:xfrm>
+      </p:grpSpPr>
+      <p:sp>
+        <p:nvSpPr>
+          <p:cNvPr id="2" name="Title 1">
+            <a:extLst>
+              <a:ext uri="{FF2B5EF4-FFF2-40B4-BE49-F238E27FC236}">
+                <a16:creationId xmlns:a16="http://schemas.microsoft.com/office/drawing/2014/main" id="{797C8834-A0E3-3E2D-C310-F71202E5F32C}"/>
+              </a:ext>
+            </a:extLst>
+          </p:cNvPr>
+          <p:cNvSpPr>
+            <a:spLocks noGrp="1"/>
+          </p:cNvSpPr>
+          <p:nvPr>
+            <p:ph type="title"/>
+          </p:nvPr>
+        </p:nvSpPr>
+        <p:spPr/>
+        <p:txBody>
+          <a:bodyPr/>
+          <a:lstStyle/>
+          <a:p>
+            <a:r>
+              <a:rPr lang="en-US" dirty="0"/>
+              <a:t>Target Assignments – Example, Continued</a:t>
+            </a:r>
+          </a:p>
+        </p:txBody>
+      </p:sp>
+      <mc:AlternateContent xmlns:mc="http://schemas.openxmlformats.org/markup-compatibility/2006">
+        <mc:Choice xmlns:a14="http://schemas.microsoft.com/office/drawing/2010/main" Requires="a14">
+          <p:sp>
+            <p:nvSpPr>
+              <p:cNvPr id="3" name="Content Placeholder 2">
+                <a:extLst>
+                  <a:ext uri="{FF2B5EF4-FFF2-40B4-BE49-F238E27FC236}">
+                    <a16:creationId xmlns:a16="http://schemas.microsoft.com/office/drawing/2014/main" id="{C1972EE4-40B9-7EAE-D211-9A44436F7493}"/>
+                  </a:ext>
+                </a:extLst>
+              </p:cNvPr>
+              <p:cNvSpPr>
+                <a:spLocks noGrp="1"/>
+              </p:cNvSpPr>
+              <p:nvPr>
+                <p:ph idx="1"/>
+              </p:nvPr>
+            </p:nvSpPr>
+            <p:spPr/>
+            <p:txBody>
+              <a:bodyPr/>
+              <a:lstStyle/>
+              <a:p>
+                <a:r>
+                  <a:rPr lang="en-US" b="0" dirty="0"/>
+                  <a:t>Weights used in assignment:</a:t>
+                </a:r>
+              </a:p>
+              <a:p>
+                <a:pPr lvl="2"/>
+                <a14:m>
+                  <m:oMath xmlns:m="http://schemas.openxmlformats.org/officeDocument/2006/math">
+                    <m:sSub>
+                      <m:sSubPr>
+                        <m:ctrlPr>
+                          <a:rPr lang="en-US" b="0" i="1" smtClean="0">
+                            <a:latin typeface="Cambria Math" panose="02040503050406030204" pitchFamily="18" charset="0"/>
+                          </a:rPr>
+                        </m:ctrlPr>
+                      </m:sSubPr>
+                      <m:e>
+                        <m:r>
+                          <a:rPr lang="en-US" b="0" i="1" smtClean="0">
+                            <a:latin typeface="Cambria Math" panose="02040503050406030204" pitchFamily="18" charset="0"/>
+                          </a:rPr>
+                          <m:t>𝑊</m:t>
+                        </m:r>
+                      </m:e>
+                      <m:sub>
+                        <m:r>
+                          <a:rPr lang="en-US" b="0" i="1" smtClean="0">
+                            <a:latin typeface="Cambria Math" panose="02040503050406030204" pitchFamily="18" charset="0"/>
+                          </a:rPr>
+                          <m:t>𝑑</m:t>
+                        </m:r>
+                      </m:sub>
+                    </m:sSub>
+                  </m:oMath>
+                </a14:m>
+                <a:r>
+                  <a:rPr lang="en-US" dirty="0"/>
+                  <a:t> : 10</a:t>
+                </a:r>
+              </a:p>
+              <a:p>
+                <a:pPr lvl="2"/>
+                <a14:m>
+                  <m:oMath xmlns:m="http://schemas.openxmlformats.org/officeDocument/2006/math">
+                    <m:sSub>
+                      <m:sSubPr>
+                        <m:ctrlPr>
+                          <a:rPr lang="en-US" b="0" i="1" smtClean="0">
+                            <a:latin typeface="Cambria Math" panose="02040503050406030204" pitchFamily="18" charset="0"/>
+                          </a:rPr>
+                        </m:ctrlPr>
+                      </m:sSubPr>
+                      <m:e>
+                        <m:r>
+                          <a:rPr lang="en-US" b="0" i="1" smtClean="0">
+                            <a:latin typeface="Cambria Math" panose="02040503050406030204" pitchFamily="18" charset="0"/>
+                          </a:rPr>
+                          <m:t>𝑊</m:t>
+                        </m:r>
+                      </m:e>
+                      <m:sub>
+                        <m:r>
+                          <a:rPr lang="en-US" b="0" i="1" smtClean="0">
+                            <a:latin typeface="Cambria Math" panose="02040503050406030204" pitchFamily="18" charset="0"/>
+                          </a:rPr>
+                          <m:t>𝑎</m:t>
+                        </m:r>
+                      </m:sub>
+                    </m:sSub>
+                  </m:oMath>
+                </a14:m>
+                <a:r>
+                  <a:rPr lang="en-US" dirty="0"/>
+                  <a:t> : 1</a:t>
+                </a:r>
+              </a:p>
+              <a:p>
+                <a:pPr lvl="2"/>
+                <a14:m>
+                  <m:oMath xmlns:m="http://schemas.openxmlformats.org/officeDocument/2006/math">
+                    <m:sSub>
+                      <m:sSubPr>
+                        <m:ctrlPr>
+                          <a:rPr lang="en-US" b="0" i="1" smtClean="0">
+                            <a:latin typeface="Cambria Math" panose="02040503050406030204" pitchFamily="18" charset="0"/>
+                          </a:rPr>
+                        </m:ctrlPr>
+                      </m:sSubPr>
+                      <m:e>
+                        <m:r>
+                          <a:rPr lang="en-US" b="0" i="1" smtClean="0">
+                            <a:latin typeface="Cambria Math" panose="02040503050406030204" pitchFamily="18" charset="0"/>
+                          </a:rPr>
+                          <m:t>𝑊</m:t>
+                        </m:r>
+                      </m:e>
+                      <m:sub>
+                        <m:r>
+                          <a:rPr lang="en-US" b="0" i="1" smtClean="0">
+                            <a:latin typeface="Cambria Math" panose="02040503050406030204" pitchFamily="18" charset="0"/>
+                          </a:rPr>
+                          <m:t>𝑣</m:t>
+                        </m:r>
+                      </m:sub>
+                    </m:sSub>
+                  </m:oMath>
+                </a14:m>
+                <a:r>
+                  <a:rPr lang="en-US" dirty="0"/>
+                  <a:t> : 0.1</a:t>
+                </a:r>
+              </a:p>
+              <a:p>
+                <a:pPr lvl="2"/>
+                <a14:m>
+                  <m:oMath xmlns:m="http://schemas.openxmlformats.org/officeDocument/2006/math">
+                    <m:sSub>
+                      <m:sSubPr>
+                        <m:ctrlPr>
+                          <a:rPr lang="en-US" b="0" i="1" smtClean="0">
+                            <a:latin typeface="Cambria Math" panose="02040503050406030204" pitchFamily="18" charset="0"/>
+                          </a:rPr>
+                        </m:ctrlPr>
+                      </m:sSubPr>
+                      <m:e>
+                        <m:r>
+                          <a:rPr lang="en-US" b="0" i="1" smtClean="0">
+                            <a:latin typeface="Cambria Math" panose="02040503050406030204" pitchFamily="18" charset="0"/>
+                          </a:rPr>
+                          <m:t>𝑊</m:t>
+                        </m:r>
+                      </m:e>
+                      <m:sub>
+                        <m:r>
+                          <a:rPr lang="en-US" b="0" i="1" smtClean="0">
+                            <a:latin typeface="Cambria Math" panose="02040503050406030204" pitchFamily="18" charset="0"/>
+                          </a:rPr>
+                          <m:t>h</m:t>
+                        </m:r>
+                      </m:sub>
+                    </m:sSub>
+                  </m:oMath>
+                </a14:m>
+                <a:r>
+                  <a:rPr lang="en-US" dirty="0"/>
+                  <a:t> : 100</a:t>
+                </a:r>
+              </a:p>
+              <a:p>
+                <a:pPr lvl="2"/>
+                <a:r>
+                  <a:rPr lang="en-US" dirty="0"/>
+                  <a:t>Assumptions:</a:t>
+                </a:r>
+              </a:p>
+              <a:p>
+                <a:pPr lvl="3"/>
+                <a:r>
+                  <a:rPr lang="en-US" dirty="0"/>
+                  <a:t>Distance from target is more important than altitude change required</a:t>
+                </a:r>
+              </a:p>
+              <a:p>
+                <a:pPr lvl="3"/>
+                <a:r>
+                  <a:rPr lang="en-US" dirty="0"/>
+                  <a:t>Velocity change required is not very important because FANGS will speed each aircraft up before intercept</a:t>
+                </a:r>
+              </a:p>
+              <a:p>
+                <a:pPr lvl="3"/>
+                <a:r>
+                  <a:rPr lang="en-US" dirty="0"/>
+                  <a:t>Heading change is very important because turning induces instability and costs a lot of flight time</a:t>
+                </a:r>
+              </a:p>
+              <a:p>
+                <a:endParaRPr lang="en-US" dirty="0"/>
+              </a:p>
+            </p:txBody>
+          </p:sp>
+        </mc:Choice>
+        <mc:Fallback>
+          <p:sp>
+            <p:nvSpPr>
+              <p:cNvPr id="3" name="Content Placeholder 2">
+                <a:extLst>
+                  <a:ext uri="{FF2B5EF4-FFF2-40B4-BE49-F238E27FC236}">
+                    <a16:creationId xmlns:a16="http://schemas.microsoft.com/office/drawing/2014/main" id="{C1972EE4-40B9-7EAE-D211-9A44436F7493}"/>
+                  </a:ext>
+                </a:extLst>
+              </p:cNvPr>
+              <p:cNvSpPr>
+                <a:spLocks noGrp="1" noRot="1" noChangeAspect="1" noMove="1" noResize="1" noEditPoints="1" noAdjustHandles="1" noChangeArrowheads="1" noChangeShapeType="1" noTextEdit="1"/>
+              </p:cNvSpPr>
+              <p:nvPr>
+                <p:ph idx="1"/>
+              </p:nvPr>
+            </p:nvSpPr>
+            <p:spPr>
+              <a:blipFill>
+                <a:blip r:embed="rId2"/>
+                <a:stretch>
+                  <a:fillRect l="-1043" t="-2469"/>
+                </a:stretch>
+              </a:blipFill>
+            </p:spPr>
+            <p:txBody>
+              <a:bodyPr/>
+              <a:lstStyle/>
+              <a:p>
+                <a:r>
+                  <a:rPr lang="en-US">
+                    <a:noFill/>
+                  </a:rPr>
+                  <a:t> </a:t>
+                </a:r>
+              </a:p>
+            </p:txBody>
+          </p:sp>
+        </mc:Fallback>
+      </mc:AlternateContent>
+      <p:sp>
+        <p:nvSpPr>
+          <p:cNvPr id="4" name="Slide Number Placeholder 3">
+            <a:extLst>
+              <a:ext uri="{FF2B5EF4-FFF2-40B4-BE49-F238E27FC236}">
+                <a16:creationId xmlns:a16="http://schemas.microsoft.com/office/drawing/2014/main" id="{F3462D06-B60D-74F2-4000-9D40959351E7}"/>
+              </a:ext>
+            </a:extLst>
+          </p:cNvPr>
+          <p:cNvSpPr>
+            <a:spLocks noGrp="1"/>
+          </p:cNvSpPr>
+          <p:nvPr>
+            <p:ph type="sldNum" sz="quarter" idx="4"/>
+          </p:nvPr>
+        </p:nvSpPr>
+        <p:spPr/>
+        <p:txBody>
+          <a:bodyPr/>
+          <a:lstStyle/>
+          <a:p>
+            <a:r>
+              <a:rPr lang="en-US"/>
+              <a:t>Slide </a:t>
+            </a:r>
+            <a:fld id="{D25CC4C9-840B-4943-B0F1-A0347AD4FE3E}" type="slidenum">
+              <a:rPr smtClean="0"/>
+              <a:pPr/>
+              <a:t>33</a:t>
+            </a:fld>
+            <a:endParaRPr dirty="0"/>
+          </a:p>
+        </p:txBody>
+      </p:sp>
+    </p:spTree>
+    <p:extLst>
+      <p:ext uri="{BB962C8B-B14F-4D97-AF65-F5344CB8AC3E}">
+        <p14:creationId xmlns:p14="http://schemas.microsoft.com/office/powerpoint/2010/main" val="2395649515"/>
+      </p:ext>
+    </p:extLst>
+  </p:cSld>
+  <p:clrMapOvr>
+    <a:masterClrMapping/>
+  </p:clrMapOvr>
+</p:sld>
+</file>
+
+<file path=ppt/slides/slide34.xml><?xml version="1.0" encoding="utf-8"?>
 <p:sld xmlns:a="http://schemas.openxmlformats.org/drawingml/2006/main" xmlns:r="http://schemas.openxmlformats.org/officeDocument/2006/relationships" xmlns:p="http://schemas.openxmlformats.org/presentationml/2006/main">
   <p:cSld>
     <p:spTree>
@@ -20017,7 +21071,7 @@
             <a:fld id="{D25CC4C9-840B-4943-B0F1-A0347AD4FE3E}" type="slidenum">
               <a:rPr smtClean="0"/>
               <a:pPr/>
-              <a:t>32</a:t>
+              <a:t>34</a:t>
             </a:fld>
             <a:endParaRPr dirty="0"/>
           </a:p>
@@ -20238,7 +21292,7 @@
 </p:sld>
 </file>
 
-<file path=ppt/slides/slide33.xml><?xml version="1.0" encoding="utf-8"?>
+<file path=ppt/slides/slide35.xml><?xml version="1.0" encoding="utf-8"?>
 <p:sld xmlns:a="http://schemas.openxmlformats.org/drawingml/2006/main" xmlns:r="http://schemas.openxmlformats.org/officeDocument/2006/relationships" xmlns:p="http://schemas.openxmlformats.org/presentationml/2006/main">
   <p:cSld>
     <p:spTree>
@@ -21705,7 +22759,7 @@
             <a:fld id="{D25CC4C9-840B-4943-B0F1-A0347AD4FE3E}" type="slidenum">
               <a:rPr smtClean="0"/>
               <a:pPr/>
-              <a:t>33</a:t>
+              <a:t>35</a:t>
             </a:fld>
             <a:endParaRPr dirty="0"/>
           </a:p>
@@ -21926,7 +22980,7 @@
 </p:sld>
 </file>
 
-<file path=ppt/slides/slide34.xml><?xml version="1.0" encoding="utf-8"?>
+<file path=ppt/slides/slide36.xml><?xml version="1.0" encoding="utf-8"?>
 <p:sld xmlns:a="http://schemas.openxmlformats.org/drawingml/2006/main" xmlns:r="http://schemas.openxmlformats.org/officeDocument/2006/relationships" xmlns:p="http://schemas.openxmlformats.org/presentationml/2006/main">
   <p:cSld>
     <p:spTree>
@@ -22005,7 +23059,7 @@
             <a:fld id="{D25CC4C9-840B-4943-B0F1-A0347AD4FE3E}" type="slidenum">
               <a:rPr smtClean="0"/>
               <a:pPr/>
-              <a:t>34</a:t>
+              <a:t>36</a:t>
             </a:fld>
             <a:endParaRPr dirty="0"/>
           </a:p>
@@ -24537,7 +25591,7 @@
 </p:sld>
 </file>
 
-<file path=ppt/slides/slide35.xml><?xml version="1.0" encoding="utf-8"?>
+<file path=ppt/slides/slide37.xml><?xml version="1.0" encoding="utf-8"?>
 <p:sld xmlns:a="http://schemas.openxmlformats.org/drawingml/2006/main" xmlns:r="http://schemas.openxmlformats.org/officeDocument/2006/relationships" xmlns:p="http://schemas.openxmlformats.org/presentationml/2006/main">
   <p:cSld>
     <p:spTree>
@@ -24572,7 +25626,7 @@
         </p:nvSpPr>
         <p:spPr>
           <a:xfrm>
-            <a:off x="268856" y="209850"/>
+            <a:off x="164081" y="171750"/>
             <a:ext cx="4837981" cy="1325563"/>
           </a:xfrm>
         </p:spPr>
@@ -24652,7 +25706,7 @@
             <a:fld id="{D25CC4C9-840B-4943-B0F1-A0347AD4FE3E}" type="slidenum">
               <a:rPr smtClean="0"/>
               <a:pPr/>
-              <a:t>35</a:t>
+              <a:t>37</a:t>
             </a:fld>
             <a:endParaRPr dirty="0"/>
           </a:p>
@@ -24671,7 +25725,7 @@
 </p:sld>
 </file>
 
-<file path=ppt/slides/slide36.xml><?xml version="1.0" encoding="utf-8"?>
+<file path=ppt/slides/slide38.xml><?xml version="1.0" encoding="utf-8"?>
 <p:sld xmlns:a="http://schemas.openxmlformats.org/drawingml/2006/main" xmlns:r="http://schemas.openxmlformats.org/officeDocument/2006/relationships" xmlns:p="http://schemas.openxmlformats.org/presentationml/2006/main">
   <p:cSld>
     <p:spTree>
@@ -24711,7 +25765,7 @@
           <a:p>
             <a:r>
               <a:rPr lang="en-US" dirty="0"/>
-              <a:t>Agent Tracking</a:t>
+              <a:t>Future Development - Agent Tracking</a:t>
             </a:r>
           </a:p>
         </p:txBody>
@@ -24848,7 +25902,7 @@
             <a:fld id="{D25CC4C9-840B-4943-B0F1-A0347AD4FE3E}" type="slidenum">
               <a:rPr smtClean="0"/>
               <a:pPr/>
-              <a:t>36</a:t>
+              <a:t>38</a:t>
             </a:fld>
             <a:endParaRPr dirty="0"/>
           </a:p>
@@ -24858,6 +25912,145 @@
     <p:extLst>
       <p:ext uri="{BB962C8B-B14F-4D97-AF65-F5344CB8AC3E}">
         <p14:creationId xmlns:p14="http://schemas.microsoft.com/office/powerpoint/2010/main" val="1112918404"/>
+      </p:ext>
+    </p:extLst>
+  </p:cSld>
+  <p:clrMapOvr>
+    <a:masterClrMapping/>
+  </p:clrMapOvr>
+</p:sld>
+</file>
+
+<file path=ppt/slides/slide39.xml><?xml version="1.0" encoding="utf-8"?>
+<p:sld xmlns:a="http://schemas.openxmlformats.org/drawingml/2006/main" xmlns:r="http://schemas.openxmlformats.org/officeDocument/2006/relationships" xmlns:p="http://schemas.openxmlformats.org/presentationml/2006/main">
+  <p:cSld>
+    <p:spTree>
+      <p:nvGrpSpPr>
+        <p:cNvPr id="1" name="">
+          <a:extLst>
+            <a:ext uri="{FF2B5EF4-FFF2-40B4-BE49-F238E27FC236}">
+              <a16:creationId xmlns:a16="http://schemas.microsoft.com/office/drawing/2014/main" id="{88C44FA0-D7A7-848C-AAE1-EB3242E70FCA}"/>
+            </a:ext>
+          </a:extLst>
+        </p:cNvPr>
+        <p:cNvGrpSpPr/>
+        <p:nvPr/>
+      </p:nvGrpSpPr>
+      <p:grpSpPr>
+        <a:xfrm>
+          <a:off x="0" y="0"/>
+          <a:ext cx="0" cy="0"/>
+          <a:chOff x="0" y="0"/>
+          <a:chExt cx="0" cy="0"/>
+        </a:xfrm>
+      </p:grpSpPr>
+      <p:sp>
+        <p:nvSpPr>
+          <p:cNvPr id="2" name="Title 1">
+            <a:extLst>
+              <a:ext uri="{FF2B5EF4-FFF2-40B4-BE49-F238E27FC236}">
+                <a16:creationId xmlns:a16="http://schemas.microsoft.com/office/drawing/2014/main" id="{08725BC1-0C54-9DB4-6646-7110E68B784C}"/>
+              </a:ext>
+            </a:extLst>
+          </p:cNvPr>
+          <p:cNvSpPr>
+            <a:spLocks noGrp="1"/>
+          </p:cNvSpPr>
+          <p:nvPr>
+            <p:ph type="title"/>
+          </p:nvPr>
+        </p:nvSpPr>
+        <p:spPr/>
+        <p:txBody>
+          <a:bodyPr/>
+          <a:lstStyle/>
+          <a:p>
+            <a:r>
+              <a:rPr lang="en-US" dirty="0"/>
+              <a:t>Future Development - Agent Tracking, Continued</a:t>
+            </a:r>
+          </a:p>
+        </p:txBody>
+      </p:sp>
+      <p:sp>
+        <p:nvSpPr>
+          <p:cNvPr id="3" name="Content Placeholder 2">
+            <a:extLst>
+              <a:ext uri="{FF2B5EF4-FFF2-40B4-BE49-F238E27FC236}">
+                <a16:creationId xmlns:a16="http://schemas.microsoft.com/office/drawing/2014/main" id="{6828E9B9-73E2-AA70-F23C-A91F26C28A69}"/>
+              </a:ext>
+            </a:extLst>
+          </p:cNvPr>
+          <p:cNvSpPr>
+            <a:spLocks noGrp="1"/>
+          </p:cNvSpPr>
+          <p:nvPr>
+            <p:ph idx="1"/>
+          </p:nvPr>
+        </p:nvSpPr>
+        <p:spPr/>
+        <p:txBody>
+          <a:bodyPr/>
+          <a:lstStyle/>
+          <a:p>
+            <a:r>
+              <a:rPr lang="en-US" dirty="0"/>
+              <a:t>Future Development: Implement random finite-set based tracking algorithms from University of Alabama LAGER Python package CARBS.</a:t>
+            </a:r>
+          </a:p>
+          <a:p>
+            <a:r>
+              <a:rPr lang="en-US" dirty="0"/>
+              <a:t>Add air-to-air targets and track these targets</a:t>
+            </a:r>
+          </a:p>
+          <a:p>
+            <a:pPr lvl="1"/>
+            <a:r>
+              <a:rPr lang="en-US" dirty="0"/>
+              <a:t>Intercept air-to-air targets with drones commanded by FANGS</a:t>
+            </a:r>
+          </a:p>
+        </p:txBody>
+      </p:sp>
+      <p:sp>
+        <p:nvSpPr>
+          <p:cNvPr id="4" name="Slide Number Placeholder 3">
+            <a:extLst>
+              <a:ext uri="{FF2B5EF4-FFF2-40B4-BE49-F238E27FC236}">
+                <a16:creationId xmlns:a16="http://schemas.microsoft.com/office/drawing/2014/main" id="{1F2EECEF-F1C5-246C-1EE7-282854153819}"/>
+              </a:ext>
+            </a:extLst>
+          </p:cNvPr>
+          <p:cNvSpPr>
+            <a:spLocks noGrp="1"/>
+          </p:cNvSpPr>
+          <p:nvPr>
+            <p:ph type="sldNum" sz="quarter" idx="4"/>
+          </p:nvPr>
+        </p:nvSpPr>
+        <p:spPr/>
+        <p:txBody>
+          <a:bodyPr/>
+          <a:lstStyle/>
+          <a:p>
+            <a:r>
+              <a:rPr lang="en-US"/>
+              <a:t>Slide </a:t>
+            </a:r>
+            <a:fld id="{D25CC4C9-840B-4943-B0F1-A0347AD4FE3E}" type="slidenum">
+              <a:rPr smtClean="0"/>
+              <a:pPr/>
+              <a:t>39</a:t>
+            </a:fld>
+            <a:endParaRPr dirty="0"/>
+          </a:p>
+        </p:txBody>
+      </p:sp>
+    </p:spTree>
+    <p:extLst>
+      <p:ext uri="{BB962C8B-B14F-4D97-AF65-F5344CB8AC3E}">
+        <p14:creationId xmlns:p14="http://schemas.microsoft.com/office/powerpoint/2010/main" val="2183328658"/>
       </p:ext>
     </p:extLst>
   </p:cSld>
@@ -26508,6 +27701,46 @@
           </a:p>
         </p:txBody>
       </p:sp>
+      <p:sp>
+        <p:nvSpPr>
+          <p:cNvPr id="6" name="TextBox 5">
+            <a:extLst>
+              <a:ext uri="{FF2B5EF4-FFF2-40B4-BE49-F238E27FC236}">
+                <a16:creationId xmlns:a16="http://schemas.microsoft.com/office/drawing/2014/main" id="{53499E59-58BF-39B9-F0FD-C07CCF9D9C28}"/>
+              </a:ext>
+            </a:extLst>
+          </p:cNvPr>
+          <p:cNvSpPr txBox="1"/>
+          <p:nvPr/>
+        </p:nvSpPr>
+        <p:spPr>
+          <a:xfrm>
+            <a:off x="152400" y="5539390"/>
+            <a:ext cx="10668000" cy="369332"/>
+          </a:xfrm>
+          <a:prstGeom prst="rect">
+            <a:avLst/>
+          </a:prstGeom>
+          <a:noFill/>
+        </p:spPr>
+        <p:txBody>
+          <a:bodyPr wrap="square">
+            <a:spAutoFit/>
+          </a:bodyPr>
+          <a:lstStyle/>
+          <a:p>
+            <a:r>
+              <a:rPr lang="en-US" dirty="0"/>
+              <a:t>Reference: Modern Flight Dynamics by Dr. John </a:t>
+            </a:r>
+            <a:r>
+              <a:rPr lang="en-US" dirty="0" err="1"/>
+              <a:t>Schierman</a:t>
+            </a:r>
+            <a:endParaRPr lang="en-US" dirty="0"/>
+          </a:p>
+        </p:txBody>
+      </p:sp>
     </p:spTree>
     <p:extLst>
       <p:ext uri="{BB962C8B-B14F-4D97-AF65-F5344CB8AC3E}">
@@ -27274,6 +28507,46 @@
               <a:t>8</a:t>
             </a:fld>
             <a:endParaRPr dirty="0"/>
+          </a:p>
+        </p:txBody>
+      </p:sp>
+      <p:sp>
+        <p:nvSpPr>
+          <p:cNvPr id="5" name="TextBox 4">
+            <a:extLst>
+              <a:ext uri="{FF2B5EF4-FFF2-40B4-BE49-F238E27FC236}">
+                <a16:creationId xmlns:a16="http://schemas.microsoft.com/office/drawing/2014/main" id="{81F1855B-9721-0EC5-83D7-6234F577D9F5}"/>
+              </a:ext>
+            </a:extLst>
+          </p:cNvPr>
+          <p:cNvSpPr txBox="1"/>
+          <p:nvPr/>
+        </p:nvSpPr>
+        <p:spPr>
+          <a:xfrm>
+            <a:off x="152400" y="5539390"/>
+            <a:ext cx="10668000" cy="369332"/>
+          </a:xfrm>
+          <a:prstGeom prst="rect">
+            <a:avLst/>
+          </a:prstGeom>
+          <a:noFill/>
+        </p:spPr>
+        <p:txBody>
+          <a:bodyPr wrap="square">
+            <a:spAutoFit/>
+          </a:bodyPr>
+          <a:lstStyle/>
+          <a:p>
+            <a:r>
+              <a:rPr lang="en-US" dirty="0"/>
+              <a:t>Reference: Modern Flight Dynamics by Dr. John </a:t>
+            </a:r>
+            <a:r>
+              <a:rPr lang="en-US" dirty="0" err="1"/>
+              <a:t>Schierman</a:t>
+            </a:r>
+            <a:endParaRPr lang="en-US" dirty="0"/>
           </a:p>
         </p:txBody>
       </p:sp>
@@ -28183,6 +29456,46 @@
           </a:p>
         </p:txBody>
       </p:sp>
+      <p:sp>
+        <p:nvSpPr>
+          <p:cNvPr id="5" name="TextBox 4">
+            <a:extLst>
+              <a:ext uri="{FF2B5EF4-FFF2-40B4-BE49-F238E27FC236}">
+                <a16:creationId xmlns:a16="http://schemas.microsoft.com/office/drawing/2014/main" id="{16F744EE-C2BB-B121-63EA-2AD7EBF2DB79}"/>
+              </a:ext>
+            </a:extLst>
+          </p:cNvPr>
+          <p:cNvSpPr txBox="1"/>
+          <p:nvPr/>
+        </p:nvSpPr>
+        <p:spPr>
+          <a:xfrm>
+            <a:off x="152400" y="5539390"/>
+            <a:ext cx="10668000" cy="369332"/>
+          </a:xfrm>
+          <a:prstGeom prst="rect">
+            <a:avLst/>
+          </a:prstGeom>
+          <a:noFill/>
+        </p:spPr>
+        <p:txBody>
+          <a:bodyPr wrap="square">
+            <a:spAutoFit/>
+          </a:bodyPr>
+          <a:lstStyle/>
+          <a:p>
+            <a:r>
+              <a:rPr lang="en-US" dirty="0"/>
+              <a:t>Reference: Modern Flight Dynamics by Dr. John </a:t>
+            </a:r>
+            <a:r>
+              <a:rPr lang="en-US" dirty="0" err="1"/>
+              <a:t>Schierman</a:t>
+            </a:r>
+            <a:endParaRPr lang="en-US" dirty="0"/>
+          </a:p>
+        </p:txBody>
+      </p:sp>
     </p:spTree>
     <p:extLst>
       <p:ext uri="{BB962C8B-B14F-4D97-AF65-F5344CB8AC3E}">

</xml_diff>